<commit_message>
Adding to the presentation
</commit_message>
<xml_diff>
--- a/AG_capstone-story.pptx
+++ b/AG_capstone-story.pptx
@@ -203,151 +203,6 @@
           <inkml:channelProperty channel="Y" name="resolution" value="1000" units="1/cm"/>
         </inkml:channelProperties>
       </inkml:inkSource>
-      <inkml:timestamp xml:id="ts0" timeString="2020-10-28T23:00:30.591"/>
-    </inkml:context>
-    <inkml:brush xml:id="br0">
-      <inkml:brushProperty name="width" value="0.3" units="cm"/>
-      <inkml:brushProperty name="height" value="0.6" units="cm"/>
-      <inkml:brushProperty name="color" value="#FFFFFF"/>
-      <inkml:brushProperty name="tip" value="rectangle"/>
-      <inkml:brushProperty name="rasterOp" value="maskPen"/>
-      <inkml:brushProperty name="ignorePressure" value="1"/>
-    </inkml:brush>
-  </inkml:definitions>
-  <inkml:trace contextRef="#ctx0" brushRef="#br0">0 0,'0'0</inkml:trace>
-</inkml:ink>
-</file>
-
-<file path=ppt/ink/ink11.xml><?xml version="1.0" encoding="utf-8"?>
-<inkml:ink xmlns:inkml="http://www.w3.org/2003/InkML">
-  <inkml:definitions>
-    <inkml:context xml:id="ctx0">
-      <inkml:inkSource xml:id="inkSrc0">
-        <inkml:traceFormat>
-          <inkml:channel name="X" type="integer" min="-2.14748E9" max="2.14748E9" units="cm"/>
-          <inkml:channel name="Y" type="integer" min="-2.14748E9" max="2.14748E9" units="cm"/>
-        </inkml:traceFormat>
-        <inkml:channelProperties>
-          <inkml:channelProperty channel="X" name="resolution" value="1000" units="1/cm"/>
-          <inkml:channelProperty channel="Y" name="resolution" value="1000" units="1/cm"/>
-        </inkml:channelProperties>
-      </inkml:inkSource>
-      <inkml:timestamp xml:id="ts0" timeString="2020-10-28T23:00:30.928"/>
-    </inkml:context>
-    <inkml:brush xml:id="br0">
-      <inkml:brushProperty name="width" value="0.3" units="cm"/>
-      <inkml:brushProperty name="height" value="0.6" units="cm"/>
-      <inkml:brushProperty name="color" value="#FFFFFF"/>
-      <inkml:brushProperty name="tip" value="rectangle"/>
-      <inkml:brushProperty name="rasterOp" value="maskPen"/>
-      <inkml:brushProperty name="ignorePressure" value="1"/>
-    </inkml:brush>
-  </inkml:definitions>
-  <inkml:trace contextRef="#ctx0" brushRef="#br0">0 1,'0'0</inkml:trace>
-</inkml:ink>
-</file>
-
-<file path=ppt/ink/ink12.xml><?xml version="1.0" encoding="utf-8"?>
-<inkml:ink xmlns:inkml="http://www.w3.org/2003/InkML">
-  <inkml:definitions>
-    <inkml:context xml:id="ctx0">
-      <inkml:inkSource xml:id="inkSrc0">
-        <inkml:traceFormat>
-          <inkml:channel name="X" type="integer" min="-2.14748E9" max="2.14748E9" units="cm"/>
-          <inkml:channel name="Y" type="integer" min="-2.14748E9" max="2.14748E9" units="cm"/>
-        </inkml:traceFormat>
-        <inkml:channelProperties>
-          <inkml:channelProperty channel="X" name="resolution" value="1000" units="1/cm"/>
-          <inkml:channelProperty channel="Y" name="resolution" value="1000" units="1/cm"/>
-        </inkml:channelProperties>
-      </inkml:inkSource>
-      <inkml:timestamp xml:id="ts0" timeString="2020-10-28T23:00:31.555"/>
-    </inkml:context>
-    <inkml:brush xml:id="br0">
-      <inkml:brushProperty name="width" value="0.3" units="cm"/>
-      <inkml:brushProperty name="height" value="0.6" units="cm"/>
-      <inkml:brushProperty name="color" value="#FFFFFF"/>
-      <inkml:brushProperty name="tip" value="rectangle"/>
-      <inkml:brushProperty name="rasterOp" value="maskPen"/>
-      <inkml:brushProperty name="ignorePressure" value="1"/>
-    </inkml:brush>
-  </inkml:definitions>
-  <inkml:trace contextRef="#ctx0" brushRef="#br0">0 1,'0'0</inkml:trace>
-</inkml:ink>
-</file>
-
-<file path=ppt/ink/ink13.xml><?xml version="1.0" encoding="utf-8"?>
-<inkml:ink xmlns:inkml="http://www.w3.org/2003/InkML">
-  <inkml:definitions>
-    <inkml:context xml:id="ctx0">
-      <inkml:inkSource xml:id="inkSrc0">
-        <inkml:traceFormat>
-          <inkml:channel name="X" type="integer" min="-2.14748E9" max="2.14748E9" units="cm"/>
-          <inkml:channel name="Y" type="integer" min="-2.14748E9" max="2.14748E9" units="cm"/>
-        </inkml:traceFormat>
-        <inkml:channelProperties>
-          <inkml:channelProperty channel="X" name="resolution" value="1000" units="1/cm"/>
-          <inkml:channelProperty channel="Y" name="resolution" value="1000" units="1/cm"/>
-        </inkml:channelProperties>
-      </inkml:inkSource>
-      <inkml:timestamp xml:id="ts0" timeString="2020-10-28T23:00:31.881"/>
-    </inkml:context>
-    <inkml:brush xml:id="br0">
-      <inkml:brushProperty name="width" value="0.3" units="cm"/>
-      <inkml:brushProperty name="height" value="0.6" units="cm"/>
-      <inkml:brushProperty name="color" value="#FFFFFF"/>
-      <inkml:brushProperty name="tip" value="rectangle"/>
-      <inkml:brushProperty name="rasterOp" value="maskPen"/>
-      <inkml:brushProperty name="ignorePressure" value="1"/>
-    </inkml:brush>
-  </inkml:definitions>
-  <inkml:trace contextRef="#ctx0" brushRef="#br0">0 1,'0'0</inkml:trace>
-</inkml:ink>
-</file>
-
-<file path=ppt/ink/ink14.xml><?xml version="1.0" encoding="utf-8"?>
-<inkml:ink xmlns:inkml="http://www.w3.org/2003/InkML">
-  <inkml:definitions>
-    <inkml:context xml:id="ctx0">
-      <inkml:inkSource xml:id="inkSrc0">
-        <inkml:traceFormat>
-          <inkml:channel name="X" type="integer" min="-2.14748E9" max="2.14748E9" units="cm"/>
-          <inkml:channel name="Y" type="integer" min="-2.14748E9" max="2.14748E9" units="cm"/>
-        </inkml:traceFormat>
-        <inkml:channelProperties>
-          <inkml:channelProperty channel="X" name="resolution" value="1000" units="1/cm"/>
-          <inkml:channelProperty channel="Y" name="resolution" value="1000" units="1/cm"/>
-        </inkml:channelProperties>
-      </inkml:inkSource>
-      <inkml:timestamp xml:id="ts0" timeString="2020-10-28T23:00:57.240"/>
-    </inkml:context>
-    <inkml:brush xml:id="br0">
-      <inkml:brushProperty name="width" value="0.5" units="cm"/>
-      <inkml:brushProperty name="height" value="1" units="cm"/>
-      <inkml:brushProperty name="color" value="#FFFFFF"/>
-      <inkml:brushProperty name="tip" value="rectangle"/>
-      <inkml:brushProperty name="rasterOp" value="maskPen"/>
-      <inkml:brushProperty name="ignorePressure" value="1"/>
-    </inkml:brush>
-  </inkml:definitions>
-  <inkml:trace contextRef="#ctx0" brushRef="#br0">0 14,'0'-6,"0"-2</inkml:trace>
-</inkml:ink>
-</file>
-
-<file path=ppt/ink/ink15.xml><?xml version="1.0" encoding="utf-8"?>
-<inkml:ink xmlns:inkml="http://www.w3.org/2003/InkML">
-  <inkml:definitions>
-    <inkml:context xml:id="ctx0">
-      <inkml:inkSource xml:id="inkSrc0">
-        <inkml:traceFormat>
-          <inkml:channel name="X" type="integer" min="-2.14748E9" max="2.14748E9" units="cm"/>
-          <inkml:channel name="Y" type="integer" min="-2.14748E9" max="2.14748E9" units="cm"/>
-        </inkml:traceFormat>
-        <inkml:channelProperties>
-          <inkml:channelProperty channel="X" name="resolution" value="1000" units="1/cm"/>
-          <inkml:channelProperty channel="Y" name="resolution" value="1000" units="1/cm"/>
-        </inkml:channelProperties>
-      </inkml:inkSource>
       <inkml:timestamp xml:id="ts0" timeString="2020-10-28T23:02:33.153"/>
     </inkml:context>
     <inkml:brush xml:id="br0">
@@ -363,7 +218,7 @@
 </inkml:ink>
 </file>
 
-<file path=ppt/ink/ink16.xml><?xml version="1.0" encoding="utf-8"?>
+<file path=ppt/ink/ink11.xml><?xml version="1.0" encoding="utf-8"?>
 <inkml:ink xmlns:inkml="http://www.w3.org/2003/InkML">
   <inkml:definitions>
     <inkml:context xml:id="ctx0">
@@ -392,7 +247,7 @@
 </inkml:ink>
 </file>
 
-<file path=ppt/ink/ink17.xml><?xml version="1.0" encoding="utf-8"?>
+<file path=ppt/ink/ink12.xml><?xml version="1.0" encoding="utf-8"?>
 <inkml:ink xmlns:inkml="http://www.w3.org/2003/InkML">
   <inkml:definitions>
     <inkml:context xml:id="ctx0">
@@ -421,7 +276,7 @@
 </inkml:ink>
 </file>
 
-<file path=ppt/ink/ink18.xml><?xml version="1.0" encoding="utf-8"?>
+<file path=ppt/ink/ink13.xml><?xml version="1.0" encoding="utf-8"?>
 <inkml:ink xmlns:inkml="http://www.w3.org/2003/InkML">
   <inkml:definitions>
     <inkml:context xml:id="ctx0">
@@ -450,7 +305,7 @@
 </inkml:ink>
 </file>
 
-<file path=ppt/ink/ink19.xml><?xml version="1.0" encoding="utf-8"?>
+<file path=ppt/ink/ink14.xml><?xml version="1.0" encoding="utf-8"?>
 <inkml:ink xmlns:inkml="http://www.w3.org/2003/InkML">
   <inkml:definitions>
     <inkml:context xml:id="ctx0">
@@ -476,6 +331,151 @@
     </inkml:brush>
   </inkml:definitions>
   <inkml:trace contextRef="#ctx0" brushRef="#br0">1 1,'0'0</inkml:trace>
+</inkml:ink>
+</file>
+
+<file path=ppt/ink/ink15.xml><?xml version="1.0" encoding="utf-8"?>
+<inkml:ink xmlns:inkml="http://www.w3.org/2003/InkML">
+  <inkml:definitions>
+    <inkml:context xml:id="ctx0">
+      <inkml:inkSource xml:id="inkSrc0">
+        <inkml:traceFormat>
+          <inkml:channel name="X" type="integer" min="-2.14748E9" max="2.14748E9" units="cm"/>
+          <inkml:channel name="Y" type="integer" min="-2.14748E9" max="2.14748E9" units="cm"/>
+        </inkml:traceFormat>
+        <inkml:channelProperties>
+          <inkml:channelProperty channel="X" name="resolution" value="1000" units="1/cm"/>
+          <inkml:channelProperty channel="Y" name="resolution" value="1000" units="1/cm"/>
+        </inkml:channelProperties>
+      </inkml:inkSource>
+      <inkml:timestamp xml:id="ts0" timeString="2020-10-28T23:02:38.903"/>
+    </inkml:context>
+    <inkml:brush xml:id="br0">
+      <inkml:brushProperty name="width" value="0.5" units="cm"/>
+      <inkml:brushProperty name="height" value="1" units="cm"/>
+      <inkml:brushProperty name="color" value="#FFFFFF"/>
+      <inkml:brushProperty name="tip" value="rectangle"/>
+      <inkml:brushProperty name="rasterOp" value="maskPen"/>
+      <inkml:brushProperty name="ignorePressure" value="1"/>
+    </inkml:brush>
+  </inkml:definitions>
+  <inkml:trace contextRef="#ctx0" brushRef="#br0">0 0,'0'0</inkml:trace>
+</inkml:ink>
+</file>
+
+<file path=ppt/ink/ink16.xml><?xml version="1.0" encoding="utf-8"?>
+<inkml:ink xmlns:inkml="http://www.w3.org/2003/InkML">
+  <inkml:definitions>
+    <inkml:context xml:id="ctx0">
+      <inkml:inkSource xml:id="inkSrc0">
+        <inkml:traceFormat>
+          <inkml:channel name="X" type="integer" min="-2.14748E9" max="2.14748E9" units="cm"/>
+          <inkml:channel name="Y" type="integer" min="-2.14748E9" max="2.14748E9" units="cm"/>
+        </inkml:traceFormat>
+        <inkml:channelProperties>
+          <inkml:channelProperty channel="X" name="resolution" value="1000" units="1/cm"/>
+          <inkml:channelProperty channel="Y" name="resolution" value="1000" units="1/cm"/>
+        </inkml:channelProperties>
+      </inkml:inkSource>
+      <inkml:timestamp xml:id="ts0" timeString="2020-10-28T23:02:39.434"/>
+    </inkml:context>
+    <inkml:brush xml:id="br0">
+      <inkml:brushProperty name="width" value="0.5" units="cm"/>
+      <inkml:brushProperty name="height" value="1" units="cm"/>
+      <inkml:brushProperty name="color" value="#FFFFFF"/>
+      <inkml:brushProperty name="tip" value="rectangle"/>
+      <inkml:brushProperty name="rasterOp" value="maskPen"/>
+      <inkml:brushProperty name="ignorePressure" value="1"/>
+    </inkml:brush>
+  </inkml:definitions>
+  <inkml:trace contextRef="#ctx0" brushRef="#br0">0 1,'0'0</inkml:trace>
+</inkml:ink>
+</file>
+
+<file path=ppt/ink/ink17.xml><?xml version="1.0" encoding="utf-8"?>
+<inkml:ink xmlns:inkml="http://www.w3.org/2003/InkML">
+  <inkml:definitions>
+    <inkml:context xml:id="ctx0">
+      <inkml:inkSource xml:id="inkSrc0">
+        <inkml:traceFormat>
+          <inkml:channel name="X" type="integer" min="-2.14748E9" max="2.14748E9" units="cm"/>
+          <inkml:channel name="Y" type="integer" min="-2.14748E9" max="2.14748E9" units="cm"/>
+        </inkml:traceFormat>
+        <inkml:channelProperties>
+          <inkml:channelProperty channel="X" name="resolution" value="1000" units="1/cm"/>
+          <inkml:channelProperty channel="Y" name="resolution" value="1000" units="1/cm"/>
+        </inkml:channelProperties>
+      </inkml:inkSource>
+      <inkml:timestamp xml:id="ts0" timeString="2020-10-28T23:02:40.498"/>
+    </inkml:context>
+    <inkml:brush xml:id="br0">
+      <inkml:brushProperty name="width" value="0.5" units="cm"/>
+      <inkml:brushProperty name="height" value="1" units="cm"/>
+      <inkml:brushProperty name="color" value="#FFFFFF"/>
+      <inkml:brushProperty name="tip" value="rectangle"/>
+      <inkml:brushProperty name="rasterOp" value="maskPen"/>
+      <inkml:brushProperty name="ignorePressure" value="1"/>
+    </inkml:brush>
+  </inkml:definitions>
+  <inkml:trace contextRef="#ctx0" brushRef="#br0">0 0,'0'0</inkml:trace>
+</inkml:ink>
+</file>
+
+<file path=ppt/ink/ink18.xml><?xml version="1.0" encoding="utf-8"?>
+<inkml:ink xmlns:inkml="http://www.w3.org/2003/InkML">
+  <inkml:definitions>
+    <inkml:context xml:id="ctx0">
+      <inkml:inkSource xml:id="inkSrc0">
+        <inkml:traceFormat>
+          <inkml:channel name="X" type="integer" min="-2.14748E9" max="2.14748E9" units="cm"/>
+          <inkml:channel name="Y" type="integer" min="-2.14748E9" max="2.14748E9" units="cm"/>
+        </inkml:traceFormat>
+        <inkml:channelProperties>
+          <inkml:channelProperty channel="X" name="resolution" value="1000" units="1/cm"/>
+          <inkml:channelProperty channel="Y" name="resolution" value="1000" units="1/cm"/>
+        </inkml:channelProperties>
+      </inkml:inkSource>
+      <inkml:timestamp xml:id="ts0" timeString="2020-10-28T23:03:11.426"/>
+    </inkml:context>
+    <inkml:brush xml:id="br0">
+      <inkml:brushProperty name="width" value="0.5" units="cm"/>
+      <inkml:brushProperty name="height" value="1" units="cm"/>
+      <inkml:brushProperty name="color" value="#FFFFFF"/>
+      <inkml:brushProperty name="tip" value="rectangle"/>
+      <inkml:brushProperty name="rasterOp" value="maskPen"/>
+      <inkml:brushProperty name="ignorePressure" value="1"/>
+    </inkml:brush>
+  </inkml:definitions>
+  <inkml:trace contextRef="#ctx0" brushRef="#br0">0 1,'0'0</inkml:trace>
+</inkml:ink>
+</file>
+
+<file path=ppt/ink/ink19.xml><?xml version="1.0" encoding="utf-8"?>
+<inkml:ink xmlns:inkml="http://www.w3.org/2003/InkML">
+  <inkml:definitions>
+    <inkml:context xml:id="ctx0">
+      <inkml:inkSource xml:id="inkSrc0">
+        <inkml:traceFormat>
+          <inkml:channel name="X" type="integer" min="-2.14748E9" max="2.14748E9" units="cm"/>
+          <inkml:channel name="Y" type="integer" min="-2.14748E9" max="2.14748E9" units="cm"/>
+        </inkml:traceFormat>
+        <inkml:channelProperties>
+          <inkml:channelProperty channel="X" name="resolution" value="1000" units="1/cm"/>
+          <inkml:channelProperty channel="Y" name="resolution" value="1000" units="1/cm"/>
+        </inkml:channelProperties>
+      </inkml:inkSource>
+      <inkml:timestamp xml:id="ts0" timeString="2020-10-28T23:03:33.458"/>
+    </inkml:context>
+    <inkml:brush xml:id="br0">
+      <inkml:brushProperty name="width" value="0.5" units="cm"/>
+      <inkml:brushProperty name="height" value="1" units="cm"/>
+      <inkml:brushProperty name="color" value="#FFFFFF"/>
+      <inkml:brushProperty name="tip" value="rectangle"/>
+      <inkml:brushProperty name="rasterOp" value="maskPen"/>
+      <inkml:brushProperty name="ignorePressure" value="1"/>
+    </inkml:brush>
+  </inkml:definitions>
+  <inkml:trace contextRef="#ctx0" brushRef="#br0">1 0,'0'0</inkml:trace>
 </inkml:ink>
 </file>
 
@@ -522,7 +522,7 @@
           <inkml:channelProperty channel="Y" name="resolution" value="1000" units="1/cm"/>
         </inkml:channelProperties>
       </inkml:inkSource>
-      <inkml:timestamp xml:id="ts0" timeString="2020-10-28T23:02:38.903"/>
+      <inkml:timestamp xml:id="ts0" timeString="2020-10-28T23:03:36.957"/>
     </inkml:context>
     <inkml:brush xml:id="br0">
       <inkml:brushProperty name="width" value="0.5" units="cm"/>
@@ -551,151 +551,6 @@
           <inkml:channelProperty channel="Y" name="resolution" value="1000" units="1/cm"/>
         </inkml:channelProperties>
       </inkml:inkSource>
-      <inkml:timestamp xml:id="ts0" timeString="2020-10-28T23:02:39.434"/>
-    </inkml:context>
-    <inkml:brush xml:id="br0">
-      <inkml:brushProperty name="width" value="0.5" units="cm"/>
-      <inkml:brushProperty name="height" value="1" units="cm"/>
-      <inkml:brushProperty name="color" value="#FFFFFF"/>
-      <inkml:brushProperty name="tip" value="rectangle"/>
-      <inkml:brushProperty name="rasterOp" value="maskPen"/>
-      <inkml:brushProperty name="ignorePressure" value="1"/>
-    </inkml:brush>
-  </inkml:definitions>
-  <inkml:trace contextRef="#ctx0" brushRef="#br0">0 1,'0'0</inkml:trace>
-</inkml:ink>
-</file>
-
-<file path=ppt/ink/ink22.xml><?xml version="1.0" encoding="utf-8"?>
-<inkml:ink xmlns:inkml="http://www.w3.org/2003/InkML">
-  <inkml:definitions>
-    <inkml:context xml:id="ctx0">
-      <inkml:inkSource xml:id="inkSrc0">
-        <inkml:traceFormat>
-          <inkml:channel name="X" type="integer" min="-2.14748E9" max="2.14748E9" units="cm"/>
-          <inkml:channel name="Y" type="integer" min="-2.14748E9" max="2.14748E9" units="cm"/>
-        </inkml:traceFormat>
-        <inkml:channelProperties>
-          <inkml:channelProperty channel="X" name="resolution" value="1000" units="1/cm"/>
-          <inkml:channelProperty channel="Y" name="resolution" value="1000" units="1/cm"/>
-        </inkml:channelProperties>
-      </inkml:inkSource>
-      <inkml:timestamp xml:id="ts0" timeString="2020-10-28T23:02:40.498"/>
-    </inkml:context>
-    <inkml:brush xml:id="br0">
-      <inkml:brushProperty name="width" value="0.5" units="cm"/>
-      <inkml:brushProperty name="height" value="1" units="cm"/>
-      <inkml:brushProperty name="color" value="#FFFFFF"/>
-      <inkml:brushProperty name="tip" value="rectangle"/>
-      <inkml:brushProperty name="rasterOp" value="maskPen"/>
-      <inkml:brushProperty name="ignorePressure" value="1"/>
-    </inkml:brush>
-  </inkml:definitions>
-  <inkml:trace contextRef="#ctx0" brushRef="#br0">0 0,'0'0</inkml:trace>
-</inkml:ink>
-</file>
-
-<file path=ppt/ink/ink23.xml><?xml version="1.0" encoding="utf-8"?>
-<inkml:ink xmlns:inkml="http://www.w3.org/2003/InkML">
-  <inkml:definitions>
-    <inkml:context xml:id="ctx0">
-      <inkml:inkSource xml:id="inkSrc0">
-        <inkml:traceFormat>
-          <inkml:channel name="X" type="integer" min="-2.14748E9" max="2.14748E9" units="cm"/>
-          <inkml:channel name="Y" type="integer" min="-2.14748E9" max="2.14748E9" units="cm"/>
-        </inkml:traceFormat>
-        <inkml:channelProperties>
-          <inkml:channelProperty channel="X" name="resolution" value="1000" units="1/cm"/>
-          <inkml:channelProperty channel="Y" name="resolution" value="1000" units="1/cm"/>
-        </inkml:channelProperties>
-      </inkml:inkSource>
-      <inkml:timestamp xml:id="ts0" timeString="2020-10-28T23:03:11.426"/>
-    </inkml:context>
-    <inkml:brush xml:id="br0">
-      <inkml:brushProperty name="width" value="0.5" units="cm"/>
-      <inkml:brushProperty name="height" value="1" units="cm"/>
-      <inkml:brushProperty name="color" value="#FFFFFF"/>
-      <inkml:brushProperty name="tip" value="rectangle"/>
-      <inkml:brushProperty name="rasterOp" value="maskPen"/>
-      <inkml:brushProperty name="ignorePressure" value="1"/>
-    </inkml:brush>
-  </inkml:definitions>
-  <inkml:trace contextRef="#ctx0" brushRef="#br0">0 1,'0'0</inkml:trace>
-</inkml:ink>
-</file>
-
-<file path=ppt/ink/ink24.xml><?xml version="1.0" encoding="utf-8"?>
-<inkml:ink xmlns:inkml="http://www.w3.org/2003/InkML">
-  <inkml:definitions>
-    <inkml:context xml:id="ctx0">
-      <inkml:inkSource xml:id="inkSrc0">
-        <inkml:traceFormat>
-          <inkml:channel name="X" type="integer" min="-2.14748E9" max="2.14748E9" units="cm"/>
-          <inkml:channel name="Y" type="integer" min="-2.14748E9" max="2.14748E9" units="cm"/>
-        </inkml:traceFormat>
-        <inkml:channelProperties>
-          <inkml:channelProperty channel="X" name="resolution" value="1000" units="1/cm"/>
-          <inkml:channelProperty channel="Y" name="resolution" value="1000" units="1/cm"/>
-        </inkml:channelProperties>
-      </inkml:inkSource>
-      <inkml:timestamp xml:id="ts0" timeString="2020-10-28T23:03:33.458"/>
-    </inkml:context>
-    <inkml:brush xml:id="br0">
-      <inkml:brushProperty name="width" value="0.5" units="cm"/>
-      <inkml:brushProperty name="height" value="1" units="cm"/>
-      <inkml:brushProperty name="color" value="#FFFFFF"/>
-      <inkml:brushProperty name="tip" value="rectangle"/>
-      <inkml:brushProperty name="rasterOp" value="maskPen"/>
-      <inkml:brushProperty name="ignorePressure" value="1"/>
-    </inkml:brush>
-  </inkml:definitions>
-  <inkml:trace contextRef="#ctx0" brushRef="#br0">1 0,'0'0</inkml:trace>
-</inkml:ink>
-</file>
-
-<file path=ppt/ink/ink25.xml><?xml version="1.0" encoding="utf-8"?>
-<inkml:ink xmlns:inkml="http://www.w3.org/2003/InkML">
-  <inkml:definitions>
-    <inkml:context xml:id="ctx0">
-      <inkml:inkSource xml:id="inkSrc0">
-        <inkml:traceFormat>
-          <inkml:channel name="X" type="integer" min="-2.14748E9" max="2.14748E9" units="cm"/>
-          <inkml:channel name="Y" type="integer" min="-2.14748E9" max="2.14748E9" units="cm"/>
-        </inkml:traceFormat>
-        <inkml:channelProperties>
-          <inkml:channelProperty channel="X" name="resolution" value="1000" units="1/cm"/>
-          <inkml:channelProperty channel="Y" name="resolution" value="1000" units="1/cm"/>
-        </inkml:channelProperties>
-      </inkml:inkSource>
-      <inkml:timestamp xml:id="ts0" timeString="2020-10-28T23:03:36.957"/>
-    </inkml:context>
-    <inkml:brush xml:id="br0">
-      <inkml:brushProperty name="width" value="0.5" units="cm"/>
-      <inkml:brushProperty name="height" value="1" units="cm"/>
-      <inkml:brushProperty name="color" value="#FFFFFF"/>
-      <inkml:brushProperty name="tip" value="rectangle"/>
-      <inkml:brushProperty name="rasterOp" value="maskPen"/>
-      <inkml:brushProperty name="ignorePressure" value="1"/>
-    </inkml:brush>
-  </inkml:definitions>
-  <inkml:trace contextRef="#ctx0" brushRef="#br0">0 0,'0'0</inkml:trace>
-</inkml:ink>
-</file>
-
-<file path=ppt/ink/ink26.xml><?xml version="1.0" encoding="utf-8"?>
-<inkml:ink xmlns:inkml="http://www.w3.org/2003/InkML">
-  <inkml:definitions>
-    <inkml:context xml:id="ctx0">
-      <inkml:inkSource xml:id="inkSrc0">
-        <inkml:traceFormat>
-          <inkml:channel name="X" type="integer" min="-2.14748E9" max="2.14748E9" units="cm"/>
-          <inkml:channel name="Y" type="integer" min="-2.14748E9" max="2.14748E9" units="cm"/>
-        </inkml:traceFormat>
-        <inkml:channelProperties>
-          <inkml:channelProperty channel="X" name="resolution" value="1000" units="1/cm"/>
-          <inkml:channelProperty channel="Y" name="resolution" value="1000" units="1/cm"/>
-        </inkml:channelProperties>
-      </inkml:inkSource>
       <inkml:timestamp xml:id="ts0" timeString="2020-10-28T23:03:37.444"/>
     </inkml:context>
     <inkml:brush xml:id="br0">
@@ -711,7 +566,7 @@
 </inkml:ink>
 </file>
 
-<file path=ppt/ink/ink27.xml><?xml version="1.0" encoding="utf-8"?>
+<file path=ppt/ink/ink22.xml><?xml version="1.0" encoding="utf-8"?>
 <inkml:ink xmlns:inkml="http://www.w3.org/2003/InkML">
   <inkml:definitions>
     <inkml:context xml:id="ctx0">
@@ -740,7 +595,7 @@
 </inkml:ink>
 </file>
 
-<file path=ppt/ink/ink28.xml><?xml version="1.0" encoding="utf-8"?>
+<file path=ppt/ink/ink23.xml><?xml version="1.0" encoding="utf-8"?>
 <inkml:ink xmlns:inkml="http://www.w3.org/2003/InkML">
   <inkml:definitions>
     <inkml:context xml:id="ctx0">
@@ -769,7 +624,7 @@
 </inkml:ink>
 </file>
 
-<file path=ppt/ink/ink29.xml><?xml version="1.0" encoding="utf-8"?>
+<file path=ppt/ink/ink24.xml><?xml version="1.0" encoding="utf-8"?>
 <inkml:ink xmlns:inkml="http://www.w3.org/2003/InkML">
   <inkml:definitions>
     <inkml:context xml:id="ctx0">
@@ -798,36 +653,7 @@
 </inkml:ink>
 </file>
 
-<file path=ppt/ink/ink3.xml><?xml version="1.0" encoding="utf-8"?>
-<inkml:ink xmlns:inkml="http://www.w3.org/2003/InkML">
-  <inkml:definitions>
-    <inkml:context xml:id="ctx0">
-      <inkml:inkSource xml:id="inkSrc0">
-        <inkml:traceFormat>
-          <inkml:channel name="X" type="integer" min="-2.14748E9" max="2.14748E9" units="cm"/>
-          <inkml:channel name="Y" type="integer" min="-2.14748E9" max="2.14748E9" units="cm"/>
-        </inkml:traceFormat>
-        <inkml:channelProperties>
-          <inkml:channelProperty channel="X" name="resolution" value="1000" units="1/cm"/>
-          <inkml:channelProperty channel="Y" name="resolution" value="1000" units="1/cm"/>
-        </inkml:channelProperties>
-      </inkml:inkSource>
-      <inkml:timestamp xml:id="ts0" timeString="2020-10-28T23:01:55.176"/>
-    </inkml:context>
-    <inkml:brush xml:id="br0">
-      <inkml:brushProperty name="width" value="0.5" units="cm"/>
-      <inkml:brushProperty name="height" value="1" units="cm"/>
-      <inkml:brushProperty name="color" value="#FFFFFF"/>
-      <inkml:brushProperty name="tip" value="rectangle"/>
-      <inkml:brushProperty name="rasterOp" value="maskPen"/>
-      <inkml:brushProperty name="ignorePressure" value="1"/>
-    </inkml:brush>
-  </inkml:definitions>
-  <inkml:trace contextRef="#ctx0" brushRef="#br0">0 1,'0'0</inkml:trace>
-</inkml:ink>
-</file>
-
-<file path=ppt/ink/ink30.xml><?xml version="1.0" encoding="utf-8"?>
+<file path=ppt/ink/ink25.xml><?xml version="1.0" encoding="utf-8"?>
 <inkml:ink xmlns:inkml="http://www.w3.org/2003/InkML">
   <inkml:definitions>
     <inkml:context xml:id="ctx0">
@@ -853,123 +679,7 @@
 </inkml:ink>
 </file>
 
-<file path=ppt/ink/ink31.xml><?xml version="1.0" encoding="utf-8"?>
-<inkml:ink xmlns:inkml="http://www.w3.org/2003/InkML">
-  <inkml:definitions>
-    <inkml:context xml:id="ctx0">
-      <inkml:inkSource xml:id="inkSrc0">
-        <inkml:traceFormat>
-          <inkml:channel name="X" type="integer" min="-2.14748E9" max="2.14748E9" units="cm"/>
-          <inkml:channel name="Y" type="integer" min="-2.14748E9" max="2.14748E9" units="cm"/>
-        </inkml:traceFormat>
-        <inkml:channelProperties>
-          <inkml:channelProperty channel="X" name="resolution" value="1000" units="1/cm"/>
-          <inkml:channelProperty channel="Y" name="resolution" value="1000" units="1/cm"/>
-        </inkml:channelProperties>
-      </inkml:inkSource>
-      <inkml:timestamp xml:id="ts0" timeString="2020-10-28T23:02:44.359"/>
-    </inkml:context>
-    <inkml:brush xml:id="br0">
-      <inkml:brushProperty name="width" value="0.5" units="cm"/>
-      <inkml:brushProperty name="height" value="1" units="cm"/>
-      <inkml:brushProperty name="color" value="#FFFFFF"/>
-      <inkml:brushProperty name="tip" value="rectangle"/>
-      <inkml:brushProperty name="rasterOp" value="maskPen"/>
-      <inkml:brushProperty name="ignorePressure" value="1"/>
-    </inkml:brush>
-  </inkml:definitions>
-  <inkml:trace contextRef="#ctx0" brushRef="#br0">0 0,'0'0</inkml:trace>
-</inkml:ink>
-</file>
-
-<file path=ppt/ink/ink32.xml><?xml version="1.0" encoding="utf-8"?>
-<inkml:ink xmlns:inkml="http://www.w3.org/2003/InkML">
-  <inkml:definitions>
-    <inkml:context xml:id="ctx0">
-      <inkml:inkSource xml:id="inkSrc0">
-        <inkml:traceFormat>
-          <inkml:channel name="X" type="integer" min="-2.14748E9" max="2.14748E9" units="cm"/>
-          <inkml:channel name="Y" type="integer" min="-2.14748E9" max="2.14748E9" units="cm"/>
-        </inkml:traceFormat>
-        <inkml:channelProperties>
-          <inkml:channelProperty channel="X" name="resolution" value="1000" units="1/cm"/>
-          <inkml:channelProperty channel="Y" name="resolution" value="1000" units="1/cm"/>
-        </inkml:channelProperties>
-      </inkml:inkSource>
-      <inkml:timestamp xml:id="ts0" timeString="2020-10-28T23:02:45.199"/>
-    </inkml:context>
-    <inkml:brush xml:id="br0">
-      <inkml:brushProperty name="width" value="0.5" units="cm"/>
-      <inkml:brushProperty name="height" value="1" units="cm"/>
-      <inkml:brushProperty name="color" value="#FFFFFF"/>
-      <inkml:brushProperty name="tip" value="rectangle"/>
-      <inkml:brushProperty name="rasterOp" value="maskPen"/>
-      <inkml:brushProperty name="ignorePressure" value="1"/>
-    </inkml:brush>
-  </inkml:definitions>
-  <inkml:trace contextRef="#ctx0" brushRef="#br0">0 1,'0'0</inkml:trace>
-</inkml:ink>
-</file>
-
-<file path=ppt/ink/ink33.xml><?xml version="1.0" encoding="utf-8"?>
-<inkml:ink xmlns:inkml="http://www.w3.org/2003/InkML">
-  <inkml:definitions>
-    <inkml:context xml:id="ctx0">
-      <inkml:inkSource xml:id="inkSrc0">
-        <inkml:traceFormat>
-          <inkml:channel name="X" type="integer" min="-2.14748E9" max="2.14748E9" units="cm"/>
-          <inkml:channel name="Y" type="integer" min="-2.14748E9" max="2.14748E9" units="cm"/>
-        </inkml:traceFormat>
-        <inkml:channelProperties>
-          <inkml:channelProperty channel="X" name="resolution" value="1000" units="1/cm"/>
-          <inkml:channelProperty channel="Y" name="resolution" value="1000" units="1/cm"/>
-        </inkml:channelProperties>
-      </inkml:inkSource>
-      <inkml:timestamp xml:id="ts0" timeString="2020-10-28T23:02:45.763"/>
-    </inkml:context>
-    <inkml:brush xml:id="br0">
-      <inkml:brushProperty name="width" value="0.5" units="cm"/>
-      <inkml:brushProperty name="height" value="1" units="cm"/>
-      <inkml:brushProperty name="color" value="#FFFFFF"/>
-      <inkml:brushProperty name="tip" value="rectangle"/>
-      <inkml:brushProperty name="rasterOp" value="maskPen"/>
-      <inkml:brushProperty name="ignorePressure" value="1"/>
-    </inkml:brush>
-  </inkml:definitions>
-  <inkml:trace contextRef="#ctx0" brushRef="#br0">0 0,'0'0</inkml:trace>
-</inkml:ink>
-</file>
-
-<file path=ppt/ink/ink34.xml><?xml version="1.0" encoding="utf-8"?>
-<inkml:ink xmlns:inkml="http://www.w3.org/2003/InkML">
-  <inkml:definitions>
-    <inkml:context xml:id="ctx0">
-      <inkml:inkSource xml:id="inkSrc0">
-        <inkml:traceFormat>
-          <inkml:channel name="X" type="integer" min="-2.14748E9" max="2.14748E9" units="cm"/>
-          <inkml:channel name="Y" type="integer" min="-2.14748E9" max="2.14748E9" units="cm"/>
-        </inkml:traceFormat>
-        <inkml:channelProperties>
-          <inkml:channelProperty channel="X" name="resolution" value="1000" units="1/cm"/>
-          <inkml:channelProperty channel="Y" name="resolution" value="1000" units="1/cm"/>
-        </inkml:channelProperties>
-      </inkml:inkSource>
-      <inkml:timestamp xml:id="ts0" timeString="2020-10-28T23:02:46.202"/>
-    </inkml:context>
-    <inkml:brush xml:id="br0">
-      <inkml:brushProperty name="width" value="0.5" units="cm"/>
-      <inkml:brushProperty name="height" value="1" units="cm"/>
-      <inkml:brushProperty name="color" value="#FFFFFF"/>
-      <inkml:brushProperty name="tip" value="rectangle"/>
-      <inkml:brushProperty name="rasterOp" value="maskPen"/>
-      <inkml:brushProperty name="ignorePressure" value="1"/>
-    </inkml:brush>
-  </inkml:definitions>
-  <inkml:trace contextRef="#ctx0" brushRef="#br0">0 0,'6'0,"-4"6,-2 2</inkml:trace>
-</inkml:ink>
-</file>
-
-<file path=ppt/ink/ink35.xml><?xml version="1.0" encoding="utf-8"?>
+<file path=ppt/ink/ink26.xml><?xml version="1.0" encoding="utf-8"?>
 <inkml:ink xmlns:inkml="http://www.w3.org/2003/InkML">
   <inkml:definitions>
     <inkml:context xml:id="ctx0">
@@ -998,7 +708,7 @@
 </inkml:ink>
 </file>
 
-<file path=ppt/ink/ink36.xml><?xml version="1.0" encoding="utf-8"?>
+<file path=ppt/ink/ink27.xml><?xml version="1.0" encoding="utf-8"?>
 <inkml:ink xmlns:inkml="http://www.w3.org/2003/InkML">
   <inkml:definitions>
     <inkml:context xml:id="ctx0">
@@ -1012,7 +722,7 @@
           <inkml:channelProperty channel="Y" name="resolution" value="1000" units="1/cm"/>
         </inkml:channelProperties>
       </inkml:inkSource>
-      <inkml:timestamp xml:id="ts0" timeString="2020-10-28T23:03:01.422"/>
+      <inkml:timestamp xml:id="ts0" timeString="2020-10-28T23:03:02.610"/>
     </inkml:context>
     <inkml:brush xml:id="br0">
       <inkml:brushProperty name="width" value="0.5" units="cm"/>
@@ -1027,7 +737,7 @@
 </inkml:ink>
 </file>
 
-<file path=ppt/ink/ink37.xml><?xml version="1.0" encoding="utf-8"?>
+<file path=ppt/ink/ink3.xml><?xml version="1.0" encoding="utf-8"?>
 <inkml:ink xmlns:inkml="http://www.w3.org/2003/InkML">
   <inkml:definitions>
     <inkml:context xml:id="ctx0">
@@ -1041,65 +751,7 @@
           <inkml:channelProperty channel="Y" name="resolution" value="1000" units="1/cm"/>
         </inkml:channelProperties>
       </inkml:inkSource>
-      <inkml:timestamp xml:id="ts0" timeString="2020-10-28T23:03:01.878"/>
-    </inkml:context>
-    <inkml:brush xml:id="br0">
-      <inkml:brushProperty name="width" value="0.5" units="cm"/>
-      <inkml:brushProperty name="height" value="1" units="cm"/>
-      <inkml:brushProperty name="color" value="#FFFFFF"/>
-      <inkml:brushProperty name="tip" value="rectangle"/>
-      <inkml:brushProperty name="rasterOp" value="maskPen"/>
-      <inkml:brushProperty name="ignorePressure" value="1"/>
-    </inkml:brush>
-  </inkml:definitions>
-  <inkml:trace contextRef="#ctx0" brushRef="#br0">0 1,'0'0</inkml:trace>
-</inkml:ink>
-</file>
-
-<file path=ppt/ink/ink38.xml><?xml version="1.0" encoding="utf-8"?>
-<inkml:ink xmlns:inkml="http://www.w3.org/2003/InkML">
-  <inkml:definitions>
-    <inkml:context xml:id="ctx0">
-      <inkml:inkSource xml:id="inkSrc0">
-        <inkml:traceFormat>
-          <inkml:channel name="X" type="integer" min="-2.14748E9" max="2.14748E9" units="cm"/>
-          <inkml:channel name="Y" type="integer" min="-2.14748E9" max="2.14748E9" units="cm"/>
-        </inkml:traceFormat>
-        <inkml:channelProperties>
-          <inkml:channelProperty channel="X" name="resolution" value="1000" units="1/cm"/>
-          <inkml:channelProperty channel="Y" name="resolution" value="1000" units="1/cm"/>
-        </inkml:channelProperties>
-      </inkml:inkSource>
-      <inkml:timestamp xml:id="ts0" timeString="2020-10-28T23:03:02.265"/>
-    </inkml:context>
-    <inkml:brush xml:id="br0">
-      <inkml:brushProperty name="width" value="0.5" units="cm"/>
-      <inkml:brushProperty name="height" value="1" units="cm"/>
-      <inkml:brushProperty name="color" value="#FFFFFF"/>
-      <inkml:brushProperty name="tip" value="rectangle"/>
-      <inkml:brushProperty name="rasterOp" value="maskPen"/>
-      <inkml:brushProperty name="ignorePressure" value="1"/>
-    </inkml:brush>
-  </inkml:definitions>
-  <inkml:trace contextRef="#ctx0" brushRef="#br0">0 1,'0'0</inkml:trace>
-</inkml:ink>
-</file>
-
-<file path=ppt/ink/ink39.xml><?xml version="1.0" encoding="utf-8"?>
-<inkml:ink xmlns:inkml="http://www.w3.org/2003/InkML">
-  <inkml:definitions>
-    <inkml:context xml:id="ctx0">
-      <inkml:inkSource xml:id="inkSrc0">
-        <inkml:traceFormat>
-          <inkml:channel name="X" type="integer" min="-2.14748E9" max="2.14748E9" units="cm"/>
-          <inkml:channel name="Y" type="integer" min="-2.14748E9" max="2.14748E9" units="cm"/>
-        </inkml:traceFormat>
-        <inkml:channelProperties>
-          <inkml:channelProperty channel="X" name="resolution" value="1000" units="1/cm"/>
-          <inkml:channelProperty channel="Y" name="resolution" value="1000" units="1/cm"/>
-        </inkml:channelProperties>
-      </inkml:inkSource>
-      <inkml:timestamp xml:id="ts0" timeString="2020-10-28T23:03:02.610"/>
+      <inkml:timestamp xml:id="ts0" timeString="2020-10-28T23:01:55.176"/>
     </inkml:context>
     <inkml:brush xml:id="br0">
       <inkml:brushProperty name="width" value="0.5" units="cm"/>
@@ -1140,35 +792,6 @@
     </inkml:brush>
   </inkml:definitions>
   <inkml:trace contextRef="#ctx0" brushRef="#br0">0 1,'0'0</inkml:trace>
-</inkml:ink>
-</file>
-
-<file path=ppt/ink/ink40.xml><?xml version="1.0" encoding="utf-8"?>
-<inkml:ink xmlns:inkml="http://www.w3.org/2003/InkML">
-  <inkml:definitions>
-    <inkml:context xml:id="ctx0">
-      <inkml:inkSource xml:id="inkSrc0">
-        <inkml:traceFormat>
-          <inkml:channel name="X" type="integer" min="-2.14748E9" max="2.14748E9" units="cm"/>
-          <inkml:channel name="Y" type="integer" min="-2.14748E9" max="2.14748E9" units="cm"/>
-        </inkml:traceFormat>
-        <inkml:channelProperties>
-          <inkml:channelProperty channel="X" name="resolution" value="1000" units="1/cm"/>
-          <inkml:channelProperty channel="Y" name="resolution" value="1000" units="1/cm"/>
-        </inkml:channelProperties>
-      </inkml:inkSource>
-      <inkml:timestamp xml:id="ts0" timeString="2020-10-28T23:03:03.924"/>
-    </inkml:context>
-    <inkml:brush xml:id="br0">
-      <inkml:brushProperty name="width" value="0.5" units="cm"/>
-      <inkml:brushProperty name="height" value="1" units="cm"/>
-      <inkml:brushProperty name="color" value="#FFFFFF"/>
-      <inkml:brushProperty name="tip" value="rectangle"/>
-      <inkml:brushProperty name="rasterOp" value="maskPen"/>
-      <inkml:brushProperty name="ignorePressure" value="1"/>
-    </inkml:brush>
-  </inkml:definitions>
-  <inkml:trace contextRef="#ctx0" brushRef="#br0">1 0</inkml:trace>
 </inkml:ink>
 </file>
 
@@ -1302,18 +925,18 @@
           <inkml:channelProperty channel="Y" name="resolution" value="1000" units="1/cm"/>
         </inkml:channelProperties>
       </inkml:inkSource>
-      <inkml:timestamp xml:id="ts0" timeString="2020-10-28T23:00:28.782"/>
+      <inkml:timestamp xml:id="ts0" timeString="2020-10-28T23:00:57.240"/>
     </inkml:context>
     <inkml:brush xml:id="br0">
-      <inkml:brushProperty name="width" value="0.3" units="cm"/>
-      <inkml:brushProperty name="height" value="0.6" units="cm"/>
+      <inkml:brushProperty name="width" value="0.5" units="cm"/>
+      <inkml:brushProperty name="height" value="1" units="cm"/>
       <inkml:brushProperty name="color" value="#FFFFFF"/>
       <inkml:brushProperty name="tip" value="rectangle"/>
       <inkml:brushProperty name="rasterOp" value="maskPen"/>
       <inkml:brushProperty name="ignorePressure" value="1"/>
     </inkml:brush>
   </inkml:definitions>
-  <inkml:trace contextRef="#ctx0" brushRef="#br0">3862 105,'-1271'0,"1156"-5,-24-7,-86-4,-555 14,398 3,346-3,0-2,1-1,-1-2,-10-4,-70-13,-19 12,0 6,-61 8,66 0,86 2,44-4,0 0,0 0,0 0,-1 0,1 0,0 0,0 0,0 1,0-1,-1 0,1 0,0 0,0 0,0 0,0 0,-1 0,1 0,0 0,0 1,0-1,0 0,0 0,0 0,0 0,-1 0,1 1,0-1,0 0,0 0,0 0,0 0,0 1,0-1,0 0,0 0,0 0,0 1,0-1,0 0,0 0,0 0,0 0,0 1,0-1,0 0,0 0,0 0,0 0,1 1,-1-1,0 0,20 10,43 10,61 11,-29-8,63 10,2-7,83 0,-79-10,0 7,60 20,-165-29,0-2,1-3,1-3,53-2,1709-7,-1834 2,-1-1,1 0,0 0,0-1,0-1,-36-8,-207-29,-83 4,242 22,66 9,0 1,-1 2,-2 1,-72 2,54 2,0-3,-42-6,52 0</inkml:trace>
+  <inkml:trace contextRef="#ctx0" brushRef="#br0">0 14,'0'-6,"0"-2</inkml:trace>
 </inkml:ink>
 </file>
 
@@ -4891,7 +4514,7 @@
         <p:spPr>
           <a:xfrm>
             <a:off x="6172200" y="2345719"/>
-            <a:ext cx="2900302" cy="1325563"/>
+            <a:ext cx="4546912" cy="1325563"/>
           </a:xfrm>
         </p:spPr>
         <p:txBody>
@@ -4906,7 +4529,7 @@
                   <a:srgbClr val="0E659B"/>
                 </a:solidFill>
               </a:rPr>
-              <a:t>&lt;TITLE&gt;</a:t>
+              <a:t>Space x Analysis</a:t>
             </a:r>
           </a:p>
         </p:txBody>
@@ -4975,7 +4598,7 @@
             </a:pPr>
             <a:r>
               <a:rPr lang="en-US" dirty="0"/>
-              <a:t>&lt;NAME&gt;</a:t>
+              <a:t>Andrew Gomoll</a:t>
             </a:r>
           </a:p>
           <a:p>
@@ -4984,7 +4607,7 @@
             </a:pPr>
             <a:r>
               <a:rPr lang="en-US" dirty="0"/>
-              <a:t>&lt;DATE&gt;</a:t>
+              <a:t>December 2022</a:t>
             </a:r>
           </a:p>
         </p:txBody>
@@ -4992,261 +4615,6 @@
       <mc:AlternateContent xmlns:mc="http://schemas.openxmlformats.org/markup-compatibility/2006" xmlns:p14="http://schemas.microsoft.com/office/powerpoint/2010/main">
         <mc:Choice Requires="p14">
           <p:contentPart p14:bwMode="auto" r:id="rId4">
-            <p14:nvContentPartPr>
-              <p14:cNvPr id="6" name="Ink 5">
-                <a:extLst>
-                  <a:ext uri="{FF2B5EF4-FFF2-40B4-BE49-F238E27FC236}">
-                    <a16:creationId xmlns:a16="http://schemas.microsoft.com/office/drawing/2014/main" id="{BB9E41AB-16C2-481D-B8C5-779DDB04601D}"/>
-                  </a:ext>
-                </a:extLst>
-              </p14:cNvPr>
-              <p14:cNvContentPartPr/>
-              <p14:nvPr/>
-            </p14:nvContentPartPr>
-            <p14:xfrm>
-              <a:off x="1388880" y="6545472"/>
-              <a:ext cx="1390320" cy="112320"/>
-            </p14:xfrm>
-          </p:contentPart>
-        </mc:Choice>
-        <mc:Fallback xmlns="">
-          <p:pic>
-            <p:nvPicPr>
-              <p:cNvPr id="6" name="Ink 5">
-                <a:extLst>
-                  <a:ext uri="{FF2B5EF4-FFF2-40B4-BE49-F238E27FC236}">
-                    <a16:creationId xmlns:a16="http://schemas.microsoft.com/office/drawing/2014/main" id="{BB9E41AB-16C2-481D-B8C5-779DDB04601D}"/>
-                  </a:ext>
-                </a:extLst>
-              </p:cNvPr>
-              <p:cNvPicPr/>
-              <p:nvPr/>
-            </p:nvPicPr>
-            <p:blipFill>
-              <a:blip r:embed="rId6"/>
-              <a:stretch>
-                <a:fillRect/>
-              </a:stretch>
-            </p:blipFill>
-            <p:spPr>
-              <a:xfrm>
-                <a:off x="1335240" y="6437472"/>
-                <a:ext cx="1497960" cy="327960"/>
-              </a:xfrm>
-              <a:prstGeom prst="rect">
-                <a:avLst/>
-              </a:prstGeom>
-            </p:spPr>
-          </p:pic>
-        </mc:Fallback>
-      </mc:AlternateContent>
-      <mc:AlternateContent xmlns:mc="http://schemas.openxmlformats.org/markup-compatibility/2006" xmlns:p14="http://schemas.microsoft.com/office/powerpoint/2010/main">
-        <mc:Choice Requires="p14">
-          <p:contentPart p14:bwMode="auto" r:id="rId7">
-            <p14:nvContentPartPr>
-              <p14:cNvPr id="7" name="Ink 6">
-                <a:extLst>
-                  <a:ext uri="{FF2B5EF4-FFF2-40B4-BE49-F238E27FC236}">
-                    <a16:creationId xmlns:a16="http://schemas.microsoft.com/office/drawing/2014/main" id="{90DC8B94-332B-48F1-BD44-5D8DC140F977}"/>
-                  </a:ext>
-                </a:extLst>
-              </p14:cNvPr>
-              <p14:cNvContentPartPr/>
-              <p14:nvPr/>
-            </p14:nvContentPartPr>
-            <p14:xfrm>
-              <a:off x="2218680" y="6595872"/>
-              <a:ext cx="360" cy="360"/>
-            </p14:xfrm>
-          </p:contentPart>
-        </mc:Choice>
-        <mc:Fallback xmlns="">
-          <p:pic>
-            <p:nvPicPr>
-              <p:cNvPr id="7" name="Ink 6">
-                <a:extLst>
-                  <a:ext uri="{FF2B5EF4-FFF2-40B4-BE49-F238E27FC236}">
-                    <a16:creationId xmlns:a16="http://schemas.microsoft.com/office/drawing/2014/main" id="{90DC8B94-332B-48F1-BD44-5D8DC140F977}"/>
-                  </a:ext>
-                </a:extLst>
-              </p:cNvPr>
-              <p:cNvPicPr/>
-              <p:nvPr/>
-            </p:nvPicPr>
-            <p:blipFill>
-              <a:blip r:embed="rId8"/>
-              <a:stretch>
-                <a:fillRect/>
-              </a:stretch>
-            </p:blipFill>
-            <p:spPr>
-              <a:xfrm>
-                <a:off x="2164680" y="6487872"/>
-                <a:ext cx="108000" cy="216000"/>
-              </a:xfrm>
-              <a:prstGeom prst="rect">
-                <a:avLst/>
-              </a:prstGeom>
-            </p:spPr>
-          </p:pic>
-        </mc:Fallback>
-      </mc:AlternateContent>
-      <mc:AlternateContent xmlns:mc="http://schemas.openxmlformats.org/markup-compatibility/2006" xmlns:p14="http://schemas.microsoft.com/office/powerpoint/2010/main">
-        <mc:Choice Requires="p14">
-          <p:contentPart p14:bwMode="auto" r:id="rId9">
-            <p14:nvContentPartPr>
-              <p14:cNvPr id="8" name="Ink 7">
-                <a:extLst>
-                  <a:ext uri="{FF2B5EF4-FFF2-40B4-BE49-F238E27FC236}">
-                    <a16:creationId xmlns:a16="http://schemas.microsoft.com/office/drawing/2014/main" id="{E975E1FA-D9DC-4E9B-96CB-AF4B208FDD0D}"/>
-                  </a:ext>
-                </a:extLst>
-              </p14:cNvPr>
-              <p14:cNvContentPartPr/>
-              <p14:nvPr/>
-            </p14:nvContentPartPr>
-            <p14:xfrm>
-              <a:off x="2169720" y="6582912"/>
-              <a:ext cx="360" cy="360"/>
-            </p14:xfrm>
-          </p:contentPart>
-        </mc:Choice>
-        <mc:Fallback xmlns="">
-          <p:pic>
-            <p:nvPicPr>
-              <p:cNvPr id="8" name="Ink 7">
-                <a:extLst>
-                  <a:ext uri="{FF2B5EF4-FFF2-40B4-BE49-F238E27FC236}">
-                    <a16:creationId xmlns:a16="http://schemas.microsoft.com/office/drawing/2014/main" id="{E975E1FA-D9DC-4E9B-96CB-AF4B208FDD0D}"/>
-                  </a:ext>
-                </a:extLst>
-              </p:cNvPr>
-              <p:cNvPicPr/>
-              <p:nvPr/>
-            </p:nvPicPr>
-            <p:blipFill>
-              <a:blip r:embed="rId8"/>
-              <a:stretch>
-                <a:fillRect/>
-              </a:stretch>
-            </p:blipFill>
-            <p:spPr>
-              <a:xfrm>
-                <a:off x="2115720" y="6475272"/>
-                <a:ext cx="108000" cy="216000"/>
-              </a:xfrm>
-              <a:prstGeom prst="rect">
-                <a:avLst/>
-              </a:prstGeom>
-            </p:spPr>
-          </p:pic>
-        </mc:Fallback>
-      </mc:AlternateContent>
-      <mc:AlternateContent xmlns:mc="http://schemas.openxmlformats.org/markup-compatibility/2006" xmlns:p14="http://schemas.microsoft.com/office/powerpoint/2010/main">
-        <mc:Choice Requires="p14">
-          <p:contentPart p14:bwMode="auto" r:id="rId10">
-            <p14:nvContentPartPr>
-              <p14:cNvPr id="9" name="Ink 8">
-                <a:extLst>
-                  <a:ext uri="{FF2B5EF4-FFF2-40B4-BE49-F238E27FC236}">
-                    <a16:creationId xmlns:a16="http://schemas.microsoft.com/office/drawing/2014/main" id="{454E5C77-5960-45F2-A8F4-437BBCEB11F6}"/>
-                  </a:ext>
-                </a:extLst>
-              </p14:cNvPr>
-              <p14:cNvContentPartPr/>
-              <p14:nvPr/>
-            </p14:nvContentPartPr>
-            <p14:xfrm>
-              <a:off x="2169720" y="6582912"/>
-              <a:ext cx="360" cy="360"/>
-            </p14:xfrm>
-          </p:contentPart>
-        </mc:Choice>
-        <mc:Fallback xmlns="">
-          <p:pic>
-            <p:nvPicPr>
-              <p:cNvPr id="9" name="Ink 8">
-                <a:extLst>
-                  <a:ext uri="{FF2B5EF4-FFF2-40B4-BE49-F238E27FC236}">
-                    <a16:creationId xmlns:a16="http://schemas.microsoft.com/office/drawing/2014/main" id="{454E5C77-5960-45F2-A8F4-437BBCEB11F6}"/>
-                  </a:ext>
-                </a:extLst>
-              </p:cNvPr>
-              <p:cNvPicPr/>
-              <p:nvPr/>
-            </p:nvPicPr>
-            <p:blipFill>
-              <a:blip r:embed="rId8"/>
-              <a:stretch>
-                <a:fillRect/>
-              </a:stretch>
-            </p:blipFill>
-            <p:spPr>
-              <a:xfrm>
-                <a:off x="2115720" y="6475272"/>
-                <a:ext cx="108000" cy="216000"/>
-              </a:xfrm>
-              <a:prstGeom prst="rect">
-                <a:avLst/>
-              </a:prstGeom>
-            </p:spPr>
-          </p:pic>
-        </mc:Fallback>
-      </mc:AlternateContent>
-      <mc:AlternateContent xmlns:mc="http://schemas.openxmlformats.org/markup-compatibility/2006" xmlns:p14="http://schemas.microsoft.com/office/powerpoint/2010/main">
-        <mc:Choice Requires="p14">
-          <p:contentPart p14:bwMode="auto" r:id="rId11">
-            <p14:nvContentPartPr>
-              <p14:cNvPr id="10" name="Ink 9">
-                <a:extLst>
-                  <a:ext uri="{FF2B5EF4-FFF2-40B4-BE49-F238E27FC236}">
-                    <a16:creationId xmlns:a16="http://schemas.microsoft.com/office/drawing/2014/main" id="{0599CA86-0AA4-43B0-9BD8-C408990EDF1F}"/>
-                  </a:ext>
-                </a:extLst>
-              </p14:cNvPr>
-              <p14:cNvContentPartPr/>
-              <p14:nvPr/>
-            </p14:nvContentPartPr>
-            <p14:xfrm>
-              <a:off x="2169720" y="6582912"/>
-              <a:ext cx="360" cy="360"/>
-            </p14:xfrm>
-          </p:contentPart>
-        </mc:Choice>
-        <mc:Fallback xmlns="">
-          <p:pic>
-            <p:nvPicPr>
-              <p:cNvPr id="10" name="Ink 9">
-                <a:extLst>
-                  <a:ext uri="{FF2B5EF4-FFF2-40B4-BE49-F238E27FC236}">
-                    <a16:creationId xmlns:a16="http://schemas.microsoft.com/office/drawing/2014/main" id="{0599CA86-0AA4-43B0-9BD8-C408990EDF1F}"/>
-                  </a:ext>
-                </a:extLst>
-              </p:cNvPr>
-              <p:cNvPicPr/>
-              <p:nvPr/>
-            </p:nvPicPr>
-            <p:blipFill>
-              <a:blip r:embed="rId8"/>
-              <a:stretch>
-                <a:fillRect/>
-              </a:stretch>
-            </p:blipFill>
-            <p:spPr>
-              <a:xfrm>
-                <a:off x="2115720" y="6475272"/>
-                <a:ext cx="108000" cy="216000"/>
-              </a:xfrm>
-              <a:prstGeom prst="rect">
-                <a:avLst/>
-              </a:prstGeom>
-            </p:spPr>
-          </p:pic>
-        </mc:Fallback>
-      </mc:AlternateContent>
-      <mc:AlternateContent xmlns:mc="http://schemas.openxmlformats.org/markup-compatibility/2006" xmlns:p14="http://schemas.microsoft.com/office/powerpoint/2010/main">
-        <mc:Choice Requires="p14">
-          <p:contentPart p14:bwMode="auto" r:id="rId12">
             <p14:nvContentPartPr>
               <p14:cNvPr id="13" name="Ink 12">
                 <a:extLst>
@@ -6823,19 +6191,17 @@
       </p:sp>
       <p:pic>
         <p:nvPicPr>
-          <p:cNvPr id="3" name="Content Placeholder 2">
+          <p:cNvPr id="8" name="Picture 7" descr="Three friends studying at cafe">
             <a:extLst>
               <a:ext uri="{FF2B5EF4-FFF2-40B4-BE49-F238E27FC236}">
-                <a16:creationId xmlns:a16="http://schemas.microsoft.com/office/drawing/2014/main" id="{22E5FA6B-CA5C-4FB5-AAB3-8260D2EF86C9}"/>
+                <a16:creationId xmlns:a16="http://schemas.microsoft.com/office/drawing/2014/main" id="{97A34E20-E9DC-2EED-8BA3-E21F07654771}"/>
               </a:ext>
             </a:extLst>
           </p:cNvPr>
           <p:cNvPicPr>
-            <a:picLocks noGrp="1" noChangeAspect="1"/>
+            <a:picLocks noChangeAspect="1"/>
           </p:cNvPicPr>
-          <p:nvPr>
-            <p:ph sz="half" idx="1"/>
-          </p:nvPr>
+          <p:nvPr/>
         </p:nvPicPr>
         <p:blipFill>
           <a:blip r:embed="rId2"/>
@@ -6845,21 +6211,20 @@
         </p:blipFill>
         <p:spPr>
           <a:xfrm>
-            <a:off x="1253331" y="1825625"/>
-            <a:ext cx="4351338" cy="4351338"/>
+            <a:off x="990600" y="2483128"/>
+            <a:ext cx="4675013" cy="3113631"/>
           </a:xfrm>
           <a:prstGeom prst="rect">
             <a:avLst/>
           </a:prstGeom>
-          <a:noFill/>
         </p:spPr>
       </p:pic>
       <p:sp>
         <p:nvSpPr>
-          <p:cNvPr id="5" name="Content Placeholder 3">
+          <p:cNvPr id="10" name="Content Placeholder 9">
             <a:extLst>
               <a:ext uri="{FF2B5EF4-FFF2-40B4-BE49-F238E27FC236}">
-                <a16:creationId xmlns:a16="http://schemas.microsoft.com/office/drawing/2014/main" id="{28684E62-A9F8-4E7A-AB01-78893062A1B4}"/>
+                <a16:creationId xmlns:a16="http://schemas.microsoft.com/office/drawing/2014/main" id="{FB4094E2-6699-7815-10F5-8F90032C90BF}"/>
               </a:ext>
             </a:extLst>
           </p:cNvPr>
@@ -6870,17 +6235,12 @@
             <p:ph sz="half" idx="2"/>
           </p:nvPr>
         </p:nvSpPr>
-        <p:spPr>
-          <a:xfrm>
-            <a:off x="6172200" y="1825625"/>
-            <a:ext cx="5181600" cy="4351338"/>
-          </a:xfrm>
-        </p:spPr>
+        <p:spPr/>
         <p:txBody>
           <a:bodyPr/>
           <a:lstStyle/>
           <a:p>
-            <a:endParaRPr lang="en-US" dirty="0"/>
+            <a:endParaRPr lang="en-US"/>
           </a:p>
         </p:txBody>
       </p:sp>
@@ -7485,36 +6845,6 @@
           <a:chExt cx="0" cy="0"/>
         </a:xfrm>
       </p:grpSpPr>
-      <p:pic>
-        <p:nvPicPr>
-          <p:cNvPr id="4" name="Picture 3">
-            <a:extLst>
-              <a:ext uri="{FF2B5EF4-FFF2-40B4-BE49-F238E27FC236}">
-                <a16:creationId xmlns:a16="http://schemas.microsoft.com/office/drawing/2014/main" id="{9B37F9FA-3571-49C2-8811-B1159FCC0D6D}"/>
-              </a:ext>
-            </a:extLst>
-          </p:cNvPr>
-          <p:cNvPicPr>
-            <a:picLocks noChangeAspect="1"/>
-          </p:cNvPicPr>
-          <p:nvPr/>
-        </p:nvPicPr>
-        <p:blipFill>
-          <a:blip r:embed="rId2"/>
-          <a:stretch>
-            <a:fillRect/>
-          </a:stretch>
-        </p:blipFill>
-        <p:spPr>
-          <a:xfrm>
-            <a:off x="1450711" y="2025672"/>
-            <a:ext cx="3194581" cy="3194581"/>
-          </a:xfrm>
-          <a:prstGeom prst="rect">
-            <a:avLst/>
-          </a:prstGeom>
-        </p:spPr>
-      </p:pic>
       <p:sp>
         <p:nvSpPr>
           <p:cNvPr id="2" name="Title 1">
@@ -7644,211 +6974,7 @@
       </p:sp>
       <mc:AlternateContent xmlns:mc="http://schemas.openxmlformats.org/markup-compatibility/2006" xmlns:p14="http://schemas.microsoft.com/office/powerpoint/2010/main">
         <mc:Choice Requires="p14">
-          <p:contentPart p14:bwMode="auto" r:id="rId3">
-            <p14:nvContentPartPr>
-              <p14:cNvPr id="9" name="Ink 8">
-                <a:extLst>
-                  <a:ext uri="{FF2B5EF4-FFF2-40B4-BE49-F238E27FC236}">
-                    <a16:creationId xmlns:a16="http://schemas.microsoft.com/office/drawing/2014/main" id="{1A185CBD-ED91-4F24-BEB9-8E33AD8AC3B1}"/>
-                  </a:ext>
-                </a:extLst>
-              </p14:cNvPr>
-              <p14:cNvContentPartPr/>
-              <p14:nvPr/>
-            </p14:nvContentPartPr>
-            <p14:xfrm>
-              <a:off x="1889280" y="999312"/>
-              <a:ext cx="360" cy="360"/>
-            </p14:xfrm>
-          </p:contentPart>
-        </mc:Choice>
-        <mc:Fallback xmlns="">
-          <p:pic>
-            <p:nvPicPr>
-              <p:cNvPr id="9" name="Ink 8">
-                <a:extLst>
-                  <a:ext uri="{FF2B5EF4-FFF2-40B4-BE49-F238E27FC236}">
-                    <a16:creationId xmlns:a16="http://schemas.microsoft.com/office/drawing/2014/main" id="{1A185CBD-ED91-4F24-BEB9-8E33AD8AC3B1}"/>
-                  </a:ext>
-                </a:extLst>
-              </p:cNvPr>
-              <p:cNvPicPr/>
-              <p:nvPr/>
-            </p:nvPicPr>
-            <p:blipFill>
-              <a:blip r:embed="rId7"/>
-              <a:stretch>
-                <a:fillRect/>
-              </a:stretch>
-            </p:blipFill>
-            <p:spPr>
-              <a:xfrm>
-                <a:off x="1799280" y="819312"/>
-                <a:ext cx="180000" cy="360000"/>
-              </a:xfrm>
-              <a:prstGeom prst="rect">
-                <a:avLst/>
-              </a:prstGeom>
-            </p:spPr>
-          </p:pic>
-        </mc:Fallback>
-      </mc:AlternateContent>
-      <mc:AlternateContent xmlns:mc="http://schemas.openxmlformats.org/markup-compatibility/2006" xmlns:p14="http://schemas.microsoft.com/office/powerpoint/2010/main">
-        <mc:Choice Requires="p14">
-          <p:contentPart p14:bwMode="auto" r:id="rId8">
-            <p14:nvContentPartPr>
-              <p14:cNvPr id="10" name="Ink 9">
-                <a:extLst>
-                  <a:ext uri="{FF2B5EF4-FFF2-40B4-BE49-F238E27FC236}">
-                    <a16:creationId xmlns:a16="http://schemas.microsoft.com/office/drawing/2014/main" id="{032BD37A-4777-4658-98DC-561C88BBD6B5}"/>
-                  </a:ext>
-                </a:extLst>
-              </p14:cNvPr>
-              <p14:cNvContentPartPr/>
-              <p14:nvPr/>
-            </p14:nvContentPartPr>
-            <p14:xfrm>
-              <a:off x="2328120" y="962952"/>
-              <a:ext cx="360" cy="360"/>
-            </p14:xfrm>
-          </p:contentPart>
-        </mc:Choice>
-        <mc:Fallback xmlns="">
-          <p:pic>
-            <p:nvPicPr>
-              <p:cNvPr id="10" name="Ink 9">
-                <a:extLst>
-                  <a:ext uri="{FF2B5EF4-FFF2-40B4-BE49-F238E27FC236}">
-                    <a16:creationId xmlns:a16="http://schemas.microsoft.com/office/drawing/2014/main" id="{032BD37A-4777-4658-98DC-561C88BBD6B5}"/>
-                  </a:ext>
-                </a:extLst>
-              </p:cNvPr>
-              <p:cNvPicPr/>
-              <p:nvPr/>
-            </p:nvPicPr>
-            <p:blipFill>
-              <a:blip r:embed="rId7"/>
-              <a:stretch>
-                <a:fillRect/>
-              </a:stretch>
-            </p:blipFill>
-            <p:spPr>
-              <a:xfrm>
-                <a:off x="2238120" y="783312"/>
-                <a:ext cx="180000" cy="360000"/>
-              </a:xfrm>
-              <a:prstGeom prst="rect">
-                <a:avLst/>
-              </a:prstGeom>
-            </p:spPr>
-          </p:pic>
-        </mc:Fallback>
-      </mc:AlternateContent>
-      <mc:AlternateContent xmlns:mc="http://schemas.openxmlformats.org/markup-compatibility/2006" xmlns:p14="http://schemas.microsoft.com/office/powerpoint/2010/main">
-        <mc:Choice Requires="p14">
-          <p:contentPart p14:bwMode="auto" r:id="rId9">
-            <p14:nvContentPartPr>
-              <p14:cNvPr id="11" name="Ink 10">
-                <a:extLst>
-                  <a:ext uri="{FF2B5EF4-FFF2-40B4-BE49-F238E27FC236}">
-                    <a16:creationId xmlns:a16="http://schemas.microsoft.com/office/drawing/2014/main" id="{8D6F0DE4-0F5C-4DBC-980B-FA84561A37BD}"/>
-                  </a:ext>
-                </a:extLst>
-              </p14:cNvPr>
-              <p14:cNvContentPartPr/>
-              <p14:nvPr/>
-            </p14:nvContentPartPr>
-            <p14:xfrm>
-              <a:off x="2828160" y="926232"/>
-              <a:ext cx="360" cy="360"/>
-            </p14:xfrm>
-          </p:contentPart>
-        </mc:Choice>
-        <mc:Fallback xmlns="">
-          <p:pic>
-            <p:nvPicPr>
-              <p:cNvPr id="11" name="Ink 10">
-                <a:extLst>
-                  <a:ext uri="{FF2B5EF4-FFF2-40B4-BE49-F238E27FC236}">
-                    <a16:creationId xmlns:a16="http://schemas.microsoft.com/office/drawing/2014/main" id="{8D6F0DE4-0F5C-4DBC-980B-FA84561A37BD}"/>
-                  </a:ext>
-                </a:extLst>
-              </p:cNvPr>
-              <p:cNvPicPr/>
-              <p:nvPr/>
-            </p:nvPicPr>
-            <p:blipFill>
-              <a:blip r:embed="rId7"/>
-              <a:stretch>
-                <a:fillRect/>
-              </a:stretch>
-            </p:blipFill>
-            <p:spPr>
-              <a:xfrm>
-                <a:off x="2738160" y="746232"/>
-                <a:ext cx="180000" cy="360000"/>
-              </a:xfrm>
-              <a:prstGeom prst="rect">
-                <a:avLst/>
-              </a:prstGeom>
-            </p:spPr>
-          </p:pic>
-        </mc:Fallback>
-      </mc:AlternateContent>
-      <mc:AlternateContent xmlns:mc="http://schemas.openxmlformats.org/markup-compatibility/2006" xmlns:p14="http://schemas.microsoft.com/office/powerpoint/2010/main">
-        <mc:Choice Requires="p14">
-          <p:contentPart p14:bwMode="auto" r:id="rId10">
-            <p14:nvContentPartPr>
-              <p14:cNvPr id="12" name="Ink 11">
-                <a:extLst>
-                  <a:ext uri="{FF2B5EF4-FFF2-40B4-BE49-F238E27FC236}">
-                    <a16:creationId xmlns:a16="http://schemas.microsoft.com/office/drawing/2014/main" id="{24F830F4-CC15-48E6-AB15-04ED683CA04A}"/>
-                  </a:ext>
-                </a:extLst>
-              </p14:cNvPr>
-              <p14:cNvContentPartPr/>
-              <p14:nvPr/>
-            </p14:nvContentPartPr>
-            <p14:xfrm>
-              <a:off x="2828160" y="926232"/>
-              <a:ext cx="3240" cy="5040"/>
-            </p14:xfrm>
-          </p:contentPart>
-        </mc:Choice>
-        <mc:Fallback xmlns="">
-          <p:pic>
-            <p:nvPicPr>
-              <p:cNvPr id="12" name="Ink 11">
-                <a:extLst>
-                  <a:ext uri="{FF2B5EF4-FFF2-40B4-BE49-F238E27FC236}">
-                    <a16:creationId xmlns:a16="http://schemas.microsoft.com/office/drawing/2014/main" id="{24F830F4-CC15-48E6-AB15-04ED683CA04A}"/>
-                  </a:ext>
-                </a:extLst>
-              </p:cNvPr>
-              <p:cNvPicPr/>
-              <p:nvPr/>
-            </p:nvPicPr>
-            <p:blipFill>
-              <a:blip r:embed="rId11"/>
-              <a:stretch>
-                <a:fillRect/>
-              </a:stretch>
-            </p:blipFill>
-            <p:spPr>
-              <a:xfrm>
-                <a:off x="2738160" y="746232"/>
-                <a:ext cx="182880" cy="364680"/>
-              </a:xfrm>
-              <a:prstGeom prst="rect">
-                <a:avLst/>
-              </a:prstGeom>
-            </p:spPr>
-          </p:pic>
-        </mc:Fallback>
-      </mc:AlternateContent>
-      <mc:AlternateContent xmlns:mc="http://schemas.openxmlformats.org/markup-compatibility/2006" xmlns:p14="http://schemas.microsoft.com/office/powerpoint/2010/main">
-        <mc:Choice Requires="p14">
-          <p:contentPart p14:bwMode="auto" r:id="rId12">
+          <p:contentPart p14:bwMode="auto" r:id="rId2">
             <p14:nvContentPartPr>
               <p14:cNvPr id="13" name="Ink 12">
                 <a:extLst>
@@ -7897,162 +7023,9 @@
           </p:pic>
         </mc:Fallback>
       </mc:AlternateContent>
-      <mc:AlternateContent xmlns:mc="http://schemas.openxmlformats.org/markup-compatibility/2006" xmlns:p14="http://schemas.microsoft.com/office/powerpoint/2010/main">
-        <mc:Choice Requires="p14">
+      <mc:AlternateContent xmlns:mc="http://schemas.openxmlformats.org/markup-compatibility/2006">
+        <mc:Choice xmlns:p14="http://schemas.microsoft.com/office/powerpoint/2010/main" Requires="p14">
           <p:contentPart p14:bwMode="auto" r:id="rId14">
-            <p14:nvContentPartPr>
-              <p14:cNvPr id="14" name="Ink 13">
-                <a:extLst>
-                  <a:ext uri="{FF2B5EF4-FFF2-40B4-BE49-F238E27FC236}">
-                    <a16:creationId xmlns:a16="http://schemas.microsoft.com/office/drawing/2014/main" id="{97E9F6ED-ACEE-438F-A76C-C66263E59B33}"/>
-                  </a:ext>
-                </a:extLst>
-              </p14:cNvPr>
-              <p14:cNvContentPartPr/>
-              <p14:nvPr/>
-            </p14:nvContentPartPr>
-            <p14:xfrm>
-              <a:off x="7266240" y="2888952"/>
-              <a:ext cx="360" cy="360"/>
-            </p14:xfrm>
-          </p:contentPart>
-        </mc:Choice>
-        <mc:Fallback xmlns="">
-          <p:pic>
-            <p:nvPicPr>
-              <p:cNvPr id="14" name="Ink 13">
-                <a:extLst>
-                  <a:ext uri="{FF2B5EF4-FFF2-40B4-BE49-F238E27FC236}">
-                    <a16:creationId xmlns:a16="http://schemas.microsoft.com/office/drawing/2014/main" id="{97E9F6ED-ACEE-438F-A76C-C66263E59B33}"/>
-                  </a:ext>
-                </a:extLst>
-              </p:cNvPr>
-              <p:cNvPicPr/>
-              <p:nvPr/>
-            </p:nvPicPr>
-            <p:blipFill>
-              <a:blip r:embed="rId7"/>
-              <a:stretch>
-                <a:fillRect/>
-              </a:stretch>
-            </p:blipFill>
-            <p:spPr>
-              <a:xfrm>
-                <a:off x="7176240" y="2709312"/>
-                <a:ext cx="180000" cy="360000"/>
-              </a:xfrm>
-              <a:prstGeom prst="rect">
-                <a:avLst/>
-              </a:prstGeom>
-            </p:spPr>
-          </p:pic>
-        </mc:Fallback>
-      </mc:AlternateContent>
-      <mc:AlternateContent xmlns:mc="http://schemas.openxmlformats.org/markup-compatibility/2006" xmlns:p14="http://schemas.microsoft.com/office/powerpoint/2010/main">
-        <mc:Choice Requires="p14">
-          <p:contentPart p14:bwMode="auto" r:id="rId15">
-            <p14:nvContentPartPr>
-              <p14:cNvPr id="15" name="Ink 14">
-                <a:extLst>
-                  <a:ext uri="{FF2B5EF4-FFF2-40B4-BE49-F238E27FC236}">
-                    <a16:creationId xmlns:a16="http://schemas.microsoft.com/office/drawing/2014/main" id="{EA56CB11-8AE3-4EA0-B556-BBB572803B07}"/>
-                  </a:ext>
-                </a:extLst>
-              </p14:cNvPr>
-              <p14:cNvContentPartPr/>
-              <p14:nvPr/>
-            </p14:nvContentPartPr>
-            <p14:xfrm>
-              <a:off x="7266240" y="2888952"/>
-              <a:ext cx="360" cy="360"/>
-            </p14:xfrm>
-          </p:contentPart>
-        </mc:Choice>
-        <mc:Fallback xmlns="">
-          <p:pic>
-            <p:nvPicPr>
-              <p:cNvPr id="15" name="Ink 14">
-                <a:extLst>
-                  <a:ext uri="{FF2B5EF4-FFF2-40B4-BE49-F238E27FC236}">
-                    <a16:creationId xmlns:a16="http://schemas.microsoft.com/office/drawing/2014/main" id="{EA56CB11-8AE3-4EA0-B556-BBB572803B07}"/>
-                  </a:ext>
-                </a:extLst>
-              </p:cNvPr>
-              <p:cNvPicPr/>
-              <p:nvPr/>
-            </p:nvPicPr>
-            <p:blipFill>
-              <a:blip r:embed="rId7"/>
-              <a:stretch>
-                <a:fillRect/>
-              </a:stretch>
-            </p:blipFill>
-            <p:spPr>
-              <a:xfrm>
-                <a:off x="7176240" y="2709312"/>
-                <a:ext cx="180000" cy="360000"/>
-              </a:xfrm>
-              <a:prstGeom prst="rect">
-                <a:avLst/>
-              </a:prstGeom>
-            </p:spPr>
-          </p:pic>
-        </mc:Fallback>
-      </mc:AlternateContent>
-      <mc:AlternateContent xmlns:mc="http://schemas.openxmlformats.org/markup-compatibility/2006" xmlns:p14="http://schemas.microsoft.com/office/powerpoint/2010/main">
-        <mc:Choice Requires="p14">
-          <p:contentPart p14:bwMode="auto" r:id="rId16">
-            <p14:nvContentPartPr>
-              <p14:cNvPr id="16" name="Ink 15">
-                <a:extLst>
-                  <a:ext uri="{FF2B5EF4-FFF2-40B4-BE49-F238E27FC236}">
-                    <a16:creationId xmlns:a16="http://schemas.microsoft.com/office/drawing/2014/main" id="{78E27AEC-BDF9-49A4-A10A-6F5F64F01EEA}"/>
-                  </a:ext>
-                </a:extLst>
-              </p14:cNvPr>
-              <p14:cNvContentPartPr/>
-              <p14:nvPr/>
-            </p14:nvContentPartPr>
-            <p14:xfrm>
-              <a:off x="7266240" y="2888952"/>
-              <a:ext cx="360" cy="360"/>
-            </p14:xfrm>
-          </p:contentPart>
-        </mc:Choice>
-        <mc:Fallback xmlns="">
-          <p:pic>
-            <p:nvPicPr>
-              <p:cNvPr id="16" name="Ink 15">
-                <a:extLst>
-                  <a:ext uri="{FF2B5EF4-FFF2-40B4-BE49-F238E27FC236}">
-                    <a16:creationId xmlns:a16="http://schemas.microsoft.com/office/drawing/2014/main" id="{78E27AEC-BDF9-49A4-A10A-6F5F64F01EEA}"/>
-                  </a:ext>
-                </a:extLst>
-              </p:cNvPr>
-              <p:cNvPicPr/>
-              <p:nvPr/>
-            </p:nvPicPr>
-            <p:blipFill>
-              <a:blip r:embed="rId7"/>
-              <a:stretch>
-                <a:fillRect/>
-              </a:stretch>
-            </p:blipFill>
-            <p:spPr>
-              <a:xfrm>
-                <a:off x="7176240" y="2709312"/>
-                <a:ext cx="180000" cy="360000"/>
-              </a:xfrm>
-              <a:prstGeom prst="rect">
-                <a:avLst/>
-              </a:prstGeom>
-            </p:spPr>
-          </p:pic>
-        </mc:Fallback>
-      </mc:AlternateContent>
-      <mc:AlternateContent xmlns:mc="http://schemas.openxmlformats.org/markup-compatibility/2006" xmlns:p14="http://schemas.microsoft.com/office/powerpoint/2010/main">
-        <mc:Choice Requires="p14">
-          <p:contentPart p14:bwMode="auto" r:id="rId17">
             <p14:nvContentPartPr>
               <p14:cNvPr id="17" name="Ink 16">
                 <a:extLst>
@@ -8065,12 +7038,12 @@
               <p14:nvPr/>
             </p14:nvContentPartPr>
             <p14:xfrm>
-              <a:off x="7266240" y="2888952"/>
+              <a:off x="5002764" y="2876712"/>
               <a:ext cx="360" cy="360"/>
             </p14:xfrm>
           </p:contentPart>
         </mc:Choice>
-        <mc:Fallback xmlns="">
+        <mc:Fallback>
           <p:pic>
             <p:nvPicPr>
               <p:cNvPr id="17" name="Ink 16">
@@ -8084,14 +7057,14 @@
               <p:nvPr/>
             </p:nvPicPr>
             <p:blipFill>
-              <a:blip r:embed="rId7"/>
+              <a:blip r:embed="rId15"/>
               <a:stretch>
                 <a:fillRect/>
               </a:stretch>
             </p:blipFill>
             <p:spPr>
               <a:xfrm>
-                <a:off x="7176240" y="2709312"/>
+                <a:off x="4912764" y="2696712"/>
                 <a:ext cx="180000" cy="360000"/>
               </a:xfrm>
               <a:prstGeom prst="rect">
@@ -8101,57 +7074,36 @@
           </p:pic>
         </mc:Fallback>
       </mc:AlternateContent>
-      <mc:AlternateContent xmlns:mc="http://schemas.openxmlformats.org/markup-compatibility/2006" xmlns:p14="http://schemas.microsoft.com/office/powerpoint/2010/main">
-        <mc:Choice Requires="p14">
-          <p:contentPart p14:bwMode="auto" r:id="rId18">
-            <p14:nvContentPartPr>
-              <p14:cNvPr id="18" name="Ink 17">
-                <a:extLst>
-                  <a:ext uri="{FF2B5EF4-FFF2-40B4-BE49-F238E27FC236}">
-                    <a16:creationId xmlns:a16="http://schemas.microsoft.com/office/drawing/2014/main" id="{0EC3AB97-946C-4D62-AEB0-E11D486AFBF0}"/>
-                  </a:ext>
-                </a:extLst>
-              </p14:cNvPr>
-              <p14:cNvContentPartPr/>
-              <p14:nvPr/>
-            </p14:nvContentPartPr>
-            <p14:xfrm>
-              <a:off x="6680880" y="2877072"/>
-              <a:ext cx="360" cy="360"/>
-            </p14:xfrm>
-          </p:contentPart>
-        </mc:Choice>
-        <mc:Fallback xmlns="">
-          <p:pic>
-            <p:nvPicPr>
-              <p:cNvPr id="18" name="Ink 17">
-                <a:extLst>
-                  <a:ext uri="{FF2B5EF4-FFF2-40B4-BE49-F238E27FC236}">
-                    <a16:creationId xmlns:a16="http://schemas.microsoft.com/office/drawing/2014/main" id="{0EC3AB97-946C-4D62-AEB0-E11D486AFBF0}"/>
-                  </a:ext>
-                </a:extLst>
-              </p:cNvPr>
-              <p:cNvPicPr/>
-              <p:nvPr/>
-            </p:nvPicPr>
-            <p:blipFill>
-              <a:blip r:embed="rId7"/>
-              <a:stretch>
-                <a:fillRect/>
-              </a:stretch>
-            </p:blipFill>
-            <p:spPr>
-              <a:xfrm>
-                <a:off x="6591240" y="2697072"/>
-                <a:ext cx="180000" cy="360000"/>
-              </a:xfrm>
-              <a:prstGeom prst="rect">
-                <a:avLst/>
-              </a:prstGeom>
-            </p:spPr>
-          </p:pic>
-        </mc:Fallback>
-      </mc:AlternateContent>
+      <p:pic>
+        <p:nvPicPr>
+          <p:cNvPr id="8" name="Picture 7" descr="Silver metal newtons cradle">
+            <a:extLst>
+              <a:ext uri="{FF2B5EF4-FFF2-40B4-BE49-F238E27FC236}">
+                <a16:creationId xmlns:a16="http://schemas.microsoft.com/office/drawing/2014/main" id="{578ABD8D-6349-69F9-CB3E-CFF5FFE862A3}"/>
+              </a:ext>
+            </a:extLst>
+          </p:cNvPr>
+          <p:cNvPicPr>
+            <a:picLocks noChangeAspect="1"/>
+          </p:cNvPicPr>
+          <p:nvPr/>
+        </p:nvPicPr>
+        <p:blipFill>
+          <a:blip r:embed="rId16"/>
+          <a:stretch>
+            <a:fillRect/>
+          </a:stretch>
+        </p:blipFill>
+        <p:spPr>
+          <a:xfrm>
+            <a:off x="838200" y="2078576"/>
+            <a:ext cx="4796733" cy="3391440"/>
+          </a:xfrm>
+          <a:prstGeom prst="rect">
+            <a:avLst/>
+          </a:prstGeom>
+        </p:spPr>
+      </p:pic>
     </p:spTree>
     <p:extLst>
       <p:ext uri="{BB962C8B-B14F-4D97-AF65-F5344CB8AC3E}">
@@ -8414,10 +7366,10 @@
       </p:sp>
       <p:pic>
         <p:nvPicPr>
-          <p:cNvPr id="5" name="Picture 4">
+          <p:cNvPr id="6" name="Picture 5" descr="3D box skeletons">
             <a:extLst>
               <a:ext uri="{FF2B5EF4-FFF2-40B4-BE49-F238E27FC236}">
-                <a16:creationId xmlns:a16="http://schemas.microsoft.com/office/drawing/2014/main" id="{65078B9B-93A7-4517-9E78-2F5C028F2238}"/>
+                <a16:creationId xmlns:a16="http://schemas.microsoft.com/office/drawing/2014/main" id="{367CDF1F-8990-7474-757E-513A62AE4B5A}"/>
               </a:ext>
             </a:extLst>
           </p:cNvPr>
@@ -8434,8 +7386,8 @@
         </p:blipFill>
         <p:spPr>
           <a:xfrm>
-            <a:off x="1090494" y="2302762"/>
-            <a:ext cx="3194581" cy="3194581"/>
+            <a:off x="521755" y="2212330"/>
+            <a:ext cx="3653577" cy="2433339"/>
           </a:xfrm>
           <a:prstGeom prst="rect">
             <a:avLst/>
@@ -8507,36 +7459,6 @@
           </a:p>
         </p:txBody>
       </p:sp>
-      <p:pic>
-        <p:nvPicPr>
-          <p:cNvPr id="4" name="Picture 3">
-            <a:extLst>
-              <a:ext uri="{FF2B5EF4-FFF2-40B4-BE49-F238E27FC236}">
-                <a16:creationId xmlns:a16="http://schemas.microsoft.com/office/drawing/2014/main" id="{EE158731-59BB-48A2-A901-D7C35E91BA10}"/>
-              </a:ext>
-            </a:extLst>
-          </p:cNvPr>
-          <p:cNvPicPr>
-            <a:picLocks noChangeAspect="1"/>
-          </p:cNvPicPr>
-          <p:nvPr/>
-        </p:nvPicPr>
-        <p:blipFill>
-          <a:blip r:embed="rId2"/>
-          <a:stretch>
-            <a:fillRect/>
-          </a:stretch>
-        </p:blipFill>
-        <p:spPr>
-          <a:xfrm>
-            <a:off x="994347" y="2262036"/>
-            <a:ext cx="3054361" cy="3054361"/>
-          </a:xfrm>
-          <a:prstGeom prst="rect">
-            <a:avLst/>
-          </a:prstGeom>
-        </p:spPr>
-      </p:pic>
       <p:sp>
         <p:nvSpPr>
           <p:cNvPr id="5" name="Content Placeholder 2">
@@ -8562,7 +7484,7 @@
         </p:spPr>
         <p:txBody>
           <a:bodyPr vert="horz" lIns="91440" tIns="45720" rIns="91440" bIns="45720" rtlCol="0">
-            <a:normAutofit/>
+            <a:noAutofit/>
           </a:bodyPr>
           <a:lstStyle>
             <a:lvl1pPr marL="228600" indent="-228600" algn="l" defTabSz="914400" rtl="0" eaLnBrk="1" latinLnBrk="0" hangingPunct="1">
@@ -8730,45 +7652,109 @@
           </a:lstStyle>
           <a:p>
             <a:r>
-              <a:rPr lang="en-US" sz="2200"/>
-              <a:t>Point1</a:t>
-            </a:r>
-          </a:p>
-          <a:p>
-            <a:r>
-              <a:rPr lang="en-US" sz="2200"/>
-              <a:t>Point2</a:t>
-            </a:r>
-          </a:p>
-          <a:p>
-            <a:r>
-              <a:rPr lang="en-US" sz="2200"/>
-              <a:t>Point3</a:t>
-            </a:r>
-          </a:p>
-          <a:p>
-            <a:r>
-              <a:rPr lang="en-US" sz="2200"/>
-              <a:t>Point4</a:t>
-            </a:r>
-          </a:p>
-          <a:p>
-            <a:pPr lvl="1"/>
-            <a:r>
-              <a:rPr lang="en-US" sz="1800"/>
-              <a:t>Sub Point1</a:t>
-            </a:r>
-          </a:p>
-          <a:p>
-            <a:pPr lvl="1"/>
-            <a:r>
-              <a:rPr lang="en-US" sz="1800"/>
-              <a:t>Sub Point2</a:t>
+              <a:rPr lang="en-US" sz="1800" b="0" i="0" dirty="0">
+                <a:solidFill>
+                  <a:srgbClr val="24292F"/>
+                </a:solidFill>
+                <a:effectLst/>
+                <a:latin typeface="-apple-system"/>
+              </a:rPr>
+              <a:t>In recent years private and public companies have launched into the extra-terrestrial products and travel market creating a commercial space age.</a:t>
+            </a:r>
+          </a:p>
+          <a:p>
+            <a:r>
+              <a:rPr lang="en-US" sz="1800" b="0" i="0" dirty="0">
+                <a:solidFill>
+                  <a:srgbClr val="24292F"/>
+                </a:solidFill>
+                <a:effectLst/>
+                <a:latin typeface="-apple-system"/>
+              </a:rPr>
+              <a:t>For example, Virgin Galactic has offered some space flights, Rocket Labs provides small satellites, and Blue Origin manufactures reusable rockets.</a:t>
+            </a:r>
+          </a:p>
+          <a:p>
+            <a:r>
+              <a:rPr lang="en-US" sz="1800" b="0" i="0" dirty="0">
+                <a:solidFill>
+                  <a:srgbClr val="24292F"/>
+                </a:solidFill>
+                <a:effectLst/>
+                <a:latin typeface="-apple-system"/>
+              </a:rPr>
+              <a:t>In the same vein, Space X has sent spacecraft to the international space station as well as other manned missions to space.</a:t>
+            </a:r>
+          </a:p>
+          <a:p>
+            <a:r>
+              <a:rPr lang="en-US" sz="1800" b="0" i="0" dirty="0">
+                <a:solidFill>
+                  <a:srgbClr val="24292F"/>
+                </a:solidFill>
+                <a:effectLst/>
+                <a:latin typeface="-apple-system"/>
+              </a:rPr>
+              <a:t>Space X has been able to execute more launches than other providers as their signature rockets are reusable, allowing for relatively inexpensive missions. </a:t>
+            </a:r>
+          </a:p>
+          <a:p>
+            <a:r>
+              <a:rPr lang="en-US" sz="1800" b="0" i="0" dirty="0">
+                <a:solidFill>
+                  <a:srgbClr val="24292F"/>
+                </a:solidFill>
+                <a:effectLst/>
+                <a:latin typeface="-apple-system"/>
+              </a:rPr>
+              <a:t>Advertised at $62 million per launch, the Space X missions undercut competing providers with more expensive launches at $162 million.</a:t>
+            </a:r>
+          </a:p>
+          <a:p>
+            <a:r>
+              <a:rPr lang="en-US" sz="1800" b="0" i="0" dirty="0">
+                <a:solidFill>
+                  <a:srgbClr val="24292F"/>
+                </a:solidFill>
+                <a:effectLst/>
+                <a:latin typeface="-apple-system"/>
+              </a:rPr>
+              <a:t>This analysis aims to more accurately predict the price of each launch using data wrangling, analysis, and machine learning to predict the reusability of Space X rockets.</a:t>
             </a:r>
             <a:endParaRPr lang="en-US" sz="1800" dirty="0"/>
           </a:p>
         </p:txBody>
       </p:sp>
+      <p:pic>
+        <p:nvPicPr>
+          <p:cNvPr id="6" name="Picture 5" descr="One glowing light bulb among rows of unlit bulbs">
+            <a:extLst>
+              <a:ext uri="{FF2B5EF4-FFF2-40B4-BE49-F238E27FC236}">
+                <a16:creationId xmlns:a16="http://schemas.microsoft.com/office/drawing/2014/main" id="{F2BEFE17-AC6C-A455-37EA-174529F015E0}"/>
+              </a:ext>
+            </a:extLst>
+          </p:cNvPr>
+          <p:cNvPicPr>
+            <a:picLocks noChangeAspect="1"/>
+          </p:cNvPicPr>
+          <p:nvPr/>
+        </p:nvPicPr>
+        <p:blipFill>
+          <a:blip r:embed="rId2"/>
+          <a:stretch>
+            <a:fillRect/>
+          </a:stretch>
+        </p:blipFill>
+        <p:spPr>
+          <a:xfrm>
+            <a:off x="388883" y="2412123"/>
+            <a:ext cx="3652345" cy="2739259"/>
+          </a:xfrm>
+          <a:prstGeom prst="rect">
+            <a:avLst/>
+          </a:prstGeom>
+        </p:spPr>
+      </p:pic>
     </p:spTree>
     <p:extLst>
       <p:ext uri="{BB962C8B-B14F-4D97-AF65-F5344CB8AC3E}">
@@ -8903,10 +7889,10 @@
       </p:sp>
       <p:pic>
         <p:nvPicPr>
-          <p:cNvPr id="5" name="Picture 4">
+          <p:cNvPr id="8" name="Picture 7" descr="Aircraft jet engine turbine">
             <a:extLst>
               <a:ext uri="{FF2B5EF4-FFF2-40B4-BE49-F238E27FC236}">
-                <a16:creationId xmlns:a16="http://schemas.microsoft.com/office/drawing/2014/main" id="{33AE176B-DE78-4B75-AC9E-2A422E82D533}"/>
+                <a16:creationId xmlns:a16="http://schemas.microsoft.com/office/drawing/2014/main" id="{2AD7B5FB-4AC0-9DAB-D87B-21B4AF4DE70F}"/>
               </a:ext>
             </a:extLst>
           </p:cNvPr>
@@ -8923,8 +7909,8 @@
         </p:blipFill>
         <p:spPr>
           <a:xfrm>
-            <a:off x="979655" y="1831709"/>
-            <a:ext cx="3194581" cy="3194581"/>
+            <a:off x="782053" y="2286000"/>
+            <a:ext cx="3227490" cy="2149558"/>
           </a:xfrm>
           <a:prstGeom prst="rect">
             <a:avLst/>

</xml_diff>

<commit_message>
Adding details to report
</commit_message>
<xml_diff>
--- a/AG_capstone-story.pptx
+++ b/AG_capstone-story.pptx
@@ -5,7 +5,7 @@
     <p:sldMasterId id="2147483660" r:id="rId4"/>
   </p:sldMasterIdLst>
   <p:notesMasterIdLst>
-    <p:notesMasterId r:id="rId25"/>
+    <p:notesMasterId r:id="rId27"/>
   </p:notesMasterIdLst>
   <p:sldIdLst>
     <p:sldId id="256" r:id="rId5"/>
@@ -14,20 +14,22 @@
     <p:sldId id="261" r:id="rId8"/>
     <p:sldId id="262" r:id="rId9"/>
     <p:sldId id="263" r:id="rId10"/>
-    <p:sldId id="258" r:id="rId11"/>
-    <p:sldId id="264" r:id="rId12"/>
-    <p:sldId id="278" r:id="rId13"/>
-    <p:sldId id="279" r:id="rId14"/>
-    <p:sldId id="267" r:id="rId15"/>
-    <p:sldId id="268" r:id="rId16"/>
-    <p:sldId id="269" r:id="rId17"/>
-    <p:sldId id="270" r:id="rId18"/>
-    <p:sldId id="272" r:id="rId19"/>
-    <p:sldId id="273" r:id="rId20"/>
-    <p:sldId id="274" r:id="rId21"/>
-    <p:sldId id="275" r:id="rId22"/>
-    <p:sldId id="276" r:id="rId23"/>
-    <p:sldId id="277" r:id="rId24"/>
+    <p:sldId id="280" r:id="rId11"/>
+    <p:sldId id="281" r:id="rId12"/>
+    <p:sldId id="258" r:id="rId13"/>
+    <p:sldId id="264" r:id="rId14"/>
+    <p:sldId id="278" r:id="rId15"/>
+    <p:sldId id="279" r:id="rId16"/>
+    <p:sldId id="267" r:id="rId17"/>
+    <p:sldId id="268" r:id="rId18"/>
+    <p:sldId id="269" r:id="rId19"/>
+    <p:sldId id="270" r:id="rId20"/>
+    <p:sldId id="272" r:id="rId21"/>
+    <p:sldId id="273" r:id="rId22"/>
+    <p:sldId id="274" r:id="rId23"/>
+    <p:sldId id="275" r:id="rId24"/>
+    <p:sldId id="276" r:id="rId25"/>
+    <p:sldId id="277" r:id="rId26"/>
   </p:sldIdLst>
   <p:sldSz cx="12192000" cy="6858000"/>
   <p:notesSz cx="6858000" cy="1857375"/>
@@ -5527,12 +5529,14 @@
         </p:nvSpPr>
         <p:spPr/>
         <p:txBody>
-          <a:bodyPr/>
+          <a:bodyPr>
+            <a:normAutofit/>
+          </a:bodyPr>
           <a:lstStyle/>
           <a:p>
             <a:r>
-              <a:rPr lang="en-US" dirty="0"/>
-              <a:t>DATABASE TRENDS - FINDINGS &amp; IMPLICATIONS</a:t>
+              <a:rPr lang="en-US" sz="2800" dirty="0"/>
+              <a:t>PROGRAMMING LANGUAGE TRENDS - FINDINGS &amp; IMPLICATIONS</a:t>
             </a:r>
           </a:p>
         </p:txBody>
@@ -5655,7 +5659,7 @@
     </p:spTree>
     <p:extLst>
       <p:ext uri="{BB962C8B-B14F-4D97-AF65-F5344CB8AC3E}">
-        <p14:creationId xmlns:p14="http://schemas.microsoft.com/office/powerpoint/2010/main" val="2659604895"/>
+        <p14:creationId xmlns:p14="http://schemas.microsoft.com/office/powerpoint/2010/main" val="545569246"/>
       </p:ext>
     </p:extLst>
   </p:cSld>
@@ -5687,7 +5691,7 @@
           <p:cNvPr id="2" name="Title 1">
             <a:extLst>
               <a:ext uri="{FF2B5EF4-FFF2-40B4-BE49-F238E27FC236}">
-                <a16:creationId xmlns:a16="http://schemas.microsoft.com/office/drawing/2014/main" id="{2873BEC0-94F5-4226-A9E7-51B66045EF49}"/>
+                <a16:creationId xmlns:a16="http://schemas.microsoft.com/office/drawing/2014/main" id="{65C3525F-7CB4-4C06-B037-C81D2DED9B80}"/>
               </a:ext>
             </a:extLst>
           </p:cNvPr>
@@ -5700,19 +5704,17 @@
         </p:nvSpPr>
         <p:spPr>
           <a:xfrm>
-            <a:off x="838200" y="365125"/>
+            <a:off x="862584" y="428768"/>
             <a:ext cx="10515600" cy="1325563"/>
           </a:xfrm>
         </p:spPr>
         <p:txBody>
-          <a:bodyPr anchor="ctr">
-            <a:normAutofit/>
-          </a:bodyPr>
+          <a:bodyPr/>
           <a:lstStyle/>
           <a:p>
             <a:r>
               <a:rPr lang="en-US" dirty="0"/>
-              <a:t>DASHBOARD</a:t>
+              <a:t>DATABASE TRENDS</a:t>
             </a:r>
           </a:p>
         </p:txBody>
@@ -5722,7 +5724,43 @@
           <p:cNvPr id="3" name="Content Placeholder 2">
             <a:extLst>
               <a:ext uri="{FF2B5EF4-FFF2-40B4-BE49-F238E27FC236}">
-                <a16:creationId xmlns:a16="http://schemas.microsoft.com/office/drawing/2014/main" id="{902FD5C4-FE5F-46D2-ABC9-49FA4BB8442F}"/>
+                <a16:creationId xmlns:a16="http://schemas.microsoft.com/office/drawing/2014/main" id="{E4FC0D20-FACF-4D73-BD27-CF8F6B97546A}"/>
+              </a:ext>
+            </a:extLst>
+          </p:cNvPr>
+          <p:cNvSpPr>
+            <a:spLocks noGrp="1"/>
+          </p:cNvSpPr>
+          <p:nvPr>
+            <p:ph sz="half" idx="1"/>
+          </p:nvPr>
+        </p:nvSpPr>
+        <p:spPr>
+          <a:xfrm>
+            <a:off x="813816" y="1825625"/>
+            <a:ext cx="2228642" cy="501939"/>
+          </a:xfrm>
+        </p:spPr>
+        <p:txBody>
+          <a:bodyPr/>
+          <a:lstStyle/>
+          <a:p>
+            <a:pPr marL="0" indent="0">
+              <a:buNone/>
+            </a:pPr>
+            <a:r>
+              <a:rPr lang="en-US" dirty="0"/>
+              <a:t>Current Year</a:t>
+            </a:r>
+          </a:p>
+        </p:txBody>
+      </p:sp>
+      <p:sp>
+        <p:nvSpPr>
+          <p:cNvPr id="4" name="Content Placeholder 3">
+            <a:extLst>
+              <a:ext uri="{FF2B5EF4-FFF2-40B4-BE49-F238E27FC236}">
+                <a16:creationId xmlns:a16="http://schemas.microsoft.com/office/drawing/2014/main" id="{ACA6A89D-097D-4968-A07A-39A5B4F78A62}"/>
               </a:ext>
             </a:extLst>
           </p:cNvPr>
@@ -5735,60 +5773,432 @@
         </p:nvSpPr>
         <p:spPr>
           <a:xfrm>
-            <a:off x="4285075" y="3142210"/>
-            <a:ext cx="7068725" cy="2569239"/>
+            <a:off x="6172200" y="1825625"/>
+            <a:ext cx="1758142" cy="501939"/>
           </a:xfrm>
         </p:spPr>
         <p:txBody>
-          <a:bodyPr>
-            <a:normAutofit/>
-          </a:bodyPr>
+          <a:bodyPr/>
           <a:lstStyle/>
           <a:p>
             <a:pPr marL="0" indent="0">
               <a:buNone/>
             </a:pPr>
             <a:r>
-              <a:rPr lang="en-US" sz="2200" dirty="0"/>
-              <a:t>&lt;The permanent link of the read-only view of the Cognos dashboard goes here.&gt;</a:t>
+              <a:rPr lang="en-US" dirty="0"/>
+              <a:t>Next Year</a:t>
             </a:r>
           </a:p>
         </p:txBody>
       </p:sp>
-      <p:pic>
-        <p:nvPicPr>
-          <p:cNvPr id="5" name="Picture 4">
+      <p:sp>
+        <p:nvSpPr>
+          <p:cNvPr id="8" name="Content Placeholder 2">
             <a:extLst>
               <a:ext uri="{FF2B5EF4-FFF2-40B4-BE49-F238E27FC236}">
-                <a16:creationId xmlns:a16="http://schemas.microsoft.com/office/drawing/2014/main" id="{49F6C466-B847-478E-ADAD-F2B14AA5067A}"/>
+                <a16:creationId xmlns:a16="http://schemas.microsoft.com/office/drawing/2014/main" id="{D13C2F43-A283-4FD4-9C0D-BFF93C50AC01}"/>
               </a:ext>
             </a:extLst>
           </p:cNvPr>
-          <p:cNvPicPr>
-            <a:picLocks noChangeAspect="1"/>
-          </p:cNvPicPr>
+          <p:cNvSpPr txBox="1">
+            <a:spLocks/>
+          </p:cNvSpPr>
           <p:nvPr/>
-        </p:nvPicPr>
-        <p:blipFill>
-          <a:blip r:embed="rId2"/>
-          <a:stretch>
-            <a:fillRect/>
-          </a:stretch>
-        </p:blipFill>
+        </p:nvSpPr>
         <p:spPr>
           <a:xfrm>
-            <a:off x="1077475" y="1901819"/>
-            <a:ext cx="3054361" cy="3054361"/>
+            <a:off x="838199" y="2506661"/>
+            <a:ext cx="4614949" cy="3670301"/>
           </a:xfrm>
           <a:prstGeom prst="rect">
             <a:avLst/>
           </a:prstGeom>
         </p:spPr>
-      </p:pic>
+        <p:txBody>
+          <a:bodyPr vert="horz" lIns="91440" tIns="45720" rIns="91440" bIns="45720" rtlCol="0">
+            <a:normAutofit/>
+          </a:bodyPr>
+          <a:lstStyle>
+            <a:lvl1pPr marL="228600" indent="-228600" algn="l" defTabSz="914400" rtl="0" eaLnBrk="1" latinLnBrk="0" hangingPunct="1">
+              <a:lnSpc>
+                <a:spcPct val="90000"/>
+              </a:lnSpc>
+              <a:spcBef>
+                <a:spcPts val="1000"/>
+              </a:spcBef>
+              <a:buFont typeface="Arial"/>
+              <a:buChar char="•"/>
+              <a:defRPr sz="2800" kern="1200">
+                <a:solidFill>
+                  <a:srgbClr val="0070C0"/>
+                </a:solidFill>
+                <a:latin typeface="IBM Plex Mono Text" panose="020B0509050203000203" pitchFamily="49" charset="0"/>
+                <a:ea typeface="+mn-ea"/>
+                <a:cs typeface="+mn-cs"/>
+              </a:defRPr>
+            </a:lvl1pPr>
+            <a:lvl2pPr marL="685800" indent="-228600" algn="l" defTabSz="914400" rtl="0" eaLnBrk="1" latinLnBrk="0" hangingPunct="1">
+              <a:lnSpc>
+                <a:spcPct val="90000"/>
+              </a:lnSpc>
+              <a:spcBef>
+                <a:spcPts val="500"/>
+              </a:spcBef>
+              <a:buFont typeface="Arial"/>
+              <a:buChar char="•"/>
+              <a:defRPr sz="2400" kern="1200">
+                <a:solidFill>
+                  <a:srgbClr val="0070C0"/>
+                </a:solidFill>
+                <a:latin typeface="IBM Plex Mono Text" panose="020B0509050203000203" pitchFamily="49" charset="0"/>
+                <a:ea typeface="+mn-ea"/>
+                <a:cs typeface="+mn-cs"/>
+              </a:defRPr>
+            </a:lvl2pPr>
+            <a:lvl3pPr marL="1143000" indent="-228600" algn="l" defTabSz="914400" rtl="0" eaLnBrk="1" latinLnBrk="0" hangingPunct="1">
+              <a:lnSpc>
+                <a:spcPct val="90000"/>
+              </a:lnSpc>
+              <a:spcBef>
+                <a:spcPts val="500"/>
+              </a:spcBef>
+              <a:buFont typeface="Arial"/>
+              <a:buChar char="•"/>
+              <a:defRPr sz="2000" kern="1200">
+                <a:solidFill>
+                  <a:srgbClr val="0070C0"/>
+                </a:solidFill>
+                <a:latin typeface="IBM Plex Mono Text" panose="020B0509050203000203" pitchFamily="49" charset="0"/>
+                <a:ea typeface="+mn-ea"/>
+                <a:cs typeface="+mn-cs"/>
+              </a:defRPr>
+            </a:lvl3pPr>
+            <a:lvl4pPr marL="1600200" indent="-228600" algn="l" defTabSz="914400" rtl="0" eaLnBrk="1" latinLnBrk="0" hangingPunct="1">
+              <a:lnSpc>
+                <a:spcPct val="90000"/>
+              </a:lnSpc>
+              <a:spcBef>
+                <a:spcPts val="500"/>
+              </a:spcBef>
+              <a:buFont typeface="Arial"/>
+              <a:buChar char="•"/>
+              <a:defRPr sz="1800" kern="1200">
+                <a:solidFill>
+                  <a:srgbClr val="0070C0"/>
+                </a:solidFill>
+                <a:latin typeface="IBM Plex Mono Text" panose="020B0509050203000203" pitchFamily="49" charset="0"/>
+                <a:ea typeface="+mn-ea"/>
+                <a:cs typeface="+mn-cs"/>
+              </a:defRPr>
+            </a:lvl4pPr>
+            <a:lvl5pPr marL="2057400" indent="-228600" algn="l" defTabSz="914400" rtl="0" eaLnBrk="1" latinLnBrk="0" hangingPunct="1">
+              <a:lnSpc>
+                <a:spcPct val="90000"/>
+              </a:lnSpc>
+              <a:spcBef>
+                <a:spcPts val="500"/>
+              </a:spcBef>
+              <a:buFont typeface="Arial"/>
+              <a:buChar char="•"/>
+              <a:defRPr sz="1800" kern="1200">
+                <a:solidFill>
+                  <a:srgbClr val="0070C0"/>
+                </a:solidFill>
+                <a:latin typeface="IBM Plex Mono Text" panose="020B0509050203000203" pitchFamily="49" charset="0"/>
+                <a:ea typeface="+mn-ea"/>
+                <a:cs typeface="+mn-cs"/>
+              </a:defRPr>
+            </a:lvl5pPr>
+            <a:lvl6pPr marL="2514600" indent="-228600" algn="l" defTabSz="914400" rtl="0" eaLnBrk="1" latinLnBrk="0" hangingPunct="1">
+              <a:lnSpc>
+                <a:spcPct val="90000"/>
+              </a:lnSpc>
+              <a:spcBef>
+                <a:spcPts val="500"/>
+              </a:spcBef>
+              <a:buFont typeface="Arial"/>
+              <a:buChar char="•"/>
+              <a:defRPr sz="1800" kern="1200">
+                <a:solidFill>
+                  <a:schemeClr val="tx1"/>
+                </a:solidFill>
+                <a:latin typeface="+mn-lt"/>
+                <a:ea typeface="+mn-ea"/>
+                <a:cs typeface="+mn-cs"/>
+              </a:defRPr>
+            </a:lvl6pPr>
+            <a:lvl7pPr marL="2971800" indent="-228600" algn="l" defTabSz="914400" rtl="0" eaLnBrk="1" latinLnBrk="0" hangingPunct="1">
+              <a:lnSpc>
+                <a:spcPct val="90000"/>
+              </a:lnSpc>
+              <a:spcBef>
+                <a:spcPts val="500"/>
+              </a:spcBef>
+              <a:buFont typeface="Arial"/>
+              <a:buChar char="•"/>
+              <a:defRPr sz="1800" kern="1200">
+                <a:solidFill>
+                  <a:schemeClr val="tx1"/>
+                </a:solidFill>
+                <a:latin typeface="+mn-lt"/>
+                <a:ea typeface="+mn-ea"/>
+                <a:cs typeface="+mn-cs"/>
+              </a:defRPr>
+            </a:lvl7pPr>
+            <a:lvl8pPr marL="3429000" indent="-228600" algn="l" defTabSz="914400" rtl="0" eaLnBrk="1" latinLnBrk="0" hangingPunct="1">
+              <a:lnSpc>
+                <a:spcPct val="90000"/>
+              </a:lnSpc>
+              <a:spcBef>
+                <a:spcPts val="500"/>
+              </a:spcBef>
+              <a:buFont typeface="Arial"/>
+              <a:buChar char="•"/>
+              <a:defRPr sz="1800" kern="1200">
+                <a:solidFill>
+                  <a:schemeClr val="tx1"/>
+                </a:solidFill>
+                <a:latin typeface="+mn-lt"/>
+                <a:ea typeface="+mn-ea"/>
+                <a:cs typeface="+mn-cs"/>
+              </a:defRPr>
+            </a:lvl8pPr>
+            <a:lvl9pPr marL="3886200" indent="-228600" algn="l" defTabSz="914400" rtl="0" eaLnBrk="1" latinLnBrk="0" hangingPunct="1">
+              <a:lnSpc>
+                <a:spcPct val="90000"/>
+              </a:lnSpc>
+              <a:spcBef>
+                <a:spcPts val="500"/>
+              </a:spcBef>
+              <a:buFont typeface="Arial"/>
+              <a:buChar char="•"/>
+              <a:defRPr sz="1800" kern="1200">
+                <a:solidFill>
+                  <a:schemeClr val="tx1"/>
+                </a:solidFill>
+                <a:latin typeface="+mn-lt"/>
+                <a:ea typeface="+mn-ea"/>
+                <a:cs typeface="+mn-cs"/>
+              </a:defRPr>
+            </a:lvl9pPr>
+          </a:lstStyle>
+          <a:p>
+            <a:pPr marL="0" indent="0">
+              <a:buNone/>
+            </a:pPr>
+            <a:r>
+              <a:rPr lang="en-US" sz="2200" dirty="0"/>
+              <a:t>&lt; Bar chart of top 5 databases for the current year goes here &gt;</a:t>
+            </a:r>
+          </a:p>
+        </p:txBody>
+      </p:sp>
+      <p:sp>
+        <p:nvSpPr>
+          <p:cNvPr id="10" name="Content Placeholder 2">
+            <a:extLst>
+              <a:ext uri="{FF2B5EF4-FFF2-40B4-BE49-F238E27FC236}">
+                <a16:creationId xmlns:a16="http://schemas.microsoft.com/office/drawing/2014/main" id="{AE706D50-7D14-4DB8-BE17-5497AA1715EE}"/>
+              </a:ext>
+            </a:extLst>
+          </p:cNvPr>
+          <p:cNvSpPr txBox="1">
+            <a:spLocks/>
+          </p:cNvSpPr>
+          <p:nvPr/>
+        </p:nvSpPr>
+        <p:spPr>
+          <a:xfrm>
+            <a:off x="6172200" y="2506661"/>
+            <a:ext cx="4614949" cy="3670301"/>
+          </a:xfrm>
+          <a:prstGeom prst="rect">
+            <a:avLst/>
+          </a:prstGeom>
+        </p:spPr>
+        <p:txBody>
+          <a:bodyPr vert="horz" lIns="91440" tIns="45720" rIns="91440" bIns="45720" rtlCol="0">
+            <a:normAutofit/>
+          </a:bodyPr>
+          <a:lstStyle>
+            <a:lvl1pPr marL="228600" indent="-228600" algn="l" defTabSz="914400" rtl="0" eaLnBrk="1" latinLnBrk="0" hangingPunct="1">
+              <a:lnSpc>
+                <a:spcPct val="90000"/>
+              </a:lnSpc>
+              <a:spcBef>
+                <a:spcPts val="1000"/>
+              </a:spcBef>
+              <a:buFont typeface="Arial"/>
+              <a:buChar char="•"/>
+              <a:defRPr sz="2800" kern="1200">
+                <a:solidFill>
+                  <a:srgbClr val="0070C0"/>
+                </a:solidFill>
+                <a:latin typeface="IBM Plex Mono Text" panose="020B0509050203000203" pitchFamily="49" charset="0"/>
+                <a:ea typeface="+mn-ea"/>
+                <a:cs typeface="+mn-cs"/>
+              </a:defRPr>
+            </a:lvl1pPr>
+            <a:lvl2pPr marL="685800" indent="-228600" algn="l" defTabSz="914400" rtl="0" eaLnBrk="1" latinLnBrk="0" hangingPunct="1">
+              <a:lnSpc>
+                <a:spcPct val="90000"/>
+              </a:lnSpc>
+              <a:spcBef>
+                <a:spcPts val="500"/>
+              </a:spcBef>
+              <a:buFont typeface="Arial"/>
+              <a:buChar char="•"/>
+              <a:defRPr sz="2400" kern="1200">
+                <a:solidFill>
+                  <a:srgbClr val="0070C0"/>
+                </a:solidFill>
+                <a:latin typeface="IBM Plex Mono Text" panose="020B0509050203000203" pitchFamily="49" charset="0"/>
+                <a:ea typeface="+mn-ea"/>
+                <a:cs typeface="+mn-cs"/>
+              </a:defRPr>
+            </a:lvl2pPr>
+            <a:lvl3pPr marL="1143000" indent="-228600" algn="l" defTabSz="914400" rtl="0" eaLnBrk="1" latinLnBrk="0" hangingPunct="1">
+              <a:lnSpc>
+                <a:spcPct val="90000"/>
+              </a:lnSpc>
+              <a:spcBef>
+                <a:spcPts val="500"/>
+              </a:spcBef>
+              <a:buFont typeface="Arial"/>
+              <a:buChar char="•"/>
+              <a:defRPr sz="2000" kern="1200">
+                <a:solidFill>
+                  <a:srgbClr val="0070C0"/>
+                </a:solidFill>
+                <a:latin typeface="IBM Plex Mono Text" panose="020B0509050203000203" pitchFamily="49" charset="0"/>
+                <a:ea typeface="+mn-ea"/>
+                <a:cs typeface="+mn-cs"/>
+              </a:defRPr>
+            </a:lvl3pPr>
+            <a:lvl4pPr marL="1600200" indent="-228600" algn="l" defTabSz="914400" rtl="0" eaLnBrk="1" latinLnBrk="0" hangingPunct="1">
+              <a:lnSpc>
+                <a:spcPct val="90000"/>
+              </a:lnSpc>
+              <a:spcBef>
+                <a:spcPts val="500"/>
+              </a:spcBef>
+              <a:buFont typeface="Arial"/>
+              <a:buChar char="•"/>
+              <a:defRPr sz="1800" kern="1200">
+                <a:solidFill>
+                  <a:srgbClr val="0070C0"/>
+                </a:solidFill>
+                <a:latin typeface="IBM Plex Mono Text" panose="020B0509050203000203" pitchFamily="49" charset="0"/>
+                <a:ea typeface="+mn-ea"/>
+                <a:cs typeface="+mn-cs"/>
+              </a:defRPr>
+            </a:lvl4pPr>
+            <a:lvl5pPr marL="2057400" indent="-228600" algn="l" defTabSz="914400" rtl="0" eaLnBrk="1" latinLnBrk="0" hangingPunct="1">
+              <a:lnSpc>
+                <a:spcPct val="90000"/>
+              </a:lnSpc>
+              <a:spcBef>
+                <a:spcPts val="500"/>
+              </a:spcBef>
+              <a:buFont typeface="Arial"/>
+              <a:buChar char="•"/>
+              <a:defRPr sz="1800" kern="1200">
+                <a:solidFill>
+                  <a:srgbClr val="0070C0"/>
+                </a:solidFill>
+                <a:latin typeface="IBM Plex Mono Text" panose="020B0509050203000203" pitchFamily="49" charset="0"/>
+                <a:ea typeface="+mn-ea"/>
+                <a:cs typeface="+mn-cs"/>
+              </a:defRPr>
+            </a:lvl5pPr>
+            <a:lvl6pPr marL="2514600" indent="-228600" algn="l" defTabSz="914400" rtl="0" eaLnBrk="1" latinLnBrk="0" hangingPunct="1">
+              <a:lnSpc>
+                <a:spcPct val="90000"/>
+              </a:lnSpc>
+              <a:spcBef>
+                <a:spcPts val="500"/>
+              </a:spcBef>
+              <a:buFont typeface="Arial"/>
+              <a:buChar char="•"/>
+              <a:defRPr sz="1800" kern="1200">
+                <a:solidFill>
+                  <a:schemeClr val="tx1"/>
+                </a:solidFill>
+                <a:latin typeface="+mn-lt"/>
+                <a:ea typeface="+mn-ea"/>
+                <a:cs typeface="+mn-cs"/>
+              </a:defRPr>
+            </a:lvl6pPr>
+            <a:lvl7pPr marL="2971800" indent="-228600" algn="l" defTabSz="914400" rtl="0" eaLnBrk="1" latinLnBrk="0" hangingPunct="1">
+              <a:lnSpc>
+                <a:spcPct val="90000"/>
+              </a:lnSpc>
+              <a:spcBef>
+                <a:spcPts val="500"/>
+              </a:spcBef>
+              <a:buFont typeface="Arial"/>
+              <a:buChar char="•"/>
+              <a:defRPr sz="1800" kern="1200">
+                <a:solidFill>
+                  <a:schemeClr val="tx1"/>
+                </a:solidFill>
+                <a:latin typeface="+mn-lt"/>
+                <a:ea typeface="+mn-ea"/>
+                <a:cs typeface="+mn-cs"/>
+              </a:defRPr>
+            </a:lvl7pPr>
+            <a:lvl8pPr marL="3429000" indent="-228600" algn="l" defTabSz="914400" rtl="0" eaLnBrk="1" latinLnBrk="0" hangingPunct="1">
+              <a:lnSpc>
+                <a:spcPct val="90000"/>
+              </a:lnSpc>
+              <a:spcBef>
+                <a:spcPts val="500"/>
+              </a:spcBef>
+              <a:buFont typeface="Arial"/>
+              <a:buChar char="•"/>
+              <a:defRPr sz="1800" kern="1200">
+                <a:solidFill>
+                  <a:schemeClr val="tx1"/>
+                </a:solidFill>
+                <a:latin typeface="+mn-lt"/>
+                <a:ea typeface="+mn-ea"/>
+                <a:cs typeface="+mn-cs"/>
+              </a:defRPr>
+            </a:lvl8pPr>
+            <a:lvl9pPr marL="3886200" indent="-228600" algn="l" defTabSz="914400" rtl="0" eaLnBrk="1" latinLnBrk="0" hangingPunct="1">
+              <a:lnSpc>
+                <a:spcPct val="90000"/>
+              </a:lnSpc>
+              <a:spcBef>
+                <a:spcPts val="500"/>
+              </a:spcBef>
+              <a:buFont typeface="Arial"/>
+              <a:buChar char="•"/>
+              <a:defRPr sz="1800" kern="1200">
+                <a:solidFill>
+                  <a:schemeClr val="tx1"/>
+                </a:solidFill>
+                <a:latin typeface="+mn-lt"/>
+                <a:ea typeface="+mn-ea"/>
+                <a:cs typeface="+mn-cs"/>
+              </a:defRPr>
+            </a:lvl9pPr>
+          </a:lstStyle>
+          <a:p>
+            <a:pPr marL="0" indent="0">
+              <a:buNone/>
+            </a:pPr>
+            <a:r>
+              <a:rPr lang="en-US" sz="2200" dirty="0"/>
+              <a:t>&lt; Bar chart of top 5 databases for the next year goes here.&gt;</a:t>
+            </a:r>
+          </a:p>
+        </p:txBody>
+      </p:sp>
     </p:spTree>
     <p:extLst>
       <p:ext uri="{BB962C8B-B14F-4D97-AF65-F5344CB8AC3E}">
-        <p14:creationId xmlns:p14="http://schemas.microsoft.com/office/powerpoint/2010/main" val="9691683"/>
+        <p14:creationId xmlns:p14="http://schemas.microsoft.com/office/powerpoint/2010/main" val="1074638838"/>
       </p:ext>
     </p:extLst>
   </p:cSld>
@@ -5820,7 +6230,7 @@
           <p:cNvPr id="2" name="Title 1">
             <a:extLst>
               <a:ext uri="{FF2B5EF4-FFF2-40B4-BE49-F238E27FC236}">
-                <a16:creationId xmlns:a16="http://schemas.microsoft.com/office/drawing/2014/main" id="{2873BEC0-94F5-4226-A9E7-51B66045EF49}"/>
+                <a16:creationId xmlns:a16="http://schemas.microsoft.com/office/drawing/2014/main" id="{65C3525F-7CB4-4C06-B037-C81D2DED9B80}"/>
               </a:ext>
             </a:extLst>
           </p:cNvPr>
@@ -5831,31 +6241,24 @@
             <p:ph type="title"/>
           </p:nvPr>
         </p:nvSpPr>
-        <p:spPr>
-          <a:xfrm>
-            <a:off x="838200" y="365125"/>
-            <a:ext cx="10515600" cy="1325563"/>
-          </a:xfrm>
-        </p:spPr>
+        <p:spPr/>
         <p:txBody>
-          <a:bodyPr anchor="ctr">
-            <a:normAutofit/>
-          </a:bodyPr>
+          <a:bodyPr/>
           <a:lstStyle/>
           <a:p>
             <a:r>
               <a:rPr lang="en-US" dirty="0"/>
-              <a:t>DASHBOARD TAB 1</a:t>
+              <a:t>DATABASE TRENDS - FINDINGS &amp; IMPLICATIONS</a:t>
             </a:r>
           </a:p>
         </p:txBody>
       </p:sp>
       <p:sp>
         <p:nvSpPr>
-          <p:cNvPr id="8" name="Content Placeholder 2">
+          <p:cNvPr id="3" name="Content Placeholder 2">
             <a:extLst>
               <a:ext uri="{FF2B5EF4-FFF2-40B4-BE49-F238E27FC236}">
-                <a16:creationId xmlns:a16="http://schemas.microsoft.com/office/drawing/2014/main" id="{EFCC0E64-0E5B-4BA1-BC72-30FA1DE96F29}"/>
+                <a16:creationId xmlns:a16="http://schemas.microsoft.com/office/drawing/2014/main" id="{E4FC0D20-FACF-4D73-BD27-CF8F6B97546A}"/>
               </a:ext>
             </a:extLst>
           </p:cNvPr>
@@ -5863,13 +6266,13 @@
             <a:spLocks noGrp="1"/>
           </p:cNvSpPr>
           <p:nvPr>
-            <p:ph idx="1"/>
+            <p:ph sz="half" idx="1"/>
           </p:nvPr>
         </p:nvSpPr>
         <p:spPr>
           <a:xfrm>
-            <a:off x="838200" y="1690688"/>
-            <a:ext cx="10515600" cy="4351338"/>
+            <a:off x="813816" y="1825625"/>
+            <a:ext cx="5181600" cy="4351338"/>
           </a:xfrm>
         </p:spPr>
         <p:txBody>
@@ -5879,7 +6282,10 @@
             <a:pPr marL="0" indent="0">
               <a:buNone/>
             </a:pPr>
-            <a:endParaRPr lang="en-US" dirty="0"/>
+            <a:r>
+              <a:rPr lang="en-US" dirty="0"/>
+              <a:t>Findings</a:t>
+            </a:r>
           </a:p>
           <a:p>
             <a:pPr marL="0" indent="0">
@@ -5888,12 +6294,76 @@
             <a:endParaRPr lang="en-US" dirty="0"/>
           </a:p>
           <a:p>
+            <a:r>
+              <a:rPr lang="en-US" dirty="0"/>
+              <a:t>Finding 1</a:t>
+            </a:r>
+          </a:p>
+          <a:p>
+            <a:r>
+              <a:rPr lang="en-US" dirty="0"/>
+              <a:t>Finding 2</a:t>
+            </a:r>
+          </a:p>
+          <a:p>
+            <a:r>
+              <a:rPr lang="en-US" dirty="0"/>
+              <a:t>Finding 3</a:t>
+            </a:r>
+          </a:p>
+        </p:txBody>
+      </p:sp>
+      <p:sp>
+        <p:nvSpPr>
+          <p:cNvPr id="4" name="Content Placeholder 3">
+            <a:extLst>
+              <a:ext uri="{FF2B5EF4-FFF2-40B4-BE49-F238E27FC236}">
+                <a16:creationId xmlns:a16="http://schemas.microsoft.com/office/drawing/2014/main" id="{ACA6A89D-097D-4968-A07A-39A5B4F78A62}"/>
+              </a:ext>
+            </a:extLst>
+          </p:cNvPr>
+          <p:cNvSpPr>
+            <a:spLocks noGrp="1"/>
+          </p:cNvSpPr>
+          <p:nvPr>
+            <p:ph sz="half" idx="2"/>
+          </p:nvPr>
+        </p:nvSpPr>
+        <p:spPr/>
+        <p:txBody>
+          <a:bodyPr/>
+          <a:lstStyle/>
+          <a:p>
             <a:pPr marL="0" indent="0">
               <a:buNone/>
             </a:pPr>
             <a:r>
               <a:rPr lang="en-US" dirty="0"/>
-              <a:t>Screenshot of dashboard tab 1 goes here</a:t>
+              <a:t>Implications</a:t>
+            </a:r>
+          </a:p>
+          <a:p>
+            <a:pPr marL="0" indent="0">
+              <a:buNone/>
+            </a:pPr>
+            <a:endParaRPr lang="en-US" dirty="0"/>
+          </a:p>
+          <a:p>
+            <a:r>
+              <a:rPr lang="en-US" dirty="0"/>
+              <a:t>Implication 1</a:t>
+            </a:r>
+          </a:p>
+          <a:p>
+            <a:r>
+              <a:rPr lang="en-US" dirty="0"/>
+              <a:t>Implication 2</a:t>
+            </a:r>
+          </a:p>
+          <a:p>
+            <a:r>
+              <a:rPr lang="en-US" dirty="0"/>
+              <a:t>Implication 3</a:t>
             </a:r>
           </a:p>
         </p:txBody>
@@ -5901,7 +6371,7 @@
     </p:spTree>
     <p:extLst>
       <p:ext uri="{BB962C8B-B14F-4D97-AF65-F5344CB8AC3E}">
-        <p14:creationId xmlns:p14="http://schemas.microsoft.com/office/powerpoint/2010/main" val="916853615"/>
+        <p14:creationId xmlns:p14="http://schemas.microsoft.com/office/powerpoint/2010/main" val="2659604895"/>
       </p:ext>
     </p:extLst>
   </p:cSld>
@@ -5958,17 +6428,17 @@
           <a:p>
             <a:r>
               <a:rPr lang="en-US" dirty="0"/>
-              <a:t>DASHBOARD TAB 2</a:t>
+              <a:t>DASHBOARD</a:t>
             </a:r>
           </a:p>
         </p:txBody>
       </p:sp>
       <p:sp>
         <p:nvSpPr>
-          <p:cNvPr id="8" name="Content Placeholder 2">
+          <p:cNvPr id="3" name="Content Placeholder 2">
             <a:extLst>
               <a:ext uri="{FF2B5EF4-FFF2-40B4-BE49-F238E27FC236}">
-                <a16:creationId xmlns:a16="http://schemas.microsoft.com/office/drawing/2014/main" id="{EFCC0E64-0E5B-4BA1-BC72-30FA1DE96F29}"/>
+                <a16:creationId xmlns:a16="http://schemas.microsoft.com/office/drawing/2014/main" id="{902FD5C4-FE5F-46D2-ABC9-49FA4BB8442F}"/>
               </a:ext>
             </a:extLst>
           </p:cNvPr>
@@ -5976,45 +6446,65 @@
             <a:spLocks noGrp="1"/>
           </p:cNvSpPr>
           <p:nvPr>
-            <p:ph idx="1"/>
+            <p:ph sz="half" idx="2"/>
           </p:nvPr>
         </p:nvSpPr>
         <p:spPr>
           <a:xfrm>
-            <a:off x="838200" y="1690688"/>
-            <a:ext cx="10515600" cy="4351338"/>
+            <a:off x="4285075" y="3142210"/>
+            <a:ext cx="7068725" cy="2569239"/>
           </a:xfrm>
         </p:spPr>
         <p:txBody>
-          <a:bodyPr/>
+          <a:bodyPr>
+            <a:normAutofit/>
+          </a:bodyPr>
           <a:lstStyle/>
           <a:p>
             <a:pPr marL="0" indent="0">
               <a:buNone/>
             </a:pPr>
-            <a:endParaRPr lang="en-US" dirty="0"/>
-          </a:p>
-          <a:p>
-            <a:pPr marL="0" indent="0">
-              <a:buNone/>
-            </a:pPr>
-            <a:endParaRPr lang="en-US" dirty="0"/>
-          </a:p>
-          <a:p>
-            <a:pPr marL="0" indent="0">
-              <a:buNone/>
-            </a:pPr>
-            <a:r>
-              <a:rPr lang="en-US" dirty="0"/>
-              <a:t>Screenshot of dashboard tab 2 goes here</a:t>
+            <a:r>
+              <a:rPr lang="en-US" sz="2200" dirty="0"/>
+              <a:t>&lt;The permanent link of the read-only view of the Cognos dashboard goes here.&gt;</a:t>
             </a:r>
           </a:p>
         </p:txBody>
       </p:sp>
+      <p:pic>
+        <p:nvPicPr>
+          <p:cNvPr id="5" name="Picture 4">
+            <a:extLst>
+              <a:ext uri="{FF2B5EF4-FFF2-40B4-BE49-F238E27FC236}">
+                <a16:creationId xmlns:a16="http://schemas.microsoft.com/office/drawing/2014/main" id="{49F6C466-B847-478E-ADAD-F2B14AA5067A}"/>
+              </a:ext>
+            </a:extLst>
+          </p:cNvPr>
+          <p:cNvPicPr>
+            <a:picLocks noChangeAspect="1"/>
+          </p:cNvPicPr>
+          <p:nvPr/>
+        </p:nvPicPr>
+        <p:blipFill>
+          <a:blip r:embed="rId2"/>
+          <a:stretch>
+            <a:fillRect/>
+          </a:stretch>
+        </p:blipFill>
+        <p:spPr>
+          <a:xfrm>
+            <a:off x="1077475" y="1901819"/>
+            <a:ext cx="3054361" cy="3054361"/>
+          </a:xfrm>
+          <a:prstGeom prst="rect">
+            <a:avLst/>
+          </a:prstGeom>
+        </p:spPr>
+      </p:pic>
     </p:spTree>
     <p:extLst>
       <p:ext uri="{BB962C8B-B14F-4D97-AF65-F5344CB8AC3E}">
-        <p14:creationId xmlns:p14="http://schemas.microsoft.com/office/powerpoint/2010/main" val="3266127139"/>
+        <p14:creationId xmlns:p14="http://schemas.microsoft.com/office/powerpoint/2010/main" val="9691683"/>
       </p:ext>
     </p:extLst>
   </p:cSld>
@@ -6071,7 +6561,7 @@
           <a:p>
             <a:r>
               <a:rPr lang="en-US" dirty="0"/>
-              <a:t>DASHBOARD TAB 3</a:t>
+              <a:t>DASHBOARD TAB 1</a:t>
             </a:r>
           </a:p>
         </p:txBody>
@@ -6119,7 +6609,7 @@
             </a:pPr>
             <a:r>
               <a:rPr lang="en-US" dirty="0"/>
-              <a:t>Screenshot of dashboard tab 3 goes here</a:t>
+              <a:t>Screenshot of dashboard tab 1 goes here</a:t>
             </a:r>
           </a:p>
         </p:txBody>
@@ -6127,7 +6617,7 @@
     </p:spTree>
     <p:extLst>
       <p:ext uri="{BB962C8B-B14F-4D97-AF65-F5344CB8AC3E}">
-        <p14:creationId xmlns:p14="http://schemas.microsoft.com/office/powerpoint/2010/main" val="3517973280"/>
+        <p14:creationId xmlns:p14="http://schemas.microsoft.com/office/powerpoint/2010/main" val="916853615"/>
       </p:ext>
     </p:extLst>
   </p:cSld>
@@ -6184,47 +6674,17 @@
           <a:p>
             <a:r>
               <a:rPr lang="en-US" dirty="0"/>
-              <a:t>DISCUSSION</a:t>
+              <a:t>DASHBOARD TAB 2</a:t>
             </a:r>
           </a:p>
         </p:txBody>
       </p:sp>
-      <p:pic>
-        <p:nvPicPr>
-          <p:cNvPr id="8" name="Picture 7" descr="Three friends studying at cafe">
+      <p:sp>
+        <p:nvSpPr>
+          <p:cNvPr id="8" name="Content Placeholder 2">
             <a:extLst>
               <a:ext uri="{FF2B5EF4-FFF2-40B4-BE49-F238E27FC236}">
-                <a16:creationId xmlns:a16="http://schemas.microsoft.com/office/drawing/2014/main" id="{97A34E20-E9DC-2EED-8BA3-E21F07654771}"/>
-              </a:ext>
-            </a:extLst>
-          </p:cNvPr>
-          <p:cNvPicPr>
-            <a:picLocks noChangeAspect="1"/>
-          </p:cNvPicPr>
-          <p:nvPr/>
-        </p:nvPicPr>
-        <p:blipFill>
-          <a:blip r:embed="rId2"/>
-          <a:stretch>
-            <a:fillRect/>
-          </a:stretch>
-        </p:blipFill>
-        <p:spPr>
-          <a:xfrm>
-            <a:off x="990600" y="2483128"/>
-            <a:ext cx="4675013" cy="3113631"/>
-          </a:xfrm>
-          <a:prstGeom prst="rect">
-            <a:avLst/>
-          </a:prstGeom>
-        </p:spPr>
-      </p:pic>
-      <p:sp>
-        <p:nvSpPr>
-          <p:cNvPr id="10" name="Content Placeholder 9">
-            <a:extLst>
-              <a:ext uri="{FF2B5EF4-FFF2-40B4-BE49-F238E27FC236}">
-                <a16:creationId xmlns:a16="http://schemas.microsoft.com/office/drawing/2014/main" id="{FB4094E2-6699-7815-10F5-8F90032C90BF}"/>
+                <a16:creationId xmlns:a16="http://schemas.microsoft.com/office/drawing/2014/main" id="{EFCC0E64-0E5B-4BA1-BC72-30FA1DE96F29}"/>
               </a:ext>
             </a:extLst>
           </p:cNvPr>
@@ -6232,22 +6692,45 @@
             <a:spLocks noGrp="1"/>
           </p:cNvSpPr>
           <p:nvPr>
-            <p:ph sz="half" idx="2"/>
+            <p:ph idx="1"/>
           </p:nvPr>
         </p:nvSpPr>
-        <p:spPr/>
+        <p:spPr>
+          <a:xfrm>
+            <a:off x="838200" y="1690688"/>
+            <a:ext cx="10515600" cy="4351338"/>
+          </a:xfrm>
+        </p:spPr>
         <p:txBody>
           <a:bodyPr/>
           <a:lstStyle/>
           <a:p>
-            <a:endParaRPr lang="en-US"/>
+            <a:pPr marL="0" indent="0">
+              <a:buNone/>
+            </a:pPr>
+            <a:endParaRPr lang="en-US" dirty="0"/>
+          </a:p>
+          <a:p>
+            <a:pPr marL="0" indent="0">
+              <a:buNone/>
+            </a:pPr>
+            <a:endParaRPr lang="en-US" dirty="0"/>
+          </a:p>
+          <a:p>
+            <a:pPr marL="0" indent="0">
+              <a:buNone/>
+            </a:pPr>
+            <a:r>
+              <a:rPr lang="en-US" dirty="0"/>
+              <a:t>Screenshot of dashboard tab 2 goes here</a:t>
+            </a:r>
           </a:p>
         </p:txBody>
       </p:sp>
     </p:spTree>
     <p:extLst>
       <p:ext uri="{BB962C8B-B14F-4D97-AF65-F5344CB8AC3E}">
-        <p14:creationId xmlns:p14="http://schemas.microsoft.com/office/powerpoint/2010/main" val="2161130591"/>
+        <p14:creationId xmlns:p14="http://schemas.microsoft.com/office/powerpoint/2010/main" val="3266127139"/>
       </p:ext>
     </p:extLst>
   </p:cSld>
@@ -6279,7 +6762,7 @@
           <p:cNvPr id="2" name="Title 1">
             <a:extLst>
               <a:ext uri="{FF2B5EF4-FFF2-40B4-BE49-F238E27FC236}">
-                <a16:creationId xmlns:a16="http://schemas.microsoft.com/office/drawing/2014/main" id="{65C3525F-7CB4-4C06-B037-C81D2DED9B80}"/>
+                <a16:creationId xmlns:a16="http://schemas.microsoft.com/office/drawing/2014/main" id="{2873BEC0-94F5-4226-A9E7-51B66045EF49}"/>
               </a:ext>
             </a:extLst>
           </p:cNvPr>
@@ -6290,24 +6773,31 @@
             <p:ph type="title"/>
           </p:nvPr>
         </p:nvSpPr>
-        <p:spPr/>
+        <p:spPr>
+          <a:xfrm>
+            <a:off x="838200" y="365125"/>
+            <a:ext cx="10515600" cy="1325563"/>
+          </a:xfrm>
+        </p:spPr>
         <p:txBody>
-          <a:bodyPr/>
+          <a:bodyPr anchor="ctr">
+            <a:normAutofit/>
+          </a:bodyPr>
           <a:lstStyle/>
           <a:p>
             <a:r>
               <a:rPr lang="en-US" dirty="0"/>
-              <a:t>OVERALL FINDINGS &amp; IMPLICATIONS</a:t>
+              <a:t>DASHBOARD TAB 3</a:t>
             </a:r>
           </a:p>
         </p:txBody>
       </p:sp>
       <p:sp>
         <p:nvSpPr>
-          <p:cNvPr id="3" name="Content Placeholder 2">
+          <p:cNvPr id="8" name="Content Placeholder 2">
             <a:extLst>
               <a:ext uri="{FF2B5EF4-FFF2-40B4-BE49-F238E27FC236}">
-                <a16:creationId xmlns:a16="http://schemas.microsoft.com/office/drawing/2014/main" id="{E4FC0D20-FACF-4D73-BD27-CF8F6B97546A}"/>
+                <a16:creationId xmlns:a16="http://schemas.microsoft.com/office/drawing/2014/main" id="{EFCC0E64-0E5B-4BA1-BC72-30FA1DE96F29}"/>
               </a:ext>
             </a:extLst>
           </p:cNvPr>
@@ -6315,29 +6805,18 @@
             <a:spLocks noGrp="1"/>
           </p:cNvSpPr>
           <p:nvPr>
-            <p:ph sz="half" idx="1"/>
+            <p:ph idx="1"/>
           </p:nvPr>
         </p:nvSpPr>
         <p:spPr>
           <a:xfrm>
-            <a:off x="813816" y="1825625"/>
-            <a:ext cx="5181600" cy="4351338"/>
+            <a:off x="838200" y="1690688"/>
+            <a:ext cx="10515600" cy="4351338"/>
           </a:xfrm>
         </p:spPr>
         <p:txBody>
-          <a:bodyPr>
-            <a:normAutofit/>
-          </a:bodyPr>
+          <a:bodyPr/>
           <a:lstStyle/>
-          <a:p>
-            <a:pPr marL="0" indent="0">
-              <a:buNone/>
-            </a:pPr>
-            <a:r>
-              <a:rPr lang="en-US" dirty="0"/>
-              <a:t>Findings</a:t>
-            </a:r>
-          </a:p>
           <a:p>
             <a:pPr marL="0" indent="0">
               <a:buNone/>
@@ -6345,78 +6824,18 @@
             <a:endParaRPr lang="en-US" dirty="0"/>
           </a:p>
           <a:p>
-            <a:r>
-              <a:rPr lang="en-US" dirty="0"/>
-              <a:t>Finding 1</a:t>
-            </a:r>
-          </a:p>
-          <a:p>
-            <a:r>
-              <a:rPr lang="en-US" dirty="0"/>
-              <a:t>Finding 2</a:t>
-            </a:r>
-          </a:p>
-          <a:p>
-            <a:r>
-              <a:rPr lang="en-US" dirty="0"/>
-              <a:t>Finding 3</a:t>
-            </a:r>
-          </a:p>
-        </p:txBody>
-      </p:sp>
-      <p:sp>
-        <p:nvSpPr>
-          <p:cNvPr id="4" name="Content Placeholder 3">
-            <a:extLst>
-              <a:ext uri="{FF2B5EF4-FFF2-40B4-BE49-F238E27FC236}">
-                <a16:creationId xmlns:a16="http://schemas.microsoft.com/office/drawing/2014/main" id="{ACA6A89D-097D-4968-A07A-39A5B4F78A62}"/>
-              </a:ext>
-            </a:extLst>
-          </p:cNvPr>
-          <p:cNvSpPr>
-            <a:spLocks noGrp="1"/>
-          </p:cNvSpPr>
-          <p:nvPr>
-            <p:ph sz="half" idx="2"/>
-          </p:nvPr>
-        </p:nvSpPr>
-        <p:spPr/>
-        <p:txBody>
-          <a:bodyPr>
-            <a:normAutofit/>
-          </a:bodyPr>
-          <a:lstStyle/>
-          <a:p>
-            <a:pPr marL="0" indent="0">
-              <a:buNone/>
-            </a:pPr>
-            <a:r>
-              <a:rPr lang="en-US" dirty="0"/>
-              <a:t>Implications</a:t>
-            </a:r>
-          </a:p>
-          <a:p>
             <a:pPr marL="0" indent="0">
               <a:buNone/>
             </a:pPr>
             <a:endParaRPr lang="en-US" dirty="0"/>
           </a:p>
           <a:p>
+            <a:pPr marL="0" indent="0">
+              <a:buNone/>
+            </a:pPr>
             <a:r>
               <a:rPr lang="en-US" dirty="0"/>
-              <a:t>Implication 1</a:t>
-            </a:r>
-          </a:p>
-          <a:p>
-            <a:r>
-              <a:rPr lang="en-US" dirty="0"/>
-              <a:t>Implication 2</a:t>
-            </a:r>
-          </a:p>
-          <a:p>
-            <a:r>
-              <a:rPr lang="en-US" dirty="0"/>
-              <a:t>Implication 3</a:t>
+              <a:t>Screenshot of dashboard tab 3 goes here</a:t>
             </a:r>
           </a:p>
         </p:txBody>
@@ -6424,7 +6843,7 @@
     </p:spTree>
     <p:extLst>
       <p:ext uri="{BB962C8B-B14F-4D97-AF65-F5344CB8AC3E}">
-        <p14:creationId xmlns:p14="http://schemas.microsoft.com/office/powerpoint/2010/main" val="647271476"/>
+        <p14:creationId xmlns:p14="http://schemas.microsoft.com/office/powerpoint/2010/main" val="3517973280"/>
       </p:ext>
     </p:extLst>
   </p:cSld>
@@ -6481,17 +6900,47 @@
           <a:p>
             <a:r>
               <a:rPr lang="en-US" dirty="0"/>
-              <a:t>CONCLUSION</a:t>
+              <a:t>DISCUSSION</a:t>
             </a:r>
           </a:p>
         </p:txBody>
       </p:sp>
+      <p:pic>
+        <p:nvPicPr>
+          <p:cNvPr id="8" name="Picture 7" descr="Three friends studying at cafe">
+            <a:extLst>
+              <a:ext uri="{FF2B5EF4-FFF2-40B4-BE49-F238E27FC236}">
+                <a16:creationId xmlns:a16="http://schemas.microsoft.com/office/drawing/2014/main" id="{97A34E20-E9DC-2EED-8BA3-E21F07654771}"/>
+              </a:ext>
+            </a:extLst>
+          </p:cNvPr>
+          <p:cNvPicPr>
+            <a:picLocks noChangeAspect="1"/>
+          </p:cNvPicPr>
+          <p:nvPr/>
+        </p:nvPicPr>
+        <p:blipFill>
+          <a:blip r:embed="rId2"/>
+          <a:stretch>
+            <a:fillRect/>
+          </a:stretch>
+        </p:blipFill>
+        <p:spPr>
+          <a:xfrm>
+            <a:off x="990600" y="2483128"/>
+            <a:ext cx="4675013" cy="3113631"/>
+          </a:xfrm>
+          <a:prstGeom prst="rect">
+            <a:avLst/>
+          </a:prstGeom>
+        </p:spPr>
+      </p:pic>
       <p:sp>
         <p:nvSpPr>
-          <p:cNvPr id="5" name="Content Placeholder 3">
+          <p:cNvPr id="10" name="Content Placeholder 9">
             <a:extLst>
               <a:ext uri="{FF2B5EF4-FFF2-40B4-BE49-F238E27FC236}">
-                <a16:creationId xmlns:a16="http://schemas.microsoft.com/office/drawing/2014/main" id="{28684E62-A9F8-4E7A-AB01-78893062A1B4}"/>
+                <a16:creationId xmlns:a16="http://schemas.microsoft.com/office/drawing/2014/main" id="{FB4094E2-6699-7815-10F5-8F90032C90BF}"/>
               </a:ext>
             </a:extLst>
           </p:cNvPr>
@@ -6502,77 +6951,19 @@
             <p:ph sz="half" idx="2"/>
           </p:nvPr>
         </p:nvSpPr>
-        <p:spPr>
-          <a:xfrm>
-            <a:off x="4544291" y="1825625"/>
-            <a:ext cx="6809509" cy="4351338"/>
-          </a:xfrm>
-        </p:spPr>
+        <p:spPr/>
         <p:txBody>
           <a:bodyPr/>
           <a:lstStyle/>
           <a:p>
-            <a:r>
-              <a:rPr lang="en-US" dirty="0"/>
-              <a:t>Point 1</a:t>
-            </a:r>
-          </a:p>
-          <a:p>
-            <a:r>
-              <a:rPr lang="en-US" dirty="0"/>
-              <a:t>Point 2</a:t>
-            </a:r>
-          </a:p>
-          <a:p>
-            <a:r>
-              <a:rPr lang="en-US" dirty="0"/>
-              <a:t>Point 3</a:t>
-            </a:r>
-          </a:p>
-          <a:p>
-            <a:r>
-              <a:rPr lang="en-US" dirty="0"/>
-              <a:t>Point 4</a:t>
-            </a:r>
+            <a:endParaRPr lang="en-US"/>
           </a:p>
         </p:txBody>
       </p:sp>
-      <p:pic>
-        <p:nvPicPr>
-          <p:cNvPr id="6" name="Content Placeholder 5">
-            <a:extLst>
-              <a:ext uri="{FF2B5EF4-FFF2-40B4-BE49-F238E27FC236}">
-                <a16:creationId xmlns:a16="http://schemas.microsoft.com/office/drawing/2014/main" id="{5E013141-2139-434F-83AB-CF1C80A7AC4A}"/>
-              </a:ext>
-            </a:extLst>
-          </p:cNvPr>
-          <p:cNvPicPr>
-            <a:picLocks noGrp="1" noChangeAspect="1"/>
-          </p:cNvPicPr>
-          <p:nvPr>
-            <p:ph sz="half" idx="1"/>
-          </p:nvPr>
-        </p:nvPicPr>
-        <p:blipFill>
-          <a:blip r:embed="rId2"/>
-          <a:stretch>
-            <a:fillRect/>
-          </a:stretch>
-        </p:blipFill>
-        <p:spPr>
-          <a:xfrm>
-            <a:off x="1125967" y="2113896"/>
-            <a:ext cx="3054361" cy="3054361"/>
-          </a:xfrm>
-          <a:prstGeom prst="rect">
-            <a:avLst/>
-          </a:prstGeom>
-        </p:spPr>
-      </p:pic>
     </p:spTree>
     <p:extLst>
       <p:ext uri="{BB962C8B-B14F-4D97-AF65-F5344CB8AC3E}">
-        <p14:creationId xmlns:p14="http://schemas.microsoft.com/office/powerpoint/2010/main" val="1630123617"/>
+        <p14:creationId xmlns:p14="http://schemas.microsoft.com/office/powerpoint/2010/main" val="2161130591"/>
       </p:ext>
     </p:extLst>
   </p:cSld>
@@ -6604,7 +6995,7 @@
           <p:cNvPr id="2" name="Title 1">
             <a:extLst>
               <a:ext uri="{FF2B5EF4-FFF2-40B4-BE49-F238E27FC236}">
-                <a16:creationId xmlns:a16="http://schemas.microsoft.com/office/drawing/2014/main" id="{2873BEC0-94F5-4226-A9E7-51B66045EF49}"/>
+                <a16:creationId xmlns:a16="http://schemas.microsoft.com/office/drawing/2014/main" id="{65C3525F-7CB4-4C06-B037-C81D2DED9B80}"/>
               </a:ext>
             </a:extLst>
           </p:cNvPr>
@@ -6615,31 +7006,86 @@
             <p:ph type="title"/>
           </p:nvPr>
         </p:nvSpPr>
-        <p:spPr>
-          <a:xfrm>
-            <a:off x="838200" y="365125"/>
-            <a:ext cx="10515600" cy="1325563"/>
-          </a:xfrm>
-        </p:spPr>
+        <p:spPr/>
         <p:txBody>
-          <a:bodyPr anchor="ctr">
-            <a:normAutofit/>
-          </a:bodyPr>
+          <a:bodyPr/>
           <a:lstStyle/>
           <a:p>
             <a:r>
               <a:rPr lang="en-US" dirty="0"/>
-              <a:t>APPENDIX</a:t>
+              <a:t>OVERALL FINDINGS &amp; IMPLICATIONS</a:t>
             </a:r>
           </a:p>
         </p:txBody>
       </p:sp>
       <p:sp>
         <p:nvSpPr>
-          <p:cNvPr id="5" name="Content Placeholder 3">
+          <p:cNvPr id="3" name="Content Placeholder 2">
             <a:extLst>
               <a:ext uri="{FF2B5EF4-FFF2-40B4-BE49-F238E27FC236}">
-                <a16:creationId xmlns:a16="http://schemas.microsoft.com/office/drawing/2014/main" id="{28684E62-A9F8-4E7A-AB01-78893062A1B4}"/>
+                <a16:creationId xmlns:a16="http://schemas.microsoft.com/office/drawing/2014/main" id="{E4FC0D20-FACF-4D73-BD27-CF8F6B97546A}"/>
+              </a:ext>
+            </a:extLst>
+          </p:cNvPr>
+          <p:cNvSpPr>
+            <a:spLocks noGrp="1"/>
+          </p:cNvSpPr>
+          <p:nvPr>
+            <p:ph sz="half" idx="1"/>
+          </p:nvPr>
+        </p:nvSpPr>
+        <p:spPr>
+          <a:xfrm>
+            <a:off x="813816" y="1825625"/>
+            <a:ext cx="5181600" cy="4351338"/>
+          </a:xfrm>
+        </p:spPr>
+        <p:txBody>
+          <a:bodyPr>
+            <a:normAutofit/>
+          </a:bodyPr>
+          <a:lstStyle/>
+          <a:p>
+            <a:pPr marL="0" indent="0">
+              <a:buNone/>
+            </a:pPr>
+            <a:r>
+              <a:rPr lang="en-US" dirty="0"/>
+              <a:t>Findings</a:t>
+            </a:r>
+          </a:p>
+          <a:p>
+            <a:pPr marL="0" indent="0">
+              <a:buNone/>
+            </a:pPr>
+            <a:endParaRPr lang="en-US" dirty="0"/>
+          </a:p>
+          <a:p>
+            <a:r>
+              <a:rPr lang="en-US" dirty="0"/>
+              <a:t>Finding 1</a:t>
+            </a:r>
+          </a:p>
+          <a:p>
+            <a:r>
+              <a:rPr lang="en-US" dirty="0"/>
+              <a:t>Finding 2</a:t>
+            </a:r>
+          </a:p>
+          <a:p>
+            <a:r>
+              <a:rPr lang="en-US" dirty="0"/>
+              <a:t>Finding 3</a:t>
+            </a:r>
+          </a:p>
+        </p:txBody>
+      </p:sp>
+      <p:sp>
+        <p:nvSpPr>
+          <p:cNvPr id="4" name="Content Placeholder 3">
+            <a:extLst>
+              <a:ext uri="{FF2B5EF4-FFF2-40B4-BE49-F238E27FC236}">
+                <a16:creationId xmlns:a16="http://schemas.microsoft.com/office/drawing/2014/main" id="{ACA6A89D-097D-4968-A07A-39A5B4F78A62}"/>
               </a:ext>
             </a:extLst>
           </p:cNvPr>
@@ -6650,59 +7096,51 @@
             <p:ph sz="half" idx="2"/>
           </p:nvPr>
         </p:nvSpPr>
-        <p:spPr>
-          <a:xfrm>
-            <a:off x="4544291" y="1825625"/>
-            <a:ext cx="6809509" cy="4351338"/>
-          </a:xfrm>
-        </p:spPr>
+        <p:spPr/>
         <p:txBody>
-          <a:bodyPr/>
+          <a:bodyPr>
+            <a:normAutofit/>
+          </a:bodyPr>
           <a:lstStyle/>
           <a:p>
+            <a:pPr marL="0" indent="0">
+              <a:buNone/>
+            </a:pPr>
             <a:r>
               <a:rPr lang="en-US" dirty="0"/>
-              <a:t>Include any relevant additional charts, or tables that you may have created during the analysis phase.</a:t>
+              <a:t>Implications</a:t>
+            </a:r>
+          </a:p>
+          <a:p>
+            <a:pPr marL="0" indent="0">
+              <a:buNone/>
+            </a:pPr>
+            <a:endParaRPr lang="en-US" dirty="0"/>
+          </a:p>
+          <a:p>
+            <a:r>
+              <a:rPr lang="en-US" dirty="0"/>
+              <a:t>Implication 1</a:t>
+            </a:r>
+          </a:p>
+          <a:p>
+            <a:r>
+              <a:rPr lang="en-US" dirty="0"/>
+              <a:t>Implication 2</a:t>
+            </a:r>
+          </a:p>
+          <a:p>
+            <a:r>
+              <a:rPr lang="en-US" dirty="0"/>
+              <a:t>Implication 3</a:t>
             </a:r>
           </a:p>
         </p:txBody>
       </p:sp>
-      <p:pic>
-        <p:nvPicPr>
-          <p:cNvPr id="4" name="Content Placeholder 3">
-            <a:extLst>
-              <a:ext uri="{FF2B5EF4-FFF2-40B4-BE49-F238E27FC236}">
-                <a16:creationId xmlns:a16="http://schemas.microsoft.com/office/drawing/2014/main" id="{D5D63823-FC2E-4AC2-93D5-3C2B6F315436}"/>
-              </a:ext>
-            </a:extLst>
-          </p:cNvPr>
-          <p:cNvPicPr>
-            <a:picLocks noGrp="1" noChangeAspect="1"/>
-          </p:cNvPicPr>
-          <p:nvPr>
-            <p:ph sz="half" idx="1"/>
-          </p:nvPr>
-        </p:nvPicPr>
-        <p:blipFill>
-          <a:blip r:embed="rId2"/>
-          <a:stretch>
-            <a:fillRect/>
-          </a:stretch>
-        </p:blipFill>
-        <p:spPr>
-          <a:xfrm>
-            <a:off x="1055857" y="1849823"/>
-            <a:ext cx="3194581" cy="3194581"/>
-          </a:xfrm>
-          <a:prstGeom prst="rect">
-            <a:avLst/>
-          </a:prstGeom>
-        </p:spPr>
-      </p:pic>
     </p:spTree>
     <p:extLst>
       <p:ext uri="{BB962C8B-B14F-4D97-AF65-F5344CB8AC3E}">
-        <p14:creationId xmlns:p14="http://schemas.microsoft.com/office/powerpoint/2010/main" val="3410008520"/>
+        <p14:creationId xmlns:p14="http://schemas.microsoft.com/office/powerpoint/2010/main" val="647271476"/>
       </p:ext>
     </p:extLst>
   </p:cSld>
@@ -6747,8 +7185,8 @@
         </p:nvSpPr>
         <p:spPr>
           <a:xfrm>
-            <a:off x="538248" y="383051"/>
-            <a:ext cx="5929053" cy="1325563"/>
+            <a:off x="838200" y="365125"/>
+            <a:ext cx="10515600" cy="1325563"/>
           </a:xfrm>
         </p:spPr>
         <p:txBody>
@@ -6759,17 +7197,17 @@
           <a:p>
             <a:r>
               <a:rPr lang="en-US" dirty="0"/>
-              <a:t> JOB POSTINGS</a:t>
+              <a:t>CONCLUSION</a:t>
             </a:r>
           </a:p>
         </p:txBody>
       </p:sp>
       <p:sp>
         <p:nvSpPr>
-          <p:cNvPr id="3" name="Content Placeholder 2">
+          <p:cNvPr id="5" name="Content Placeholder 3">
             <a:extLst>
               <a:ext uri="{FF2B5EF4-FFF2-40B4-BE49-F238E27FC236}">
-                <a16:creationId xmlns:a16="http://schemas.microsoft.com/office/drawing/2014/main" id="{902FD5C4-FE5F-46D2-ABC9-49FA4BB8442F}"/>
+                <a16:creationId xmlns:a16="http://schemas.microsoft.com/office/drawing/2014/main" id="{28684E62-A9F8-4E7A-AB01-78893062A1B4}"/>
               </a:ext>
             </a:extLst>
           </p:cNvPr>
@@ -6782,43 +7220,75 @@
         </p:nvSpPr>
         <p:spPr>
           <a:xfrm>
-            <a:off x="914400" y="2191385"/>
-            <a:ext cx="10489276" cy="2862753"/>
+            <a:off x="4544291" y="1825625"/>
+            <a:ext cx="6809509" cy="4351338"/>
           </a:xfrm>
         </p:spPr>
         <p:txBody>
-          <a:bodyPr>
-            <a:normAutofit/>
-          </a:bodyPr>
+          <a:bodyPr/>
           <a:lstStyle/>
           <a:p>
-            <a:pPr marL="0" indent="0">
-              <a:buNone/>
-            </a:pPr>
-            <a:r>
-              <a:rPr lang="en-US" sz="2200" dirty="0"/>
-              <a:t>In Module 1 you have collected the job posting data using Job API in a file named “</a:t>
-            </a:r>
-            <a:r>
-              <a:rPr lang="en-IN" sz="2400" dirty="0"/>
-              <a:t>job-postings.xlsx</a:t>
-            </a:r>
-            <a:r>
-              <a:rPr lang="en-US" sz="2200" dirty="0"/>
-              <a:t>”. Present that data using a bar chart here. Order the bar chart in the descending order of the number of job </a:t>
-            </a:r>
-            <a:r>
-              <a:rPr lang="en-US" sz="2200"/>
-              <a:t>postings.</a:t>
-            </a:r>
-            <a:endParaRPr lang="en-US" sz="2200" dirty="0"/>
+            <a:r>
+              <a:rPr lang="en-US" dirty="0"/>
+              <a:t>Point 1</a:t>
+            </a:r>
+          </a:p>
+          <a:p>
+            <a:r>
+              <a:rPr lang="en-US" dirty="0"/>
+              <a:t>Point 2</a:t>
+            </a:r>
+          </a:p>
+          <a:p>
+            <a:r>
+              <a:rPr lang="en-US" dirty="0"/>
+              <a:t>Point 3</a:t>
+            </a:r>
+          </a:p>
+          <a:p>
+            <a:r>
+              <a:rPr lang="en-US" dirty="0"/>
+              <a:t>Point 4</a:t>
+            </a:r>
           </a:p>
         </p:txBody>
       </p:sp>
+      <p:pic>
+        <p:nvPicPr>
+          <p:cNvPr id="6" name="Content Placeholder 5">
+            <a:extLst>
+              <a:ext uri="{FF2B5EF4-FFF2-40B4-BE49-F238E27FC236}">
+                <a16:creationId xmlns:a16="http://schemas.microsoft.com/office/drawing/2014/main" id="{5E013141-2139-434F-83AB-CF1C80A7AC4A}"/>
+              </a:ext>
+            </a:extLst>
+          </p:cNvPr>
+          <p:cNvPicPr>
+            <a:picLocks noGrp="1" noChangeAspect="1"/>
+          </p:cNvPicPr>
+          <p:nvPr>
+            <p:ph sz="half" idx="1"/>
+          </p:nvPr>
+        </p:nvPicPr>
+        <p:blipFill>
+          <a:blip r:embed="rId2"/>
+          <a:stretch>
+            <a:fillRect/>
+          </a:stretch>
+        </p:blipFill>
+        <p:spPr>
+          <a:xfrm>
+            <a:off x="1125967" y="2113896"/>
+            <a:ext cx="3054361" cy="3054361"/>
+          </a:xfrm>
+          <a:prstGeom prst="rect">
+            <a:avLst/>
+          </a:prstGeom>
+        </p:spPr>
+      </p:pic>
     </p:spTree>
     <p:extLst>
       <p:ext uri="{BB962C8B-B14F-4D97-AF65-F5344CB8AC3E}">
-        <p14:creationId xmlns:p14="http://schemas.microsoft.com/office/powerpoint/2010/main" val="3078551498"/>
+        <p14:creationId xmlns:p14="http://schemas.microsoft.com/office/powerpoint/2010/main" val="1630123617"/>
       </p:ext>
     </p:extLst>
   </p:cSld>
@@ -7118,6 +7588,252 @@
 </file>
 
 <file path=ppt/slides/slide20.xml><?xml version="1.0" encoding="utf-8"?>
+<p:sld xmlns:a="http://schemas.openxmlformats.org/drawingml/2006/main" xmlns:r="http://schemas.openxmlformats.org/officeDocument/2006/relationships" xmlns:p="http://schemas.openxmlformats.org/presentationml/2006/main">
+  <p:cSld>
+    <p:spTree>
+      <p:nvGrpSpPr>
+        <p:cNvPr id="1" name=""/>
+        <p:cNvGrpSpPr/>
+        <p:nvPr/>
+      </p:nvGrpSpPr>
+      <p:grpSpPr>
+        <a:xfrm>
+          <a:off x="0" y="0"/>
+          <a:ext cx="0" cy="0"/>
+          <a:chOff x="0" y="0"/>
+          <a:chExt cx="0" cy="0"/>
+        </a:xfrm>
+      </p:grpSpPr>
+      <p:sp>
+        <p:nvSpPr>
+          <p:cNvPr id="2" name="Title 1">
+            <a:extLst>
+              <a:ext uri="{FF2B5EF4-FFF2-40B4-BE49-F238E27FC236}">
+                <a16:creationId xmlns:a16="http://schemas.microsoft.com/office/drawing/2014/main" id="{2873BEC0-94F5-4226-A9E7-51B66045EF49}"/>
+              </a:ext>
+            </a:extLst>
+          </p:cNvPr>
+          <p:cNvSpPr>
+            <a:spLocks noGrp="1"/>
+          </p:cNvSpPr>
+          <p:nvPr>
+            <p:ph type="title"/>
+          </p:nvPr>
+        </p:nvSpPr>
+        <p:spPr>
+          <a:xfrm>
+            <a:off x="838200" y="365125"/>
+            <a:ext cx="10515600" cy="1325563"/>
+          </a:xfrm>
+        </p:spPr>
+        <p:txBody>
+          <a:bodyPr anchor="ctr">
+            <a:normAutofit/>
+          </a:bodyPr>
+          <a:lstStyle/>
+          <a:p>
+            <a:r>
+              <a:rPr lang="en-US" dirty="0"/>
+              <a:t>APPENDIX</a:t>
+            </a:r>
+          </a:p>
+        </p:txBody>
+      </p:sp>
+      <p:sp>
+        <p:nvSpPr>
+          <p:cNvPr id="5" name="Content Placeholder 3">
+            <a:extLst>
+              <a:ext uri="{FF2B5EF4-FFF2-40B4-BE49-F238E27FC236}">
+                <a16:creationId xmlns:a16="http://schemas.microsoft.com/office/drawing/2014/main" id="{28684E62-A9F8-4E7A-AB01-78893062A1B4}"/>
+              </a:ext>
+            </a:extLst>
+          </p:cNvPr>
+          <p:cNvSpPr>
+            <a:spLocks noGrp="1"/>
+          </p:cNvSpPr>
+          <p:nvPr>
+            <p:ph sz="half" idx="2"/>
+          </p:nvPr>
+        </p:nvSpPr>
+        <p:spPr>
+          <a:xfrm>
+            <a:off x="4544291" y="1825625"/>
+            <a:ext cx="6809509" cy="4351338"/>
+          </a:xfrm>
+        </p:spPr>
+        <p:txBody>
+          <a:bodyPr/>
+          <a:lstStyle/>
+          <a:p>
+            <a:r>
+              <a:rPr lang="en-US" dirty="0"/>
+              <a:t>Include any relevant additional charts, or tables that you may have created during the analysis phase.</a:t>
+            </a:r>
+          </a:p>
+        </p:txBody>
+      </p:sp>
+      <p:pic>
+        <p:nvPicPr>
+          <p:cNvPr id="4" name="Content Placeholder 3">
+            <a:extLst>
+              <a:ext uri="{FF2B5EF4-FFF2-40B4-BE49-F238E27FC236}">
+                <a16:creationId xmlns:a16="http://schemas.microsoft.com/office/drawing/2014/main" id="{D5D63823-FC2E-4AC2-93D5-3C2B6F315436}"/>
+              </a:ext>
+            </a:extLst>
+          </p:cNvPr>
+          <p:cNvPicPr>
+            <a:picLocks noGrp="1" noChangeAspect="1"/>
+          </p:cNvPicPr>
+          <p:nvPr>
+            <p:ph sz="half" idx="1"/>
+          </p:nvPr>
+        </p:nvPicPr>
+        <p:blipFill>
+          <a:blip r:embed="rId2"/>
+          <a:stretch>
+            <a:fillRect/>
+          </a:stretch>
+        </p:blipFill>
+        <p:spPr>
+          <a:xfrm>
+            <a:off x="1055857" y="1849823"/>
+            <a:ext cx="3194581" cy="3194581"/>
+          </a:xfrm>
+          <a:prstGeom prst="rect">
+            <a:avLst/>
+          </a:prstGeom>
+        </p:spPr>
+      </p:pic>
+    </p:spTree>
+    <p:extLst>
+      <p:ext uri="{BB962C8B-B14F-4D97-AF65-F5344CB8AC3E}">
+        <p14:creationId xmlns:p14="http://schemas.microsoft.com/office/powerpoint/2010/main" val="3410008520"/>
+      </p:ext>
+    </p:extLst>
+  </p:cSld>
+  <p:clrMapOvr>
+    <a:masterClrMapping/>
+  </p:clrMapOvr>
+</p:sld>
+</file>
+
+<file path=ppt/slides/slide21.xml><?xml version="1.0" encoding="utf-8"?>
+<p:sld xmlns:a="http://schemas.openxmlformats.org/drawingml/2006/main" xmlns:r="http://schemas.openxmlformats.org/officeDocument/2006/relationships" xmlns:p="http://schemas.openxmlformats.org/presentationml/2006/main">
+  <p:cSld>
+    <p:spTree>
+      <p:nvGrpSpPr>
+        <p:cNvPr id="1" name=""/>
+        <p:cNvGrpSpPr/>
+        <p:nvPr/>
+      </p:nvGrpSpPr>
+      <p:grpSpPr>
+        <a:xfrm>
+          <a:off x="0" y="0"/>
+          <a:ext cx="0" cy="0"/>
+          <a:chOff x="0" y="0"/>
+          <a:chExt cx="0" cy="0"/>
+        </a:xfrm>
+      </p:grpSpPr>
+      <p:sp>
+        <p:nvSpPr>
+          <p:cNvPr id="2" name="Title 1">
+            <a:extLst>
+              <a:ext uri="{FF2B5EF4-FFF2-40B4-BE49-F238E27FC236}">
+                <a16:creationId xmlns:a16="http://schemas.microsoft.com/office/drawing/2014/main" id="{2873BEC0-94F5-4226-A9E7-51B66045EF49}"/>
+              </a:ext>
+            </a:extLst>
+          </p:cNvPr>
+          <p:cNvSpPr>
+            <a:spLocks noGrp="1"/>
+          </p:cNvSpPr>
+          <p:nvPr>
+            <p:ph type="title"/>
+          </p:nvPr>
+        </p:nvSpPr>
+        <p:spPr>
+          <a:xfrm>
+            <a:off x="538248" y="383051"/>
+            <a:ext cx="5929053" cy="1325563"/>
+          </a:xfrm>
+        </p:spPr>
+        <p:txBody>
+          <a:bodyPr anchor="ctr">
+            <a:normAutofit/>
+          </a:bodyPr>
+          <a:lstStyle/>
+          <a:p>
+            <a:r>
+              <a:rPr lang="en-US" dirty="0"/>
+              <a:t> JOB POSTINGS</a:t>
+            </a:r>
+          </a:p>
+        </p:txBody>
+      </p:sp>
+      <p:sp>
+        <p:nvSpPr>
+          <p:cNvPr id="3" name="Content Placeholder 2">
+            <a:extLst>
+              <a:ext uri="{FF2B5EF4-FFF2-40B4-BE49-F238E27FC236}">
+                <a16:creationId xmlns:a16="http://schemas.microsoft.com/office/drawing/2014/main" id="{902FD5C4-FE5F-46D2-ABC9-49FA4BB8442F}"/>
+              </a:ext>
+            </a:extLst>
+          </p:cNvPr>
+          <p:cNvSpPr>
+            <a:spLocks noGrp="1"/>
+          </p:cNvSpPr>
+          <p:nvPr>
+            <p:ph sz="half" idx="2"/>
+          </p:nvPr>
+        </p:nvSpPr>
+        <p:spPr>
+          <a:xfrm>
+            <a:off x="914400" y="2191385"/>
+            <a:ext cx="10489276" cy="2862753"/>
+          </a:xfrm>
+        </p:spPr>
+        <p:txBody>
+          <a:bodyPr>
+            <a:normAutofit/>
+          </a:bodyPr>
+          <a:lstStyle/>
+          <a:p>
+            <a:pPr marL="0" indent="0">
+              <a:buNone/>
+            </a:pPr>
+            <a:r>
+              <a:rPr lang="en-US" sz="2200" dirty="0"/>
+              <a:t>In Module 1 you have collected the job posting data using Job API in a file named “</a:t>
+            </a:r>
+            <a:r>
+              <a:rPr lang="en-IN" sz="2400" dirty="0"/>
+              <a:t>job-postings.xlsx</a:t>
+            </a:r>
+            <a:r>
+              <a:rPr lang="en-US" sz="2200" dirty="0"/>
+              <a:t>”. Present that data using a bar chart here. Order the bar chart in the descending order of the number of job </a:t>
+            </a:r>
+            <a:r>
+              <a:rPr lang="en-US" sz="2200"/>
+              <a:t>postings.</a:t>
+            </a:r>
+            <a:endParaRPr lang="en-US" sz="2200" dirty="0"/>
+          </a:p>
+        </p:txBody>
+      </p:sp>
+    </p:spTree>
+    <p:extLst>
+      <p:ext uri="{BB962C8B-B14F-4D97-AF65-F5344CB8AC3E}">
+        <p14:creationId xmlns:p14="http://schemas.microsoft.com/office/powerpoint/2010/main" val="3078551498"/>
+      </p:ext>
+    </p:extLst>
+  </p:cSld>
+  <p:clrMapOvr>
+    <a:masterClrMapping/>
+  </p:clrMapOvr>
+</p:sld>
+</file>
+
+<file path=ppt/slides/slide22.xml><?xml version="1.0" encoding="utf-8"?>
 <p:sld xmlns:a="http://schemas.openxmlformats.org/drawingml/2006/main" xmlns:r="http://schemas.openxmlformats.org/officeDocument/2006/relationships" xmlns:p="http://schemas.openxmlformats.org/presentationml/2006/main">
   <p:cSld>
     <p:spTree>
@@ -7856,7 +8572,7 @@
                 <a:effectLst/>
                 <a:latin typeface="-apple-system"/>
               </a:rPr>
-              <a:t>First, data was collected by by sending a request to the Space X API to collect data. The data was then filtered to focus on Falcon9 launches and eliminate missing data.</a:t>
+              <a:t>First, data was collected by by sending a request to the Space X API to collect data. The data was cleaned, wrangled, and then filtered to focus on Falcon9 launches and eliminate missing data.</a:t>
             </a:r>
           </a:p>
           <a:p>
@@ -7977,7 +8693,7 @@
               <a:t>Lastly, a machine learning pipeline was developed to predict whether or not the first stage would land using the processed data</a:t>
             </a:r>
             <a:r>
-              <a:rPr lang="en-US" sz="1800">
+              <a:rPr lang="en-US" sz="1800" dirty="0">
                 <a:solidFill>
                   <a:srgbClr val="24292F"/>
                 </a:solidFill>
@@ -8145,6 +8861,230 @@
 </file>
 
 <file path=ppt/slides/slide7.xml><?xml version="1.0" encoding="utf-8"?>
+<p:sld xmlns:a="http://schemas.openxmlformats.org/drawingml/2006/main" xmlns:r="http://schemas.openxmlformats.org/officeDocument/2006/relationships" xmlns:p="http://schemas.openxmlformats.org/presentationml/2006/main">
+  <p:cSld>
+    <p:spTree>
+      <p:nvGrpSpPr>
+        <p:cNvPr id="1" name=""/>
+        <p:cNvGrpSpPr/>
+        <p:nvPr/>
+      </p:nvGrpSpPr>
+      <p:grpSpPr>
+        <a:xfrm>
+          <a:off x="0" y="0"/>
+          <a:ext cx="0" cy="0"/>
+          <a:chOff x="0" y="0"/>
+          <a:chExt cx="0" cy="0"/>
+        </a:xfrm>
+      </p:grpSpPr>
+      <p:sp>
+        <p:nvSpPr>
+          <p:cNvPr id="2" name="Title 1">
+            <a:extLst>
+              <a:ext uri="{FF2B5EF4-FFF2-40B4-BE49-F238E27FC236}">
+                <a16:creationId xmlns:a16="http://schemas.microsoft.com/office/drawing/2014/main" id="{2873BEC0-94F5-4226-A9E7-51B66045EF49}"/>
+              </a:ext>
+            </a:extLst>
+          </p:cNvPr>
+          <p:cNvSpPr>
+            <a:spLocks noGrp="1"/>
+          </p:cNvSpPr>
+          <p:nvPr>
+            <p:ph type="title"/>
+          </p:nvPr>
+        </p:nvSpPr>
+        <p:spPr>
+          <a:xfrm>
+            <a:off x="838200" y="365125"/>
+            <a:ext cx="10515600" cy="1325563"/>
+          </a:xfrm>
+        </p:spPr>
+        <p:txBody>
+          <a:bodyPr anchor="ctr">
+            <a:normAutofit/>
+          </a:bodyPr>
+          <a:lstStyle/>
+          <a:p>
+            <a:r>
+              <a:rPr lang="en-US" dirty="0"/>
+              <a:t>RESULTS</a:t>
+            </a:r>
+          </a:p>
+        </p:txBody>
+      </p:sp>
+      <p:sp>
+        <p:nvSpPr>
+          <p:cNvPr id="3" name="Content Placeholder 2">
+            <a:extLst>
+              <a:ext uri="{FF2B5EF4-FFF2-40B4-BE49-F238E27FC236}">
+                <a16:creationId xmlns:a16="http://schemas.microsoft.com/office/drawing/2014/main" id="{902FD5C4-FE5F-46D2-ABC9-49FA4BB8442F}"/>
+              </a:ext>
+            </a:extLst>
+          </p:cNvPr>
+          <p:cNvSpPr>
+            <a:spLocks noGrp="1"/>
+          </p:cNvSpPr>
+          <p:nvPr>
+            <p:ph sz="half" idx="2"/>
+          </p:nvPr>
+        </p:nvSpPr>
+        <p:spPr>
+          <a:xfrm>
+            <a:off x="1043114" y="1825625"/>
+            <a:ext cx="7068725" cy="4351338"/>
+          </a:xfrm>
+        </p:spPr>
+        <p:txBody>
+          <a:bodyPr>
+            <a:normAutofit/>
+          </a:bodyPr>
+          <a:lstStyle/>
+          <a:p>
+            <a:pPr marL="0" indent="0">
+              <a:buNone/>
+            </a:pPr>
+            <a:endParaRPr lang="en-US" sz="1800" dirty="0"/>
+          </a:p>
+          <a:p>
+            <a:pPr marL="0" indent="0">
+              <a:buNone/>
+            </a:pPr>
+            <a:endParaRPr lang="en-US" sz="1800" dirty="0"/>
+          </a:p>
+          <a:p>
+            <a:pPr marL="0" indent="0">
+              <a:buNone/>
+            </a:pPr>
+            <a:endParaRPr lang="en-US" sz="1800" dirty="0"/>
+          </a:p>
+        </p:txBody>
+      </p:sp>
+    </p:spTree>
+    <p:extLst>
+      <p:ext uri="{BB962C8B-B14F-4D97-AF65-F5344CB8AC3E}">
+        <p14:creationId xmlns:p14="http://schemas.microsoft.com/office/powerpoint/2010/main" val="1099868713"/>
+      </p:ext>
+    </p:extLst>
+  </p:cSld>
+  <p:clrMapOvr>
+    <a:masterClrMapping/>
+  </p:clrMapOvr>
+</p:sld>
+</file>
+
+<file path=ppt/slides/slide8.xml><?xml version="1.0" encoding="utf-8"?>
+<p:sld xmlns:a="http://schemas.openxmlformats.org/drawingml/2006/main" xmlns:r="http://schemas.openxmlformats.org/officeDocument/2006/relationships" xmlns:p="http://schemas.openxmlformats.org/presentationml/2006/main">
+  <p:cSld>
+    <p:spTree>
+      <p:nvGrpSpPr>
+        <p:cNvPr id="1" name=""/>
+        <p:cNvGrpSpPr/>
+        <p:nvPr/>
+      </p:nvGrpSpPr>
+      <p:grpSpPr>
+        <a:xfrm>
+          <a:off x="0" y="0"/>
+          <a:ext cx="0" cy="0"/>
+          <a:chOff x="0" y="0"/>
+          <a:chExt cx="0" cy="0"/>
+        </a:xfrm>
+      </p:grpSpPr>
+      <p:sp>
+        <p:nvSpPr>
+          <p:cNvPr id="2" name="Title 1">
+            <a:extLst>
+              <a:ext uri="{FF2B5EF4-FFF2-40B4-BE49-F238E27FC236}">
+                <a16:creationId xmlns:a16="http://schemas.microsoft.com/office/drawing/2014/main" id="{2873BEC0-94F5-4226-A9E7-51B66045EF49}"/>
+              </a:ext>
+            </a:extLst>
+          </p:cNvPr>
+          <p:cNvSpPr>
+            <a:spLocks noGrp="1"/>
+          </p:cNvSpPr>
+          <p:nvPr>
+            <p:ph type="title"/>
+          </p:nvPr>
+        </p:nvSpPr>
+        <p:spPr>
+          <a:xfrm>
+            <a:off x="838200" y="365125"/>
+            <a:ext cx="10515600" cy="1325563"/>
+          </a:xfrm>
+        </p:spPr>
+        <p:txBody>
+          <a:bodyPr anchor="ctr">
+            <a:normAutofit/>
+          </a:bodyPr>
+          <a:lstStyle/>
+          <a:p>
+            <a:r>
+              <a:rPr lang="en-US" dirty="0"/>
+              <a:t>RESULTS</a:t>
+            </a:r>
+          </a:p>
+        </p:txBody>
+      </p:sp>
+      <p:sp>
+        <p:nvSpPr>
+          <p:cNvPr id="3" name="Content Placeholder 2">
+            <a:extLst>
+              <a:ext uri="{FF2B5EF4-FFF2-40B4-BE49-F238E27FC236}">
+                <a16:creationId xmlns:a16="http://schemas.microsoft.com/office/drawing/2014/main" id="{902FD5C4-FE5F-46D2-ABC9-49FA4BB8442F}"/>
+              </a:ext>
+            </a:extLst>
+          </p:cNvPr>
+          <p:cNvSpPr>
+            <a:spLocks noGrp="1"/>
+          </p:cNvSpPr>
+          <p:nvPr>
+            <p:ph sz="half" idx="2"/>
+          </p:nvPr>
+        </p:nvSpPr>
+        <p:spPr>
+          <a:xfrm>
+            <a:off x="1043114" y="1825625"/>
+            <a:ext cx="7068725" cy="4351338"/>
+          </a:xfrm>
+        </p:spPr>
+        <p:txBody>
+          <a:bodyPr>
+            <a:normAutofit/>
+          </a:bodyPr>
+          <a:lstStyle/>
+          <a:p>
+            <a:pPr marL="0" indent="0">
+              <a:buNone/>
+            </a:pPr>
+            <a:endParaRPr lang="en-US" sz="1800" dirty="0"/>
+          </a:p>
+          <a:p>
+            <a:pPr marL="0" indent="0">
+              <a:buNone/>
+            </a:pPr>
+            <a:endParaRPr lang="en-US" sz="1800" dirty="0"/>
+          </a:p>
+          <a:p>
+            <a:pPr marL="0" indent="0">
+              <a:buNone/>
+            </a:pPr>
+            <a:endParaRPr lang="en-US" sz="1800" dirty="0"/>
+          </a:p>
+        </p:txBody>
+      </p:sp>
+    </p:spTree>
+    <p:extLst>
+      <p:ext uri="{BB962C8B-B14F-4D97-AF65-F5344CB8AC3E}">
+        <p14:creationId xmlns:p14="http://schemas.microsoft.com/office/powerpoint/2010/main" val="3414419319"/>
+      </p:ext>
+    </p:extLst>
+  </p:cSld>
+  <p:clrMapOvr>
+    <a:masterClrMapping/>
+  </p:clrMapOvr>
+</p:sld>
+</file>
+
+<file path=ppt/slides/slide9.xml><?xml version="1.0" encoding="utf-8"?>
 <p:sld xmlns:a="http://schemas.openxmlformats.org/drawingml/2006/main" xmlns:r="http://schemas.openxmlformats.org/officeDocument/2006/relationships" xmlns:p="http://schemas.openxmlformats.org/presentationml/2006/main">
   <p:cSld>
     <p:spTree>
@@ -8669,720 +9609,6 @@
     <p:extLst>
       <p:ext uri="{BB962C8B-B14F-4D97-AF65-F5344CB8AC3E}">
         <p14:creationId xmlns:p14="http://schemas.microsoft.com/office/powerpoint/2010/main" val="1957259874"/>
-      </p:ext>
-    </p:extLst>
-  </p:cSld>
-  <p:clrMapOvr>
-    <a:masterClrMapping/>
-  </p:clrMapOvr>
-</p:sld>
-</file>
-
-<file path=ppt/slides/slide8.xml><?xml version="1.0" encoding="utf-8"?>
-<p:sld xmlns:a="http://schemas.openxmlformats.org/drawingml/2006/main" xmlns:r="http://schemas.openxmlformats.org/officeDocument/2006/relationships" xmlns:p="http://schemas.openxmlformats.org/presentationml/2006/main">
-  <p:cSld>
-    <p:spTree>
-      <p:nvGrpSpPr>
-        <p:cNvPr id="1" name=""/>
-        <p:cNvGrpSpPr/>
-        <p:nvPr/>
-      </p:nvGrpSpPr>
-      <p:grpSpPr>
-        <a:xfrm>
-          <a:off x="0" y="0"/>
-          <a:ext cx="0" cy="0"/>
-          <a:chOff x="0" y="0"/>
-          <a:chExt cx="0" cy="0"/>
-        </a:xfrm>
-      </p:grpSpPr>
-      <p:sp>
-        <p:nvSpPr>
-          <p:cNvPr id="2" name="Title 1">
-            <a:extLst>
-              <a:ext uri="{FF2B5EF4-FFF2-40B4-BE49-F238E27FC236}">
-                <a16:creationId xmlns:a16="http://schemas.microsoft.com/office/drawing/2014/main" id="{65C3525F-7CB4-4C06-B037-C81D2DED9B80}"/>
-              </a:ext>
-            </a:extLst>
-          </p:cNvPr>
-          <p:cNvSpPr>
-            <a:spLocks noGrp="1"/>
-          </p:cNvSpPr>
-          <p:nvPr>
-            <p:ph type="title"/>
-          </p:nvPr>
-        </p:nvSpPr>
-        <p:spPr/>
-        <p:txBody>
-          <a:bodyPr>
-            <a:normAutofit/>
-          </a:bodyPr>
-          <a:lstStyle/>
-          <a:p>
-            <a:r>
-              <a:rPr lang="en-US" sz="2800" dirty="0"/>
-              <a:t>PROGRAMMING LANGUAGE TRENDS - FINDINGS &amp; IMPLICATIONS</a:t>
-            </a:r>
-          </a:p>
-        </p:txBody>
-      </p:sp>
-      <p:sp>
-        <p:nvSpPr>
-          <p:cNvPr id="3" name="Content Placeholder 2">
-            <a:extLst>
-              <a:ext uri="{FF2B5EF4-FFF2-40B4-BE49-F238E27FC236}">
-                <a16:creationId xmlns:a16="http://schemas.microsoft.com/office/drawing/2014/main" id="{E4FC0D20-FACF-4D73-BD27-CF8F6B97546A}"/>
-              </a:ext>
-            </a:extLst>
-          </p:cNvPr>
-          <p:cNvSpPr>
-            <a:spLocks noGrp="1"/>
-          </p:cNvSpPr>
-          <p:nvPr>
-            <p:ph sz="half" idx="1"/>
-          </p:nvPr>
-        </p:nvSpPr>
-        <p:spPr>
-          <a:xfrm>
-            <a:off x="813816" y="1825625"/>
-            <a:ext cx="5181600" cy="4351338"/>
-          </a:xfrm>
-        </p:spPr>
-        <p:txBody>
-          <a:bodyPr/>
-          <a:lstStyle/>
-          <a:p>
-            <a:pPr marL="0" indent="0">
-              <a:buNone/>
-            </a:pPr>
-            <a:r>
-              <a:rPr lang="en-US" dirty="0"/>
-              <a:t>Findings</a:t>
-            </a:r>
-          </a:p>
-          <a:p>
-            <a:pPr marL="0" indent="0">
-              <a:buNone/>
-            </a:pPr>
-            <a:endParaRPr lang="en-US" dirty="0"/>
-          </a:p>
-          <a:p>
-            <a:r>
-              <a:rPr lang="en-US" dirty="0"/>
-              <a:t>Finding 1</a:t>
-            </a:r>
-          </a:p>
-          <a:p>
-            <a:r>
-              <a:rPr lang="en-US" dirty="0"/>
-              <a:t>Finding 2</a:t>
-            </a:r>
-          </a:p>
-          <a:p>
-            <a:r>
-              <a:rPr lang="en-US" dirty="0"/>
-              <a:t>Finding 3</a:t>
-            </a:r>
-          </a:p>
-        </p:txBody>
-      </p:sp>
-      <p:sp>
-        <p:nvSpPr>
-          <p:cNvPr id="4" name="Content Placeholder 3">
-            <a:extLst>
-              <a:ext uri="{FF2B5EF4-FFF2-40B4-BE49-F238E27FC236}">
-                <a16:creationId xmlns:a16="http://schemas.microsoft.com/office/drawing/2014/main" id="{ACA6A89D-097D-4968-A07A-39A5B4F78A62}"/>
-              </a:ext>
-            </a:extLst>
-          </p:cNvPr>
-          <p:cNvSpPr>
-            <a:spLocks noGrp="1"/>
-          </p:cNvSpPr>
-          <p:nvPr>
-            <p:ph sz="half" idx="2"/>
-          </p:nvPr>
-        </p:nvSpPr>
-        <p:spPr/>
-        <p:txBody>
-          <a:bodyPr/>
-          <a:lstStyle/>
-          <a:p>
-            <a:pPr marL="0" indent="0">
-              <a:buNone/>
-            </a:pPr>
-            <a:r>
-              <a:rPr lang="en-US" dirty="0"/>
-              <a:t>Implications</a:t>
-            </a:r>
-          </a:p>
-          <a:p>
-            <a:pPr marL="0" indent="0">
-              <a:buNone/>
-            </a:pPr>
-            <a:endParaRPr lang="en-US" dirty="0"/>
-          </a:p>
-          <a:p>
-            <a:r>
-              <a:rPr lang="en-US" dirty="0"/>
-              <a:t>Implication 1</a:t>
-            </a:r>
-          </a:p>
-          <a:p>
-            <a:r>
-              <a:rPr lang="en-US" dirty="0"/>
-              <a:t>Implication 2</a:t>
-            </a:r>
-          </a:p>
-          <a:p>
-            <a:r>
-              <a:rPr lang="en-US" dirty="0"/>
-              <a:t>Implication 3</a:t>
-            </a:r>
-          </a:p>
-        </p:txBody>
-      </p:sp>
-    </p:spTree>
-    <p:extLst>
-      <p:ext uri="{BB962C8B-B14F-4D97-AF65-F5344CB8AC3E}">
-        <p14:creationId xmlns:p14="http://schemas.microsoft.com/office/powerpoint/2010/main" val="545569246"/>
-      </p:ext>
-    </p:extLst>
-  </p:cSld>
-  <p:clrMapOvr>
-    <a:masterClrMapping/>
-  </p:clrMapOvr>
-</p:sld>
-</file>
-
-<file path=ppt/slides/slide9.xml><?xml version="1.0" encoding="utf-8"?>
-<p:sld xmlns:a="http://schemas.openxmlformats.org/drawingml/2006/main" xmlns:r="http://schemas.openxmlformats.org/officeDocument/2006/relationships" xmlns:p="http://schemas.openxmlformats.org/presentationml/2006/main">
-  <p:cSld>
-    <p:spTree>
-      <p:nvGrpSpPr>
-        <p:cNvPr id="1" name=""/>
-        <p:cNvGrpSpPr/>
-        <p:nvPr/>
-      </p:nvGrpSpPr>
-      <p:grpSpPr>
-        <a:xfrm>
-          <a:off x="0" y="0"/>
-          <a:ext cx="0" cy="0"/>
-          <a:chOff x="0" y="0"/>
-          <a:chExt cx="0" cy="0"/>
-        </a:xfrm>
-      </p:grpSpPr>
-      <p:sp>
-        <p:nvSpPr>
-          <p:cNvPr id="2" name="Title 1">
-            <a:extLst>
-              <a:ext uri="{FF2B5EF4-FFF2-40B4-BE49-F238E27FC236}">
-                <a16:creationId xmlns:a16="http://schemas.microsoft.com/office/drawing/2014/main" id="{65C3525F-7CB4-4C06-B037-C81D2DED9B80}"/>
-              </a:ext>
-            </a:extLst>
-          </p:cNvPr>
-          <p:cNvSpPr>
-            <a:spLocks noGrp="1"/>
-          </p:cNvSpPr>
-          <p:nvPr>
-            <p:ph type="title"/>
-          </p:nvPr>
-        </p:nvSpPr>
-        <p:spPr>
-          <a:xfrm>
-            <a:off x="862584" y="428768"/>
-            <a:ext cx="10515600" cy="1325563"/>
-          </a:xfrm>
-        </p:spPr>
-        <p:txBody>
-          <a:bodyPr/>
-          <a:lstStyle/>
-          <a:p>
-            <a:r>
-              <a:rPr lang="en-US" dirty="0"/>
-              <a:t>DATABASE TRENDS</a:t>
-            </a:r>
-          </a:p>
-        </p:txBody>
-      </p:sp>
-      <p:sp>
-        <p:nvSpPr>
-          <p:cNvPr id="3" name="Content Placeholder 2">
-            <a:extLst>
-              <a:ext uri="{FF2B5EF4-FFF2-40B4-BE49-F238E27FC236}">
-                <a16:creationId xmlns:a16="http://schemas.microsoft.com/office/drawing/2014/main" id="{E4FC0D20-FACF-4D73-BD27-CF8F6B97546A}"/>
-              </a:ext>
-            </a:extLst>
-          </p:cNvPr>
-          <p:cNvSpPr>
-            <a:spLocks noGrp="1"/>
-          </p:cNvSpPr>
-          <p:nvPr>
-            <p:ph sz="half" idx="1"/>
-          </p:nvPr>
-        </p:nvSpPr>
-        <p:spPr>
-          <a:xfrm>
-            <a:off x="813816" y="1825625"/>
-            <a:ext cx="2228642" cy="501939"/>
-          </a:xfrm>
-        </p:spPr>
-        <p:txBody>
-          <a:bodyPr/>
-          <a:lstStyle/>
-          <a:p>
-            <a:pPr marL="0" indent="0">
-              <a:buNone/>
-            </a:pPr>
-            <a:r>
-              <a:rPr lang="en-US" dirty="0"/>
-              <a:t>Current Year</a:t>
-            </a:r>
-          </a:p>
-        </p:txBody>
-      </p:sp>
-      <p:sp>
-        <p:nvSpPr>
-          <p:cNvPr id="4" name="Content Placeholder 3">
-            <a:extLst>
-              <a:ext uri="{FF2B5EF4-FFF2-40B4-BE49-F238E27FC236}">
-                <a16:creationId xmlns:a16="http://schemas.microsoft.com/office/drawing/2014/main" id="{ACA6A89D-097D-4968-A07A-39A5B4F78A62}"/>
-              </a:ext>
-            </a:extLst>
-          </p:cNvPr>
-          <p:cNvSpPr>
-            <a:spLocks noGrp="1"/>
-          </p:cNvSpPr>
-          <p:nvPr>
-            <p:ph sz="half" idx="2"/>
-          </p:nvPr>
-        </p:nvSpPr>
-        <p:spPr>
-          <a:xfrm>
-            <a:off x="6172200" y="1825625"/>
-            <a:ext cx="1758142" cy="501939"/>
-          </a:xfrm>
-        </p:spPr>
-        <p:txBody>
-          <a:bodyPr/>
-          <a:lstStyle/>
-          <a:p>
-            <a:pPr marL="0" indent="0">
-              <a:buNone/>
-            </a:pPr>
-            <a:r>
-              <a:rPr lang="en-US" dirty="0"/>
-              <a:t>Next Year</a:t>
-            </a:r>
-          </a:p>
-        </p:txBody>
-      </p:sp>
-      <p:sp>
-        <p:nvSpPr>
-          <p:cNvPr id="8" name="Content Placeholder 2">
-            <a:extLst>
-              <a:ext uri="{FF2B5EF4-FFF2-40B4-BE49-F238E27FC236}">
-                <a16:creationId xmlns:a16="http://schemas.microsoft.com/office/drawing/2014/main" id="{D13C2F43-A283-4FD4-9C0D-BFF93C50AC01}"/>
-              </a:ext>
-            </a:extLst>
-          </p:cNvPr>
-          <p:cNvSpPr txBox="1">
-            <a:spLocks/>
-          </p:cNvSpPr>
-          <p:nvPr/>
-        </p:nvSpPr>
-        <p:spPr>
-          <a:xfrm>
-            <a:off x="838199" y="2506661"/>
-            <a:ext cx="4614949" cy="3670301"/>
-          </a:xfrm>
-          <a:prstGeom prst="rect">
-            <a:avLst/>
-          </a:prstGeom>
-        </p:spPr>
-        <p:txBody>
-          <a:bodyPr vert="horz" lIns="91440" tIns="45720" rIns="91440" bIns="45720" rtlCol="0">
-            <a:normAutofit/>
-          </a:bodyPr>
-          <a:lstStyle>
-            <a:lvl1pPr marL="228600" indent="-228600" algn="l" defTabSz="914400" rtl="0" eaLnBrk="1" latinLnBrk="0" hangingPunct="1">
-              <a:lnSpc>
-                <a:spcPct val="90000"/>
-              </a:lnSpc>
-              <a:spcBef>
-                <a:spcPts val="1000"/>
-              </a:spcBef>
-              <a:buFont typeface="Arial"/>
-              <a:buChar char="•"/>
-              <a:defRPr sz="2800" kern="1200">
-                <a:solidFill>
-                  <a:srgbClr val="0070C0"/>
-                </a:solidFill>
-                <a:latin typeface="IBM Plex Mono Text" panose="020B0509050203000203" pitchFamily="49" charset="0"/>
-                <a:ea typeface="+mn-ea"/>
-                <a:cs typeface="+mn-cs"/>
-              </a:defRPr>
-            </a:lvl1pPr>
-            <a:lvl2pPr marL="685800" indent="-228600" algn="l" defTabSz="914400" rtl="0" eaLnBrk="1" latinLnBrk="0" hangingPunct="1">
-              <a:lnSpc>
-                <a:spcPct val="90000"/>
-              </a:lnSpc>
-              <a:spcBef>
-                <a:spcPts val="500"/>
-              </a:spcBef>
-              <a:buFont typeface="Arial"/>
-              <a:buChar char="•"/>
-              <a:defRPr sz="2400" kern="1200">
-                <a:solidFill>
-                  <a:srgbClr val="0070C0"/>
-                </a:solidFill>
-                <a:latin typeface="IBM Plex Mono Text" panose="020B0509050203000203" pitchFamily="49" charset="0"/>
-                <a:ea typeface="+mn-ea"/>
-                <a:cs typeface="+mn-cs"/>
-              </a:defRPr>
-            </a:lvl2pPr>
-            <a:lvl3pPr marL="1143000" indent="-228600" algn="l" defTabSz="914400" rtl="0" eaLnBrk="1" latinLnBrk="0" hangingPunct="1">
-              <a:lnSpc>
-                <a:spcPct val="90000"/>
-              </a:lnSpc>
-              <a:spcBef>
-                <a:spcPts val="500"/>
-              </a:spcBef>
-              <a:buFont typeface="Arial"/>
-              <a:buChar char="•"/>
-              <a:defRPr sz="2000" kern="1200">
-                <a:solidFill>
-                  <a:srgbClr val="0070C0"/>
-                </a:solidFill>
-                <a:latin typeface="IBM Plex Mono Text" panose="020B0509050203000203" pitchFamily="49" charset="0"/>
-                <a:ea typeface="+mn-ea"/>
-                <a:cs typeface="+mn-cs"/>
-              </a:defRPr>
-            </a:lvl3pPr>
-            <a:lvl4pPr marL="1600200" indent="-228600" algn="l" defTabSz="914400" rtl="0" eaLnBrk="1" latinLnBrk="0" hangingPunct="1">
-              <a:lnSpc>
-                <a:spcPct val="90000"/>
-              </a:lnSpc>
-              <a:spcBef>
-                <a:spcPts val="500"/>
-              </a:spcBef>
-              <a:buFont typeface="Arial"/>
-              <a:buChar char="•"/>
-              <a:defRPr sz="1800" kern="1200">
-                <a:solidFill>
-                  <a:srgbClr val="0070C0"/>
-                </a:solidFill>
-                <a:latin typeface="IBM Plex Mono Text" panose="020B0509050203000203" pitchFamily="49" charset="0"/>
-                <a:ea typeface="+mn-ea"/>
-                <a:cs typeface="+mn-cs"/>
-              </a:defRPr>
-            </a:lvl4pPr>
-            <a:lvl5pPr marL="2057400" indent="-228600" algn="l" defTabSz="914400" rtl="0" eaLnBrk="1" latinLnBrk="0" hangingPunct="1">
-              <a:lnSpc>
-                <a:spcPct val="90000"/>
-              </a:lnSpc>
-              <a:spcBef>
-                <a:spcPts val="500"/>
-              </a:spcBef>
-              <a:buFont typeface="Arial"/>
-              <a:buChar char="•"/>
-              <a:defRPr sz="1800" kern="1200">
-                <a:solidFill>
-                  <a:srgbClr val="0070C0"/>
-                </a:solidFill>
-                <a:latin typeface="IBM Plex Mono Text" panose="020B0509050203000203" pitchFamily="49" charset="0"/>
-                <a:ea typeface="+mn-ea"/>
-                <a:cs typeface="+mn-cs"/>
-              </a:defRPr>
-            </a:lvl5pPr>
-            <a:lvl6pPr marL="2514600" indent="-228600" algn="l" defTabSz="914400" rtl="0" eaLnBrk="1" latinLnBrk="0" hangingPunct="1">
-              <a:lnSpc>
-                <a:spcPct val="90000"/>
-              </a:lnSpc>
-              <a:spcBef>
-                <a:spcPts val="500"/>
-              </a:spcBef>
-              <a:buFont typeface="Arial"/>
-              <a:buChar char="•"/>
-              <a:defRPr sz="1800" kern="1200">
-                <a:solidFill>
-                  <a:schemeClr val="tx1"/>
-                </a:solidFill>
-                <a:latin typeface="+mn-lt"/>
-                <a:ea typeface="+mn-ea"/>
-                <a:cs typeface="+mn-cs"/>
-              </a:defRPr>
-            </a:lvl6pPr>
-            <a:lvl7pPr marL="2971800" indent="-228600" algn="l" defTabSz="914400" rtl="0" eaLnBrk="1" latinLnBrk="0" hangingPunct="1">
-              <a:lnSpc>
-                <a:spcPct val="90000"/>
-              </a:lnSpc>
-              <a:spcBef>
-                <a:spcPts val="500"/>
-              </a:spcBef>
-              <a:buFont typeface="Arial"/>
-              <a:buChar char="•"/>
-              <a:defRPr sz="1800" kern="1200">
-                <a:solidFill>
-                  <a:schemeClr val="tx1"/>
-                </a:solidFill>
-                <a:latin typeface="+mn-lt"/>
-                <a:ea typeface="+mn-ea"/>
-                <a:cs typeface="+mn-cs"/>
-              </a:defRPr>
-            </a:lvl7pPr>
-            <a:lvl8pPr marL="3429000" indent="-228600" algn="l" defTabSz="914400" rtl="0" eaLnBrk="1" latinLnBrk="0" hangingPunct="1">
-              <a:lnSpc>
-                <a:spcPct val="90000"/>
-              </a:lnSpc>
-              <a:spcBef>
-                <a:spcPts val="500"/>
-              </a:spcBef>
-              <a:buFont typeface="Arial"/>
-              <a:buChar char="•"/>
-              <a:defRPr sz="1800" kern="1200">
-                <a:solidFill>
-                  <a:schemeClr val="tx1"/>
-                </a:solidFill>
-                <a:latin typeface="+mn-lt"/>
-                <a:ea typeface="+mn-ea"/>
-                <a:cs typeface="+mn-cs"/>
-              </a:defRPr>
-            </a:lvl8pPr>
-            <a:lvl9pPr marL="3886200" indent="-228600" algn="l" defTabSz="914400" rtl="0" eaLnBrk="1" latinLnBrk="0" hangingPunct="1">
-              <a:lnSpc>
-                <a:spcPct val="90000"/>
-              </a:lnSpc>
-              <a:spcBef>
-                <a:spcPts val="500"/>
-              </a:spcBef>
-              <a:buFont typeface="Arial"/>
-              <a:buChar char="•"/>
-              <a:defRPr sz="1800" kern="1200">
-                <a:solidFill>
-                  <a:schemeClr val="tx1"/>
-                </a:solidFill>
-                <a:latin typeface="+mn-lt"/>
-                <a:ea typeface="+mn-ea"/>
-                <a:cs typeface="+mn-cs"/>
-              </a:defRPr>
-            </a:lvl9pPr>
-          </a:lstStyle>
-          <a:p>
-            <a:pPr marL="0" indent="0">
-              <a:buNone/>
-            </a:pPr>
-            <a:r>
-              <a:rPr lang="en-US" sz="2200" dirty="0"/>
-              <a:t>&lt; Bar chart of top 5 databases for the current year goes here &gt;</a:t>
-            </a:r>
-          </a:p>
-        </p:txBody>
-      </p:sp>
-      <p:sp>
-        <p:nvSpPr>
-          <p:cNvPr id="10" name="Content Placeholder 2">
-            <a:extLst>
-              <a:ext uri="{FF2B5EF4-FFF2-40B4-BE49-F238E27FC236}">
-                <a16:creationId xmlns:a16="http://schemas.microsoft.com/office/drawing/2014/main" id="{AE706D50-7D14-4DB8-BE17-5497AA1715EE}"/>
-              </a:ext>
-            </a:extLst>
-          </p:cNvPr>
-          <p:cNvSpPr txBox="1">
-            <a:spLocks/>
-          </p:cNvSpPr>
-          <p:nvPr/>
-        </p:nvSpPr>
-        <p:spPr>
-          <a:xfrm>
-            <a:off x="6172200" y="2506661"/>
-            <a:ext cx="4614949" cy="3670301"/>
-          </a:xfrm>
-          <a:prstGeom prst="rect">
-            <a:avLst/>
-          </a:prstGeom>
-        </p:spPr>
-        <p:txBody>
-          <a:bodyPr vert="horz" lIns="91440" tIns="45720" rIns="91440" bIns="45720" rtlCol="0">
-            <a:normAutofit/>
-          </a:bodyPr>
-          <a:lstStyle>
-            <a:lvl1pPr marL="228600" indent="-228600" algn="l" defTabSz="914400" rtl="0" eaLnBrk="1" latinLnBrk="0" hangingPunct="1">
-              <a:lnSpc>
-                <a:spcPct val="90000"/>
-              </a:lnSpc>
-              <a:spcBef>
-                <a:spcPts val="1000"/>
-              </a:spcBef>
-              <a:buFont typeface="Arial"/>
-              <a:buChar char="•"/>
-              <a:defRPr sz="2800" kern="1200">
-                <a:solidFill>
-                  <a:srgbClr val="0070C0"/>
-                </a:solidFill>
-                <a:latin typeface="IBM Plex Mono Text" panose="020B0509050203000203" pitchFamily="49" charset="0"/>
-                <a:ea typeface="+mn-ea"/>
-                <a:cs typeface="+mn-cs"/>
-              </a:defRPr>
-            </a:lvl1pPr>
-            <a:lvl2pPr marL="685800" indent="-228600" algn="l" defTabSz="914400" rtl="0" eaLnBrk="1" latinLnBrk="0" hangingPunct="1">
-              <a:lnSpc>
-                <a:spcPct val="90000"/>
-              </a:lnSpc>
-              <a:spcBef>
-                <a:spcPts val="500"/>
-              </a:spcBef>
-              <a:buFont typeface="Arial"/>
-              <a:buChar char="•"/>
-              <a:defRPr sz="2400" kern="1200">
-                <a:solidFill>
-                  <a:srgbClr val="0070C0"/>
-                </a:solidFill>
-                <a:latin typeface="IBM Plex Mono Text" panose="020B0509050203000203" pitchFamily="49" charset="0"/>
-                <a:ea typeface="+mn-ea"/>
-                <a:cs typeface="+mn-cs"/>
-              </a:defRPr>
-            </a:lvl2pPr>
-            <a:lvl3pPr marL="1143000" indent="-228600" algn="l" defTabSz="914400" rtl="0" eaLnBrk="1" latinLnBrk="0" hangingPunct="1">
-              <a:lnSpc>
-                <a:spcPct val="90000"/>
-              </a:lnSpc>
-              <a:spcBef>
-                <a:spcPts val="500"/>
-              </a:spcBef>
-              <a:buFont typeface="Arial"/>
-              <a:buChar char="•"/>
-              <a:defRPr sz="2000" kern="1200">
-                <a:solidFill>
-                  <a:srgbClr val="0070C0"/>
-                </a:solidFill>
-                <a:latin typeface="IBM Plex Mono Text" panose="020B0509050203000203" pitchFamily="49" charset="0"/>
-                <a:ea typeface="+mn-ea"/>
-                <a:cs typeface="+mn-cs"/>
-              </a:defRPr>
-            </a:lvl3pPr>
-            <a:lvl4pPr marL="1600200" indent="-228600" algn="l" defTabSz="914400" rtl="0" eaLnBrk="1" latinLnBrk="0" hangingPunct="1">
-              <a:lnSpc>
-                <a:spcPct val="90000"/>
-              </a:lnSpc>
-              <a:spcBef>
-                <a:spcPts val="500"/>
-              </a:spcBef>
-              <a:buFont typeface="Arial"/>
-              <a:buChar char="•"/>
-              <a:defRPr sz="1800" kern="1200">
-                <a:solidFill>
-                  <a:srgbClr val="0070C0"/>
-                </a:solidFill>
-                <a:latin typeface="IBM Plex Mono Text" panose="020B0509050203000203" pitchFamily="49" charset="0"/>
-                <a:ea typeface="+mn-ea"/>
-                <a:cs typeface="+mn-cs"/>
-              </a:defRPr>
-            </a:lvl4pPr>
-            <a:lvl5pPr marL="2057400" indent="-228600" algn="l" defTabSz="914400" rtl="0" eaLnBrk="1" latinLnBrk="0" hangingPunct="1">
-              <a:lnSpc>
-                <a:spcPct val="90000"/>
-              </a:lnSpc>
-              <a:spcBef>
-                <a:spcPts val="500"/>
-              </a:spcBef>
-              <a:buFont typeface="Arial"/>
-              <a:buChar char="•"/>
-              <a:defRPr sz="1800" kern="1200">
-                <a:solidFill>
-                  <a:srgbClr val="0070C0"/>
-                </a:solidFill>
-                <a:latin typeface="IBM Plex Mono Text" panose="020B0509050203000203" pitchFamily="49" charset="0"/>
-                <a:ea typeface="+mn-ea"/>
-                <a:cs typeface="+mn-cs"/>
-              </a:defRPr>
-            </a:lvl5pPr>
-            <a:lvl6pPr marL="2514600" indent="-228600" algn="l" defTabSz="914400" rtl="0" eaLnBrk="1" latinLnBrk="0" hangingPunct="1">
-              <a:lnSpc>
-                <a:spcPct val="90000"/>
-              </a:lnSpc>
-              <a:spcBef>
-                <a:spcPts val="500"/>
-              </a:spcBef>
-              <a:buFont typeface="Arial"/>
-              <a:buChar char="•"/>
-              <a:defRPr sz="1800" kern="1200">
-                <a:solidFill>
-                  <a:schemeClr val="tx1"/>
-                </a:solidFill>
-                <a:latin typeface="+mn-lt"/>
-                <a:ea typeface="+mn-ea"/>
-                <a:cs typeface="+mn-cs"/>
-              </a:defRPr>
-            </a:lvl6pPr>
-            <a:lvl7pPr marL="2971800" indent="-228600" algn="l" defTabSz="914400" rtl="0" eaLnBrk="1" latinLnBrk="0" hangingPunct="1">
-              <a:lnSpc>
-                <a:spcPct val="90000"/>
-              </a:lnSpc>
-              <a:spcBef>
-                <a:spcPts val="500"/>
-              </a:spcBef>
-              <a:buFont typeface="Arial"/>
-              <a:buChar char="•"/>
-              <a:defRPr sz="1800" kern="1200">
-                <a:solidFill>
-                  <a:schemeClr val="tx1"/>
-                </a:solidFill>
-                <a:latin typeface="+mn-lt"/>
-                <a:ea typeface="+mn-ea"/>
-                <a:cs typeface="+mn-cs"/>
-              </a:defRPr>
-            </a:lvl7pPr>
-            <a:lvl8pPr marL="3429000" indent="-228600" algn="l" defTabSz="914400" rtl="0" eaLnBrk="1" latinLnBrk="0" hangingPunct="1">
-              <a:lnSpc>
-                <a:spcPct val="90000"/>
-              </a:lnSpc>
-              <a:spcBef>
-                <a:spcPts val="500"/>
-              </a:spcBef>
-              <a:buFont typeface="Arial"/>
-              <a:buChar char="•"/>
-              <a:defRPr sz="1800" kern="1200">
-                <a:solidFill>
-                  <a:schemeClr val="tx1"/>
-                </a:solidFill>
-                <a:latin typeface="+mn-lt"/>
-                <a:ea typeface="+mn-ea"/>
-                <a:cs typeface="+mn-cs"/>
-              </a:defRPr>
-            </a:lvl8pPr>
-            <a:lvl9pPr marL="3886200" indent="-228600" algn="l" defTabSz="914400" rtl="0" eaLnBrk="1" latinLnBrk="0" hangingPunct="1">
-              <a:lnSpc>
-                <a:spcPct val="90000"/>
-              </a:lnSpc>
-              <a:spcBef>
-                <a:spcPts val="500"/>
-              </a:spcBef>
-              <a:buFont typeface="Arial"/>
-              <a:buChar char="•"/>
-              <a:defRPr sz="1800" kern="1200">
-                <a:solidFill>
-                  <a:schemeClr val="tx1"/>
-                </a:solidFill>
-                <a:latin typeface="+mn-lt"/>
-                <a:ea typeface="+mn-ea"/>
-                <a:cs typeface="+mn-cs"/>
-              </a:defRPr>
-            </a:lvl9pPr>
-          </a:lstStyle>
-          <a:p>
-            <a:pPr marL="0" indent="0">
-              <a:buNone/>
-            </a:pPr>
-            <a:r>
-              <a:rPr lang="en-US" sz="2200" dirty="0"/>
-              <a:t>&lt; Bar chart of top 5 databases for the next year goes here.&gt;</a:t>
-            </a:r>
-          </a:p>
-        </p:txBody>
-      </p:sp>
-    </p:spTree>
-    <p:extLst>
-      <p:ext uri="{BB962C8B-B14F-4D97-AF65-F5344CB8AC3E}">
-        <p14:creationId xmlns:p14="http://schemas.microsoft.com/office/powerpoint/2010/main" val="1074638838"/>
       </p:ext>
     </p:extLst>
   </p:cSld>

</xml_diff>